<commit_message>
Update presentation with France-specific chart and remove extra EA countries
- Add fig11_france_role.png with 4-panel France-specific visualization
- Update fig10_convergence_fragmentation.png to remove PT, IE, GR
- Update policymaker deck with better France explanation and spelled-out Japanese acronyms
</commit_message>
<xml_diff>
--- a/comprehensive_analysis/Bond_Spillovers_Policymaker_Deck.pptx
+++ b/comprehensive_analysis/Bond_Spillovers_Policymaker_Deck.pptx
@@ -22,7 +22,6 @@
     <p:sldId id="270" r:id="rId21"/>
     <p:sldId id="271" r:id="rId22"/>
     <p:sldId id="272" r:id="rId23"/>
-    <p:sldId id="273" r:id="rId24"/>
   </p:sldIdLst>
   <p:sldSz cx="12191695" cy="6858000" type="screen4x3"/>
   <p:notesSz cx="6858000" cy="9144000"/>
@@ -3310,7 +3309,7 @@
               </a:defRPr>
             </a:pPr>
             <a:r>
-              <a:t>Japan: The Decoupling Paradox</a:t>
+              <a:t>Japan: The Decoupling After Yield Curve Control</a:t>
             </a:r>
           </a:p>
         </p:txBody>
@@ -3372,7 +3371,7 @@
               </a:defRPr>
             </a:pPr>
             <a:r>
-              <a:t>• Japanese yields: 0.10% (YCC) → 1.25% (post-NIRP exit)</a:t>
+              <a:t>• Background: Bank of Japan's Yield Curve Control (2016-2024)</a:t>
             </a:r>
           </a:p>
           <a:p>
@@ -3387,7 +3386,7 @@
               </a:defRPr>
             </a:pPr>
             <a:r>
-              <a:t>• First real yield steepening in 30 years</a:t>
+              <a:t>•   - Capped 10-year yields near 0% for 8 years</a:t>
             </a:r>
           </a:p>
           <a:p>
@@ -3402,7 +3401,7 @@
               </a:defRPr>
             </a:pPr>
             <a:r>
-              <a:t>• PARADOX: Higher yields = LESS spillover to EA</a:t>
+              <a:t>•   - Ended negative interest rates in March 2024</a:t>
             </a:r>
           </a:p>
           <a:p>
@@ -3417,7 +3416,7 @@
               </a:defRPr>
             </a:pPr>
             <a:r>
-              <a:t>• JP→EA fell from 3.7% (YCC era) to 1.2% (post-NIRP)</a:t>
+              <a:t>• Japanese yields: 0.10% (during controls) → 1.25% (after exit)</a:t>
             </a:r>
           </a:p>
           <a:p>
@@ -3432,7 +3431,7 @@
               </a:defRPr>
             </a:pPr>
             <a:r>
-              <a:t>• Interpretation: YCC forced JP to track global rates</a:t>
+              <a:t>• First real Japanese yield steepening in 30 years</a:t>
             </a:r>
           </a:p>
           <a:p>
@@ -3447,7 +3446,67 @@
               </a:defRPr>
             </a:pPr>
             <a:r>
-              <a:t>• Freed from YCC, Japanese bonds now move independently</a:t>
+              <a:t>• PARADOX: Higher Japanese yields = LESS spillover to EA</a:t>
+            </a:r>
+          </a:p>
+          <a:p>
+            <a:pPr>
+              <a:spcAft>
+                <a:spcPts val="800"/>
+              </a:spcAft>
+              <a:defRPr sz="1500">
+                <a:solidFill>
+                  <a:srgbClr val="505050"/>
+                </a:solidFill>
+              </a:defRPr>
+            </a:pPr>
+            <a:r>
+              <a:t>• Japan→EA spillover fell from 3.7% to 1.2% after policy exit</a:t>
+            </a:r>
+          </a:p>
+          <a:p>
+            <a:pPr>
+              <a:spcAft>
+                <a:spcPts val="800"/>
+              </a:spcAft>
+              <a:defRPr sz="1500">
+                <a:solidFill>
+                  <a:srgbClr val="505050"/>
+                </a:solidFill>
+              </a:defRPr>
+            </a:pPr>
+            <a:r>
+              <a:t>• Interpretation: Yield controls forced Japan to track global rates</a:t>
+            </a:r>
+          </a:p>
+          <a:p>
+            <a:pPr>
+              <a:spcAft>
+                <a:spcPts val="800"/>
+              </a:spcAft>
+              <a:defRPr sz="1500">
+                <a:solidFill>
+                  <a:srgbClr val="505050"/>
+                </a:solidFill>
+              </a:defRPr>
+            </a:pPr>
+            <a:r>
+              <a:t>• Once freed, Japanese bonds now move independently</a:t>
+            </a:r>
+          </a:p>
+          <a:p>
+            <a:pPr>
+              <a:spcAft>
+                <a:spcPts val="800"/>
+              </a:spcAft>
+              <a:defRPr sz="1500">
+                <a:solidFill>
+                  <a:srgbClr val="505050"/>
+                </a:solidFill>
+              </a:defRPr>
+            </a:pPr>
+            <a:r>
+              <a:t>• For EA policymakers: One less external transmission channel</a:t>
             </a:r>
           </a:p>
         </p:txBody>
@@ -3472,14 +3531,57 @@
       <p:grpSpPr/>
       <p:sp>
         <p:nvSpPr>
-          <p:cNvPr id="2" name="TextBox 1"/>
+          <p:cNvPr id="2" name="Rectangle 1"/>
+          <p:cNvSpPr/>
+          <p:nvPr/>
+        </p:nvSpPr>
+        <p:spPr>
+          <a:xfrm>
+            <a:off x="0" y="0"/>
+            <a:ext cx="12191695" cy="6858000"/>
+          </a:xfrm>
+          <a:prstGeom prst="rect">
+            <a:avLst/>
+          </a:prstGeom>
+          <a:solidFill>
+            <a:srgbClr val="003299"/>
+          </a:solidFill>
+          <a:ln>
+            <a:noFill/>
+          </a:ln>
+        </p:spPr>
+        <p:style>
+          <a:lnRef idx="1">
+            <a:schemeClr val="accent1"/>
+          </a:lnRef>
+          <a:fillRef idx="3">
+            <a:schemeClr val="accent1"/>
+          </a:fillRef>
+          <a:effectRef idx="2">
+            <a:schemeClr val="accent1"/>
+          </a:effectRef>
+          <a:fontRef idx="minor">
+            <a:schemeClr val="lt1"/>
+          </a:fontRef>
+        </p:style>
+        <p:txBody>
+          <a:bodyPr rtlCol="0" anchor="ctr"/>
+          <a:lstStyle/>
+          <a:p>
+            <a:pPr algn="ctr"/>
+          </a:p>
+        </p:txBody>
+      </p:sp>
+      <p:sp>
+        <p:nvSpPr>
+          <p:cNvPr id="3" name="TextBox 2"/>
           <p:cNvSpPr txBox="1"/>
           <p:nvPr/>
         </p:nvSpPr>
         <p:spPr>
           <a:xfrm>
-            <a:off x="365760" y="274320"/>
-            <a:ext cx="914400" cy="731520"/>
+            <a:off x="457200" y="2286000"/>
+            <a:ext cx="11277295" cy="914400"/>
           </a:xfrm>
           <a:prstGeom prst="rect">
             <a:avLst/>
@@ -3492,29 +3594,29 @@
           </a:bodyPr>
           <a:lstStyle/>
           <a:p>
-            <a:pPr>
-              <a:defRPr sz="3600" b="1">
-                <a:solidFill>
-                  <a:srgbClr val="007816"/>
-                </a:solidFill>
-              </a:defRPr>
-            </a:pPr>
-            <a:r>
-              <a:t>#5</a:t>
-            </a:r>
-          </a:p>
-        </p:txBody>
-      </p:sp>
-      <p:sp>
-        <p:nvSpPr>
-          <p:cNvPr id="3" name="TextBox 2"/>
+            <a:pPr algn="ctr">
+              <a:defRPr sz="7200" b="1">
+                <a:solidFill>
+                  <a:srgbClr val="FFFFFF"/>
+                </a:solidFill>
+              </a:defRPr>
+            </a:pPr>
+            <a:r>
+              <a:t>III</a:t>
+            </a:r>
+          </a:p>
+        </p:txBody>
+      </p:sp>
+      <p:sp>
+        <p:nvSpPr>
+          <p:cNvPr id="4" name="TextBox 3"/>
           <p:cNvSpPr txBox="1"/>
           <p:nvPr/>
         </p:nvSpPr>
         <p:spPr>
           <a:xfrm>
-            <a:off x="1371600" y="320040"/>
-            <a:ext cx="10058400" cy="731520"/>
+            <a:off x="457200" y="3200400"/>
+            <a:ext cx="11277295" cy="1371600"/>
           </a:xfrm>
           <a:prstGeom prst="rect">
             <a:avLst/>
@@ -3527,152 +3629,15 @@
           </a:bodyPr>
           <a:lstStyle/>
           <a:p>
-            <a:pPr>
-              <a:defRPr sz="2800" b="1">
-                <a:solidFill>
-                  <a:srgbClr val="003299"/>
-                </a:solidFill>
-              </a:defRPr>
-            </a:pPr>
-            <a:r>
-              <a:t>The Integration Paradox</a:t>
-            </a:r>
-          </a:p>
-        </p:txBody>
-      </p:sp>
-      <p:pic>
-        <p:nvPicPr>
-          <p:cNvPr id="4" name="Picture 3" descr="fig09_summary_dashboard.png"/>
-          <p:cNvPicPr>
-            <a:picLocks noChangeAspect="1"/>
-          </p:cNvPicPr>
-          <p:nvPr/>
-        </p:nvPicPr>
-        <p:blipFill>
-          <a:blip r:embed="rId2"/>
-          <a:stretch>
-            <a:fillRect/>
-          </a:stretch>
-        </p:blipFill>
-        <p:spPr>
-          <a:xfrm>
-            <a:off x="5303520" y="1097280"/>
-            <a:ext cx="6583680" cy="5120640"/>
-          </a:xfrm>
-          <a:prstGeom prst="rect">
-            <a:avLst/>
-          </a:prstGeom>
-        </p:spPr>
-      </p:pic>
-      <p:sp>
-        <p:nvSpPr>
-          <p:cNvPr id="5" name="TextBox 4"/>
-          <p:cNvSpPr txBox="1"/>
-          <p:nvPr/>
-        </p:nvSpPr>
-        <p:spPr>
-          <a:xfrm>
-            <a:off x="365760" y="1097280"/>
-            <a:ext cx="4572000" cy="5303520"/>
-          </a:xfrm>
-          <a:prstGeom prst="rect">
-            <a:avLst/>
-          </a:prstGeom>
-          <a:noFill/>
-        </p:spPr>
-        <p:txBody>
-          <a:bodyPr wrap="square">
-            <a:spAutoFit/>
-          </a:bodyPr>
-          <a:lstStyle/>
-          <a:p>
-            <a:pPr>
-              <a:spcAft>
-                <a:spcPts val="800"/>
-              </a:spcAft>
-              <a:defRPr sz="1500">
-                <a:solidFill>
-                  <a:srgbClr val="505050"/>
-                </a:solidFill>
-              </a:defRPr>
-            </a:pPr>
-            <a:r>
-              <a:t>• Spillovers are LOWEST during crises: 50-54% (2010-12)</a:t>
-            </a:r>
-          </a:p>
-          <a:p>
-            <a:pPr>
-              <a:spcAft>
-                <a:spcPts val="800"/>
-              </a:spcAft>
-              <a:defRPr sz="1500">
-                <a:solidFill>
-                  <a:srgbClr val="505050"/>
-                </a:solidFill>
-              </a:defRPr>
-            </a:pPr>
-            <a:r>
-              <a:t>• Spillovers are HIGHEST during tightening: 68-70% (2022+)</a:t>
-            </a:r>
-          </a:p>
-          <a:p>
-            <a:pPr>
-              <a:spcAft>
-                <a:spcPts val="800"/>
-              </a:spcAft>
-              <a:defRPr sz="1500">
-                <a:solidFill>
-                  <a:srgbClr val="505050"/>
-                </a:solidFill>
-              </a:defRPr>
-            </a:pPr>
-            <a:r>
-              <a:t>• Markets fragment when stress is idiosyncratic (sovereign risk)</a:t>
-            </a:r>
-          </a:p>
-          <a:p>
-            <a:pPr>
-              <a:spcAft>
-                <a:spcPts val="800"/>
-              </a:spcAft>
-              <a:defRPr sz="1500">
-                <a:solidFill>
-                  <a:srgbClr val="505050"/>
-                </a:solidFill>
-              </a:defRPr>
-            </a:pPr>
-            <a:r>
-              <a:t>• Markets integrate when facing common shocks (global rates)</a:t>
-            </a:r>
-          </a:p>
-          <a:p>
-            <a:pPr>
-              <a:spcAft>
-                <a:spcPts val="800"/>
-              </a:spcAft>
-              <a:defRPr sz="1500">
-                <a:solidFill>
-                  <a:srgbClr val="505050"/>
-                </a:solidFill>
-              </a:defRPr>
-            </a:pPr>
-            <a:r>
-              <a:t>• Current high spillovers reflect synchronized tightening</a:t>
-            </a:r>
-          </a:p>
-          <a:p>
-            <a:pPr>
-              <a:spcAft>
-                <a:spcPts val="800"/>
-              </a:spcAft>
-              <a:defRPr sz="1500">
-                <a:solidFill>
-                  <a:srgbClr val="505050"/>
-                </a:solidFill>
-              </a:defRPr>
-            </a:pPr>
-            <a:r>
-              <a:t>• Implication: Crisis management requires different tools than normal times</a:t>
+            <a:pPr algn="ctr">
+              <a:defRPr sz="4000" b="1">
+                <a:solidFill>
+                  <a:srgbClr val="FFFFFF"/>
+                </a:solidFill>
+              </a:defRPr>
+            </a:pPr>
+            <a:r>
+              <a:t>Current Risk Assessment</a:t>
             </a:r>
           </a:p>
         </p:txBody>
@@ -3697,57 +3662,14 @@
       <p:grpSpPr/>
       <p:sp>
         <p:nvSpPr>
-          <p:cNvPr id="2" name="Rectangle 1"/>
-          <p:cNvSpPr/>
-          <p:nvPr/>
-        </p:nvSpPr>
-        <p:spPr>
-          <a:xfrm>
-            <a:off x="0" y="0"/>
-            <a:ext cx="12191695" cy="6858000"/>
-          </a:xfrm>
-          <a:prstGeom prst="rect">
-            <a:avLst/>
-          </a:prstGeom>
-          <a:solidFill>
-            <a:srgbClr val="003299"/>
-          </a:solidFill>
-          <a:ln>
-            <a:noFill/>
-          </a:ln>
-        </p:spPr>
-        <p:style>
-          <a:lnRef idx="1">
-            <a:schemeClr val="accent1"/>
-          </a:lnRef>
-          <a:fillRef idx="3">
-            <a:schemeClr val="accent1"/>
-          </a:fillRef>
-          <a:effectRef idx="2">
-            <a:schemeClr val="accent1"/>
-          </a:effectRef>
-          <a:fontRef idx="minor">
-            <a:schemeClr val="lt1"/>
-          </a:fontRef>
-        </p:style>
-        <p:txBody>
-          <a:bodyPr rtlCol="0" anchor="ctr"/>
-          <a:lstStyle/>
-          <a:p>
-            <a:pPr algn="ctr"/>
-          </a:p>
-        </p:txBody>
-      </p:sp>
-      <p:sp>
-        <p:nvSpPr>
-          <p:cNvPr id="3" name="TextBox 2"/>
+          <p:cNvPr id="2" name="TextBox 1"/>
           <p:cNvSpPr txBox="1"/>
           <p:nvPr/>
         </p:nvSpPr>
         <p:spPr>
           <a:xfrm>
-            <a:off x="457200" y="2286000"/>
-            <a:ext cx="11277295" cy="914400"/>
+            <a:off x="365760" y="274320"/>
+            <a:ext cx="11430000" cy="731520"/>
           </a:xfrm>
           <a:prstGeom prst="rect">
             <a:avLst/>
@@ -3760,19 +3682,43 @@
           </a:bodyPr>
           <a:lstStyle/>
           <a:p>
-            <a:pPr algn="ctr">
-              <a:defRPr sz="7200" b="1">
-                <a:solidFill>
-                  <a:srgbClr val="FFFFFF"/>
-                </a:solidFill>
-              </a:defRPr>
-            </a:pPr>
-            <a:r>
-              <a:t>III</a:t>
-            </a:r>
-          </a:p>
-        </p:txBody>
-      </p:sp>
+            <a:pPr>
+              <a:defRPr sz="3000" b="1">
+                <a:solidFill>
+                  <a:srgbClr val="003299"/>
+                </a:solidFill>
+              </a:defRPr>
+            </a:pPr>
+            <a:r>
+              <a:t>French Political Risk: Contained but Elevated</a:t>
+            </a:r>
+          </a:p>
+        </p:txBody>
+      </p:sp>
+      <p:pic>
+        <p:nvPicPr>
+          <p:cNvPr id="3" name="Picture 2" descr="fig11_france_role.png"/>
+          <p:cNvPicPr>
+            <a:picLocks noChangeAspect="1"/>
+          </p:cNvPicPr>
+          <p:nvPr/>
+        </p:nvPicPr>
+        <p:blipFill>
+          <a:blip r:embed="rId2"/>
+          <a:stretch>
+            <a:fillRect/>
+          </a:stretch>
+        </p:blipFill>
+        <p:spPr>
+          <a:xfrm>
+            <a:off x="5303520" y="1097280"/>
+            <a:ext cx="6583680" cy="5303520"/>
+          </a:xfrm>
+          <a:prstGeom prst="rect">
+            <a:avLst/>
+          </a:prstGeom>
+        </p:spPr>
+      </p:pic>
       <p:sp>
         <p:nvSpPr>
           <p:cNvPr id="4" name="TextBox 3"/>
@@ -3781,8 +3727,8 @@
         </p:nvSpPr>
         <p:spPr>
           <a:xfrm>
-            <a:off x="457200" y="3200400"/>
-            <a:ext cx="11277295" cy="1371600"/>
+            <a:off x="365760" y="1097280"/>
+            <a:ext cx="4754880" cy="5303520"/>
           </a:xfrm>
           <a:prstGeom prst="rect">
             <a:avLst/>
@@ -3790,20 +3736,158 @@
           <a:noFill/>
         </p:spPr>
         <p:txBody>
-          <a:bodyPr wrap="none">
+          <a:bodyPr wrap="square">
             <a:spAutoFit/>
           </a:bodyPr>
           <a:lstStyle/>
           <a:p>
-            <a:pPr algn="ctr">
-              <a:defRPr sz="4000" b="1">
-                <a:solidFill>
-                  <a:srgbClr val="FFFFFF"/>
-                </a:solidFill>
-              </a:defRPr>
-            </a:pPr>
-            <a:r>
-              <a:t>Current Risk Assessment</a:t>
+            <a:pPr>
+              <a:spcAft>
+                <a:spcPts val="1000"/>
+              </a:spcAft>
+              <a:defRPr sz="1600">
+                <a:solidFill>
+                  <a:srgbClr val="505050"/>
+                </a:solidFill>
+              </a:defRPr>
+            </a:pPr>
+            <a:r>
+              <a:t>• FR-DE spread widened from 50bp to 87bp during 2024 turmoil</a:t>
+            </a:r>
+          </a:p>
+          <a:p>
+            <a:pPr>
+              <a:spcAft>
+                <a:spcPts val="1000"/>
+              </a:spcAft>
+              <a:defRPr sz="1600">
+                <a:solidFill>
+                  <a:srgbClr val="505050"/>
+                </a:solidFill>
+              </a:defRPr>
+            </a:pPr>
+            <a:r>
+              <a:t>• Peak spread on December 2, 2024 after Barnier government fell</a:t>
+            </a:r>
+          </a:p>
+          <a:p>
+            <a:pPr>
+              <a:spcAft>
+                <a:spcPts val="1000"/>
+              </a:spcAft>
+              <a:defRPr sz="1600">
+                <a:solidFill>
+                  <a:srgbClr val="505050"/>
+                </a:solidFill>
+              </a:defRPr>
+            </a:pPr>
+            <a:r>
+              <a:t>• Critical finding: France REMAINED a net transmitter throughout</a:t>
+            </a:r>
+          </a:p>
+          <a:p>
+            <a:pPr>
+              <a:spcAft>
+                <a:spcPts val="1000"/>
+              </a:spcAft>
+              <a:defRPr sz="1600">
+                <a:solidFill>
+                  <a:srgbClr val="505050"/>
+                </a:solidFill>
+              </a:defRPr>
+            </a:pPr>
+            <a:r>
+              <a:t>•   - Pre-crisis average: +36 (strong transmitter)</a:t>
+            </a:r>
+          </a:p>
+          <a:p>
+            <a:pPr>
+              <a:spcAft>
+                <a:spcPts val="1000"/>
+              </a:spcAft>
+              <a:defRPr sz="1600">
+                <a:solidFill>
+                  <a:srgbClr val="505050"/>
+                </a:solidFill>
+              </a:defRPr>
+            </a:pPr>
+            <a:r>
+              <a:t>•   - Post-crisis average: +29 (still positive)</a:t>
+            </a:r>
+          </a:p>
+          <a:p>
+            <a:pPr>
+              <a:spcAft>
+                <a:spcPts val="1000"/>
+              </a:spcAft>
+              <a:defRPr sz="1600">
+                <a:solidFill>
+                  <a:srgbClr val="505050"/>
+                </a:solidFill>
+              </a:defRPr>
+            </a:pPr>
+            <a:r>
+              <a:t>• Contagion to periphery was LIMITED:</a:t>
+            </a:r>
+          </a:p>
+          <a:p>
+            <a:pPr>
+              <a:spcAft>
+                <a:spcPts val="1000"/>
+              </a:spcAft>
+              <a:defRPr sz="1600">
+                <a:solidFill>
+                  <a:srgbClr val="505050"/>
+                </a:solidFill>
+              </a:defRPr>
+            </a:pPr>
+            <a:r>
+              <a:t>•   - France→Italy spillover: stable at 21-22%</a:t>
+            </a:r>
+          </a:p>
+          <a:p>
+            <a:pPr>
+              <a:spcAft>
+                <a:spcPts val="1000"/>
+              </a:spcAft>
+              <a:defRPr sz="1600">
+                <a:solidFill>
+                  <a:srgbClr val="505050"/>
+                </a:solidFill>
+              </a:defRPr>
+            </a:pPr>
+            <a:r>
+              <a:t>•   - France→Spain spillover: stable at 18-19%</a:t>
+            </a:r>
+          </a:p>
+          <a:p>
+            <a:pPr>
+              <a:spcAft>
+                <a:spcPts val="1000"/>
+              </a:spcAft>
+              <a:defRPr sz="1600">
+                <a:solidFill>
+                  <a:srgbClr val="505050"/>
+                </a:solidFill>
+              </a:defRPr>
+            </a:pPr>
+            <a:r>
+              <a:t>• ECB's Transmission Protection Instrument appears credible</a:t>
+            </a:r>
+          </a:p>
+          <a:p>
+            <a:pPr>
+              <a:spcAft>
+                <a:spcPts val="1000"/>
+              </a:spcAft>
+              <a:defRPr sz="1600">
+                <a:solidFill>
+                  <a:srgbClr val="505050"/>
+                </a:solidFill>
+              </a:defRPr>
+            </a:pPr>
+            <a:r>
+              <a:t>• But: Elevated spreads suggest underlying fragility remains</a:t>
             </a:r>
           </a:p>
         </p:txBody>
@@ -3834,8 +3918,8 @@
         </p:nvSpPr>
         <p:spPr>
           <a:xfrm>
-            <a:off x="365760" y="274320"/>
-            <a:ext cx="11430000" cy="731520"/>
+            <a:off x="365760" y="182880"/>
+            <a:ext cx="11430000" cy="640080"/>
           </a:xfrm>
           <a:prstGeom prst="rect">
             <a:avLst/>
@@ -3849,21 +3933,21 @@
           <a:lstStyle/>
           <a:p>
             <a:pPr>
-              <a:defRPr sz="3000" b="1">
+              <a:defRPr sz="2600" b="1">
                 <a:solidFill>
                   <a:srgbClr val="003299"/>
                 </a:solidFill>
               </a:defRPr>
             </a:pPr>
             <a:r>
-              <a:t>French Political Risk: Contained but Elevated</a:t>
+              <a:t>Who Affects Whom: The Bilateral Picture</a:t>
             </a:r>
           </a:p>
         </p:txBody>
       </p:sp>
       <p:pic>
         <p:nvPicPr>
-          <p:cNvPr id="3" name="Picture 2" descr="fig05_fragmentation.png"/>
+          <p:cNvPr id="3" name="Picture 2" descr="fig08_bilateral_heatmaps.png"/>
           <p:cNvPicPr>
             <a:picLocks noChangeAspect="1"/>
           </p:cNvPicPr>
@@ -3877,8 +3961,8 @@
         </p:blipFill>
         <p:spPr>
           <a:xfrm>
-            <a:off x="5303520" y="1097280"/>
-            <a:ext cx="6583680" cy="5303520"/>
+            <a:off x="274320" y="868680"/>
+            <a:ext cx="11612880" cy="5394960"/>
           </a:xfrm>
           <a:prstGeom prst="rect">
             <a:avLst/>
@@ -3893,8 +3977,8 @@
         </p:nvSpPr>
         <p:spPr>
           <a:xfrm>
-            <a:off x="365760" y="1097280"/>
-            <a:ext cx="4754880" cy="5303520"/>
+            <a:off x="365760" y="6355080"/>
+            <a:ext cx="11430000" cy="457200"/>
           </a:xfrm>
           <a:prstGeom prst="rect">
             <a:avLst/>
@@ -3902,128 +3986,20 @@
           <a:noFill/>
         </p:spPr>
         <p:txBody>
-          <a:bodyPr wrap="square">
+          <a:bodyPr wrap="none">
             <a:spAutoFit/>
           </a:bodyPr>
           <a:lstStyle/>
           <a:p>
             <a:pPr>
-              <a:spcAft>
-                <a:spcPts val="1000"/>
-              </a:spcAft>
-              <a:defRPr sz="1600">
-                <a:solidFill>
-                  <a:srgbClr val="505050"/>
-                </a:solidFill>
-              </a:defRPr>
-            </a:pPr>
-            <a:r>
-              <a:t>• FR-DE spread widened from 50bp to 87bp during 2024 turmoil</a:t>
-            </a:r>
-          </a:p>
-          <a:p>
-            <a:pPr>
-              <a:spcAft>
-                <a:spcPts val="1000"/>
-              </a:spcAft>
-              <a:defRPr sz="1600">
-                <a:solidFill>
-                  <a:srgbClr val="505050"/>
-                </a:solidFill>
-              </a:defRPr>
-            </a:pPr>
-            <a:r>
-              <a:t>• Peak spread on Dec 2, 2024 after Barnier government fell</a:t>
-            </a:r>
-          </a:p>
-          <a:p>
-            <a:pPr>
-              <a:spcAft>
-                <a:spcPts val="1000"/>
-              </a:spcAft>
-              <a:defRPr sz="1600">
-                <a:solidFill>
-                  <a:srgbClr val="505050"/>
-                </a:solidFill>
-              </a:defRPr>
-            </a:pPr>
-            <a:r>
-              <a:t>• France remained a net transmitter throughout (FR_net: +36 → +29)</a:t>
-            </a:r>
-          </a:p>
-          <a:p>
-            <a:pPr>
-              <a:spcAft>
-                <a:spcPts val="1000"/>
-              </a:spcAft>
-              <a:defRPr sz="1600">
-                <a:solidFill>
-                  <a:srgbClr val="505050"/>
-                </a:solidFill>
-              </a:defRPr>
-            </a:pPr>
-            <a:r>
-              <a:t>• Contagion to periphery was LIMITED:</a:t>
-            </a:r>
-          </a:p>
-          <a:p>
-            <a:pPr>
-              <a:spcAft>
-                <a:spcPts val="1000"/>
-              </a:spcAft>
-              <a:defRPr sz="1600">
-                <a:solidFill>
-                  <a:srgbClr val="505050"/>
-                </a:solidFill>
-              </a:defRPr>
-            </a:pPr>
-            <a:r>
-              <a:t>•   - FR→IT spillover: stable at 21-22%</a:t>
-            </a:r>
-          </a:p>
-          <a:p>
-            <a:pPr>
-              <a:spcAft>
-                <a:spcPts val="1000"/>
-              </a:spcAft>
-              <a:defRPr sz="1600">
-                <a:solidFill>
-                  <a:srgbClr val="505050"/>
-                </a:solidFill>
-              </a:defRPr>
-            </a:pPr>
-            <a:r>
-              <a:t>•   - FR→ES spillover: stable at 18-19%</a:t>
-            </a:r>
-          </a:p>
-          <a:p>
-            <a:pPr>
-              <a:spcAft>
-                <a:spcPts val="1000"/>
-              </a:spcAft>
-              <a:defRPr sz="1600">
-                <a:solidFill>
-                  <a:srgbClr val="505050"/>
-                </a:solidFill>
-              </a:defRPr>
-            </a:pPr>
-            <a:r>
-              <a:t>• Key insight: ECB/TPI credibility contained widening</a:t>
-            </a:r>
-          </a:p>
-          <a:p>
-            <a:pPr>
-              <a:spcAft>
-                <a:spcPts val="1000"/>
-              </a:spcAft>
-              <a:defRPr sz="1600">
-                <a:solidFill>
-                  <a:srgbClr val="505050"/>
-                </a:solidFill>
-              </a:defRPr>
-            </a:pPr>
-            <a:r>
-              <a:t>• But: Elevated spreads suggest fragility remains</a:t>
+              <a:defRPr sz="1100" i="1">
+                <a:solidFill>
+                  <a:srgbClr val="505050"/>
+                </a:solidFill>
+              </a:defRPr>
+            </a:pPr>
+            <a:r>
+              <a:t>Note regime shifts: IT-ES contagion in Euro Crisis (25%), uniform flows in Tightening (15-23%)</a:t>
             </a:r>
           </a:p>
         </p:txBody>
@@ -4048,14 +4024,57 @@
       <p:grpSpPr/>
       <p:sp>
         <p:nvSpPr>
-          <p:cNvPr id="2" name="TextBox 1"/>
+          <p:cNvPr id="2" name="Rectangle 1"/>
+          <p:cNvSpPr/>
+          <p:nvPr/>
+        </p:nvSpPr>
+        <p:spPr>
+          <a:xfrm>
+            <a:off x="0" y="0"/>
+            <a:ext cx="12191695" cy="6858000"/>
+          </a:xfrm>
+          <a:prstGeom prst="rect">
+            <a:avLst/>
+          </a:prstGeom>
+          <a:solidFill>
+            <a:srgbClr val="003299"/>
+          </a:solidFill>
+          <a:ln>
+            <a:noFill/>
+          </a:ln>
+        </p:spPr>
+        <p:style>
+          <a:lnRef idx="1">
+            <a:schemeClr val="accent1"/>
+          </a:lnRef>
+          <a:fillRef idx="3">
+            <a:schemeClr val="accent1"/>
+          </a:fillRef>
+          <a:effectRef idx="2">
+            <a:schemeClr val="accent1"/>
+          </a:effectRef>
+          <a:fontRef idx="minor">
+            <a:schemeClr val="lt1"/>
+          </a:fontRef>
+        </p:style>
+        <p:txBody>
+          <a:bodyPr rtlCol="0" anchor="ctr"/>
+          <a:lstStyle/>
+          <a:p>
+            <a:pPr algn="ctr"/>
+          </a:p>
+        </p:txBody>
+      </p:sp>
+      <p:sp>
+        <p:nvSpPr>
+          <p:cNvPr id="3" name="TextBox 2"/>
           <p:cNvSpPr txBox="1"/>
           <p:nvPr/>
         </p:nvSpPr>
         <p:spPr>
           <a:xfrm>
-            <a:off x="365760" y="182880"/>
-            <a:ext cx="11430000" cy="640080"/>
+            <a:off x="457200" y="2286000"/>
+            <a:ext cx="11277295" cy="914400"/>
           </a:xfrm>
           <a:prstGeom prst="rect">
             <a:avLst/>
@@ -4068,43 +4087,19 @@
           </a:bodyPr>
           <a:lstStyle/>
           <a:p>
-            <a:pPr>
-              <a:defRPr sz="2600" b="1">
-                <a:solidFill>
-                  <a:srgbClr val="003299"/>
-                </a:solidFill>
-              </a:defRPr>
-            </a:pPr>
-            <a:r>
-              <a:t>Who Affects Whom: The Bilateral Picture</a:t>
-            </a:r>
-          </a:p>
-        </p:txBody>
-      </p:sp>
-      <p:pic>
-        <p:nvPicPr>
-          <p:cNvPr id="3" name="Picture 2" descr="fig08_bilateral_heatmaps.png"/>
-          <p:cNvPicPr>
-            <a:picLocks noChangeAspect="1"/>
-          </p:cNvPicPr>
-          <p:nvPr/>
-        </p:nvPicPr>
-        <p:blipFill>
-          <a:blip r:embed="rId2"/>
-          <a:stretch>
-            <a:fillRect/>
-          </a:stretch>
-        </p:blipFill>
-        <p:spPr>
-          <a:xfrm>
-            <a:off x="274320" y="868680"/>
-            <a:ext cx="11612880" cy="5394960"/>
-          </a:xfrm>
-          <a:prstGeom prst="rect">
-            <a:avLst/>
-          </a:prstGeom>
-        </p:spPr>
-      </p:pic>
+            <a:pPr algn="ctr">
+              <a:defRPr sz="7200" b="1">
+                <a:solidFill>
+                  <a:srgbClr val="FFFFFF"/>
+                </a:solidFill>
+              </a:defRPr>
+            </a:pPr>
+            <a:r>
+              <a:t>IV</a:t>
+            </a:r>
+          </a:p>
+        </p:txBody>
+      </p:sp>
       <p:sp>
         <p:nvSpPr>
           <p:cNvPr id="4" name="TextBox 3"/>
@@ -4113,8 +4108,8 @@
         </p:nvSpPr>
         <p:spPr>
           <a:xfrm>
-            <a:off x="365760" y="6355080"/>
-            <a:ext cx="11430000" cy="457200"/>
+            <a:off x="457200" y="3200400"/>
+            <a:ext cx="11277295" cy="1371600"/>
           </a:xfrm>
           <a:prstGeom prst="rect">
             <a:avLst/>
@@ -4127,15 +4122,15 @@
           </a:bodyPr>
           <a:lstStyle/>
           <a:p>
-            <a:pPr>
-              <a:defRPr sz="1100" i="1">
-                <a:solidFill>
-                  <a:srgbClr val="505050"/>
-                </a:solidFill>
-              </a:defRPr>
-            </a:pPr>
-            <a:r>
-              <a:t>Note regime shifts: IT-ES contagion in Euro Crisis (25%), uniform flows in Tightening (15-23%)</a:t>
+            <a:pPr algn="ctr">
+              <a:defRPr sz="4000" b="1">
+                <a:solidFill>
+                  <a:srgbClr val="FFFFFF"/>
+                </a:solidFill>
+              </a:defRPr>
+            </a:pPr>
+            <a:r>
+              <a:t>Policy Implications</a:t>
             </a:r>
           </a:p>
         </p:txBody>
@@ -4160,57 +4155,14 @@
       <p:grpSpPr/>
       <p:sp>
         <p:nvSpPr>
-          <p:cNvPr id="2" name="Rectangle 1"/>
-          <p:cNvSpPr/>
-          <p:nvPr/>
-        </p:nvSpPr>
-        <p:spPr>
-          <a:xfrm>
-            <a:off x="0" y="0"/>
-            <a:ext cx="12191695" cy="6858000"/>
-          </a:xfrm>
-          <a:prstGeom prst="rect">
-            <a:avLst/>
-          </a:prstGeom>
-          <a:solidFill>
-            <a:srgbClr val="003299"/>
-          </a:solidFill>
-          <a:ln>
-            <a:noFill/>
-          </a:ln>
-        </p:spPr>
-        <p:style>
-          <a:lnRef idx="1">
-            <a:schemeClr val="accent1"/>
-          </a:lnRef>
-          <a:fillRef idx="3">
-            <a:schemeClr val="accent1"/>
-          </a:fillRef>
-          <a:effectRef idx="2">
-            <a:schemeClr val="accent1"/>
-          </a:effectRef>
-          <a:fontRef idx="minor">
-            <a:schemeClr val="lt1"/>
-          </a:fontRef>
-        </p:style>
-        <p:txBody>
-          <a:bodyPr rtlCol="0" anchor="ctr"/>
-          <a:lstStyle/>
-          <a:p>
-            <a:pPr algn="ctr"/>
-          </a:p>
-        </p:txBody>
-      </p:sp>
-      <p:sp>
-        <p:nvSpPr>
-          <p:cNvPr id="3" name="TextBox 2"/>
+          <p:cNvPr id="2" name="TextBox 1"/>
           <p:cNvSpPr txBox="1"/>
           <p:nvPr/>
         </p:nvSpPr>
         <p:spPr>
           <a:xfrm>
-            <a:off x="457200" y="2286000"/>
-            <a:ext cx="11277295" cy="914400"/>
+            <a:off x="365760" y="274320"/>
+            <a:ext cx="11430000" cy="731520"/>
           </a:xfrm>
           <a:prstGeom prst="rect">
             <a:avLst/>
@@ -4223,29 +4175,29 @@
           </a:bodyPr>
           <a:lstStyle/>
           <a:p>
-            <a:pPr algn="ctr">
-              <a:defRPr sz="7200" b="1">
-                <a:solidFill>
-                  <a:srgbClr val="FFFFFF"/>
-                </a:solidFill>
-              </a:defRPr>
-            </a:pPr>
-            <a:r>
-              <a:t>IV</a:t>
-            </a:r>
-          </a:p>
-        </p:txBody>
-      </p:sp>
-      <p:sp>
-        <p:nvSpPr>
-          <p:cNvPr id="4" name="TextBox 3"/>
+            <a:pPr>
+              <a:defRPr sz="3000" b="1">
+                <a:solidFill>
+                  <a:srgbClr val="003299"/>
+                </a:solidFill>
+              </a:defRPr>
+            </a:pPr>
+            <a:r>
+              <a:t>Implications for Policymakers</a:t>
+            </a:r>
+          </a:p>
+        </p:txBody>
+      </p:sp>
+      <p:sp>
+        <p:nvSpPr>
+          <p:cNvPr id="3" name="TextBox 2"/>
           <p:cNvSpPr txBox="1"/>
           <p:nvPr/>
         </p:nvSpPr>
         <p:spPr>
           <a:xfrm>
-            <a:off x="457200" y="3200400"/>
-            <a:ext cx="11277295" cy="1371600"/>
+            <a:off x="365760" y="1097280"/>
+            <a:ext cx="11430000" cy="5303520"/>
           </a:xfrm>
           <a:prstGeom prst="rect">
             <a:avLst/>
@@ -4253,20 +4205,203 @@
           <a:noFill/>
         </p:spPr>
         <p:txBody>
-          <a:bodyPr wrap="none">
+          <a:bodyPr wrap="square">
             <a:spAutoFit/>
           </a:bodyPr>
           <a:lstStyle/>
           <a:p>
-            <a:pPr algn="ctr">
-              <a:defRPr sz="4000" b="1">
-                <a:solidFill>
-                  <a:srgbClr val="FFFFFF"/>
-                </a:solidFill>
-              </a:defRPr>
-            </a:pPr>
-            <a:r>
-              <a:t>Policy Implications</a:t>
+            <a:pPr>
+              <a:spcAft>
+                <a:spcPts val="1000"/>
+              </a:spcAft>
+              <a:defRPr sz="1600">
+                <a:solidFill>
+                  <a:srgbClr val="505050"/>
+                </a:solidFill>
+              </a:defRPr>
+            </a:pPr>
+            <a:r>
+              <a:t>• MONETARY POLICY</a:t>
+            </a:r>
+          </a:p>
+          <a:p>
+            <a:pPr>
+              <a:spcAft>
+                <a:spcPts val="1000"/>
+              </a:spcAft>
+              <a:defRPr sz="1600">
+                <a:solidFill>
+                  <a:srgbClr val="505050"/>
+                </a:solidFill>
+              </a:defRPr>
+            </a:pPr>
+            <a:r>
+              <a:t>•   - EA yields driven more by internal than external factors</a:t>
+            </a:r>
+          </a:p>
+          <a:p>
+            <a:pPr>
+              <a:spcAft>
+                <a:spcPts val="1000"/>
+              </a:spcAft>
+              <a:defRPr sz="1600">
+                <a:solidFill>
+                  <a:srgbClr val="505050"/>
+                </a:solidFill>
+              </a:defRPr>
+            </a:pPr>
+            <a:r>
+              <a:t>•   - ECB is the primary driver of EA-wide yield dynamics</a:t>
+            </a:r>
+          </a:p>
+          <a:p>
+            <a:pPr>
+              <a:spcAft>
+                <a:spcPts val="1000"/>
+              </a:spcAft>
+              <a:defRPr sz="1600">
+                <a:solidFill>
+                  <a:srgbClr val="505050"/>
+                </a:solidFill>
+              </a:defRPr>
+            </a:pPr>
+            <a:r>
+              <a:t>•   - Transmission Protection Instrument appears effective (French test)</a:t>
+            </a:r>
+          </a:p>
+          <a:p>
+            <a:pPr>
+              <a:spcAft>
+                <a:spcPts val="1000"/>
+              </a:spcAft>
+              <a:defRPr sz="1600">
+                <a:solidFill>
+                  <a:srgbClr val="505050"/>
+                </a:solidFill>
+              </a:defRPr>
+            </a:pPr>
+            <a:r>
+              <a:t>• </a:t>
+            </a:r>
+          </a:p>
+          <a:p>
+            <a:pPr>
+              <a:spcAft>
+                <a:spcPts val="1000"/>
+              </a:spcAft>
+              <a:defRPr sz="1600">
+                <a:solidFill>
+                  <a:srgbClr val="505050"/>
+                </a:solidFill>
+              </a:defRPr>
+            </a:pPr>
+            <a:r>
+              <a:t>• FISCAL COORDINATION</a:t>
+            </a:r>
+          </a:p>
+          <a:p>
+            <a:pPr>
+              <a:spcAft>
+                <a:spcPts val="1000"/>
+              </a:spcAft>
+              <a:defRPr sz="1600">
+                <a:solidFill>
+                  <a:srgbClr val="505050"/>
+                </a:solidFill>
+              </a:defRPr>
+            </a:pPr>
+            <a:r>
+              <a:t>•   - Periphery remains structurally vulnerable (price takers)</a:t>
+            </a:r>
+          </a:p>
+          <a:p>
+            <a:pPr>
+              <a:spcAft>
+                <a:spcPts val="1000"/>
+              </a:spcAft>
+              <a:defRPr sz="1600">
+                <a:solidFill>
+                  <a:srgbClr val="505050"/>
+                </a:solidFill>
+              </a:defRPr>
+            </a:pPr>
+            <a:r>
+              <a:t>•   - Spain most sensitive to EA-wide shocks</a:t>
+            </a:r>
+          </a:p>
+          <a:p>
+            <a:pPr>
+              <a:spcAft>
+                <a:spcPts val="1000"/>
+              </a:spcAft>
+              <a:defRPr sz="1600">
+                <a:solidFill>
+                  <a:srgbClr val="505050"/>
+                </a:solidFill>
+              </a:defRPr>
+            </a:pPr>
+            <a:r>
+              <a:t>•   - French fiscal credibility now a systemic concern</a:t>
+            </a:r>
+          </a:p>
+          <a:p>
+            <a:pPr>
+              <a:spcAft>
+                <a:spcPts val="1000"/>
+              </a:spcAft>
+              <a:defRPr sz="1600">
+                <a:solidFill>
+                  <a:srgbClr val="505050"/>
+                </a:solidFill>
+              </a:defRPr>
+            </a:pPr>
+            <a:r>
+              <a:t>• </a:t>
+            </a:r>
+          </a:p>
+          <a:p>
+            <a:pPr>
+              <a:spcAft>
+                <a:spcPts val="1000"/>
+              </a:spcAft>
+              <a:defRPr sz="1600">
+                <a:solidFill>
+                  <a:srgbClr val="505050"/>
+                </a:solidFill>
+              </a:defRPr>
+            </a:pPr>
+            <a:r>
+              <a:t>• CRISIS PREPAREDNESS</a:t>
+            </a:r>
+          </a:p>
+          <a:p>
+            <a:pPr>
+              <a:spcAft>
+                <a:spcPts val="1000"/>
+              </a:spcAft>
+              <a:defRPr sz="1600">
+                <a:solidFill>
+                  <a:srgbClr val="505050"/>
+                </a:solidFill>
+              </a:defRPr>
+            </a:pPr>
+            <a:r>
+              <a:t>•   - Integration falls during idiosyncratic crises</a:t>
+            </a:r>
+          </a:p>
+          <a:p>
+            <a:pPr>
+              <a:spcAft>
+                <a:spcPts val="1000"/>
+              </a:spcAft>
+              <a:defRPr sz="1600">
+                <a:solidFill>
+                  <a:srgbClr val="505050"/>
+                </a:solidFill>
+              </a:defRPr>
+            </a:pPr>
+            <a:r>
+              <a:t>•   - Current high spillovers = vulnerability to common shocks</a:t>
             </a:r>
           </a:p>
         </p:txBody>
@@ -4319,7 +4454,7 @@
               </a:defRPr>
             </a:pPr>
             <a:r>
-              <a:t>Implications for Policymakers</a:t>
+              <a:t>Open Questions</a:t>
             </a:r>
           </a:p>
         </p:txBody>
@@ -4357,7 +4492,7 @@
               </a:defRPr>
             </a:pPr>
             <a:r>
-              <a:t>• MONETARY POLICY</a:t>
+              <a:t>• Will France remain the pivot despite political fragmentation?</a:t>
             </a:r>
           </a:p>
           <a:p>
@@ -4372,7 +4507,7 @@
               </a:defRPr>
             </a:pPr>
             <a:r>
-              <a:t>•   - EA yields driven more by internal than external factors</a:t>
+              <a:t>• How will ECB rate cuts affect the spillover structure?</a:t>
             </a:r>
           </a:p>
           <a:p>
@@ -4387,7 +4522,7 @@
               </a:defRPr>
             </a:pPr>
             <a:r>
-              <a:t>•   - ECB is the primary driver of EA-wide yield dynamics</a:t>
+              <a:t>• Is Spain's vulnerability structural or cyclical?</a:t>
             </a:r>
           </a:p>
           <a:p>
@@ -4402,7 +4537,7 @@
               </a:defRPr>
             </a:pPr>
             <a:r>
-              <a:t>•   - TPI appears effective in containing contagion (French test case)</a:t>
+              <a:t>• What happens when the next idiosyncratic shock hits?</a:t>
             </a:r>
           </a:p>
           <a:p>
@@ -4417,7 +4552,7 @@
               </a:defRPr>
             </a:pPr>
             <a:r>
-              <a:t>• </a:t>
+              <a:t>• Is the Transmission Protection Instrument enough, or does the</a:t>
             </a:r>
           </a:p>
           <a:p>
@@ -4432,127 +4567,7 @@
               </a:defRPr>
             </a:pPr>
             <a:r>
-              <a:t>• FISCAL COORDINATION</a:t>
-            </a:r>
-          </a:p>
-          <a:p>
-            <a:pPr>
-              <a:spcAft>
-                <a:spcPts val="1000"/>
-              </a:spcAft>
-              <a:defRPr sz="1600">
-                <a:solidFill>
-                  <a:srgbClr val="505050"/>
-                </a:solidFill>
-              </a:defRPr>
-            </a:pPr>
-            <a:r>
-              <a:t>•   - Periphery remains structurally vulnerable (price takers)</a:t>
-            </a:r>
-          </a:p>
-          <a:p>
-            <a:pPr>
-              <a:spcAft>
-                <a:spcPts val="1000"/>
-              </a:spcAft>
-              <a:defRPr sz="1600">
-                <a:solidFill>
-                  <a:srgbClr val="505050"/>
-                </a:solidFill>
-              </a:defRPr>
-            </a:pPr>
-            <a:r>
-              <a:t>•   - Spain most sensitive to EA-wide shocks</a:t>
-            </a:r>
-          </a:p>
-          <a:p>
-            <a:pPr>
-              <a:spcAft>
-                <a:spcPts val="1000"/>
-              </a:spcAft>
-              <a:defRPr sz="1600">
-                <a:solidFill>
-                  <a:srgbClr val="505050"/>
-                </a:solidFill>
-              </a:defRPr>
-            </a:pPr>
-            <a:r>
-              <a:t>•   - French fiscal credibility now a systemic concern</a:t>
-            </a:r>
-          </a:p>
-          <a:p>
-            <a:pPr>
-              <a:spcAft>
-                <a:spcPts val="1000"/>
-              </a:spcAft>
-              <a:defRPr sz="1600">
-                <a:solidFill>
-                  <a:srgbClr val="505050"/>
-                </a:solidFill>
-              </a:defRPr>
-            </a:pPr>
-            <a:r>
-              <a:t>• </a:t>
-            </a:r>
-          </a:p>
-          <a:p>
-            <a:pPr>
-              <a:spcAft>
-                <a:spcPts val="1000"/>
-              </a:spcAft>
-              <a:defRPr sz="1600">
-                <a:solidFill>
-                  <a:srgbClr val="505050"/>
-                </a:solidFill>
-              </a:defRPr>
-            </a:pPr>
-            <a:r>
-              <a:t>• CRISIS PREPAREDNESS</a:t>
-            </a:r>
-          </a:p>
-          <a:p>
-            <a:pPr>
-              <a:spcAft>
-                <a:spcPts val="1000"/>
-              </a:spcAft>
-              <a:defRPr sz="1600">
-                <a:solidFill>
-                  <a:srgbClr val="505050"/>
-                </a:solidFill>
-              </a:defRPr>
-            </a:pPr>
-            <a:r>
-              <a:t>•   - Integration falls during idiosyncratic crises</a:t>
-            </a:r>
-          </a:p>
-          <a:p>
-            <a:pPr>
-              <a:spcAft>
-                <a:spcPts val="1000"/>
-              </a:spcAft>
-              <a:defRPr sz="1600">
-                <a:solidFill>
-                  <a:srgbClr val="505050"/>
-                </a:solidFill>
-              </a:defRPr>
-            </a:pPr>
-            <a:r>
-              <a:t>•   - Current high spillovers = vulnerability to common shocks</a:t>
-            </a:r>
-          </a:p>
-          <a:p>
-            <a:pPr>
-              <a:spcAft>
-                <a:spcPts val="1000"/>
-              </a:spcAft>
-              <a:defRPr sz="1600">
-                <a:solidFill>
-                  <a:srgbClr val="505050"/>
-                </a:solidFill>
-              </a:defRPr>
-            </a:pPr>
-            <a:r>
-              <a:t>•   - Japan decoupling reduces one external risk channel</a:t>
+              <a:t>• Euro Area need deeper fiscal integration?</a:t>
             </a:r>
           </a:p>
         </p:txBody>
@@ -4577,172 +4592,6 @@
       <p:grpSpPr/>
       <p:sp>
         <p:nvSpPr>
-          <p:cNvPr id="2" name="TextBox 1"/>
-          <p:cNvSpPr txBox="1"/>
-          <p:nvPr/>
-        </p:nvSpPr>
-        <p:spPr>
-          <a:xfrm>
-            <a:off x="365760" y="274320"/>
-            <a:ext cx="11430000" cy="731520"/>
-          </a:xfrm>
-          <a:prstGeom prst="rect">
-            <a:avLst/>
-          </a:prstGeom>
-          <a:noFill/>
-        </p:spPr>
-        <p:txBody>
-          <a:bodyPr wrap="none">
-            <a:spAutoFit/>
-          </a:bodyPr>
-          <a:lstStyle/>
-          <a:p>
-            <a:pPr>
-              <a:defRPr sz="3000" b="1">
-                <a:solidFill>
-                  <a:srgbClr val="003299"/>
-                </a:solidFill>
-              </a:defRPr>
-            </a:pPr>
-            <a:r>
-              <a:t>Open Questions for 2025 and Beyond</a:t>
-            </a:r>
-          </a:p>
-        </p:txBody>
-      </p:sp>
-      <p:sp>
-        <p:nvSpPr>
-          <p:cNvPr id="3" name="TextBox 2"/>
-          <p:cNvSpPr txBox="1"/>
-          <p:nvPr/>
-        </p:nvSpPr>
-        <p:spPr>
-          <a:xfrm>
-            <a:off x="365760" y="1097280"/>
-            <a:ext cx="11430000" cy="5303520"/>
-          </a:xfrm>
-          <a:prstGeom prst="rect">
-            <a:avLst/>
-          </a:prstGeom>
-          <a:noFill/>
-        </p:spPr>
-        <p:txBody>
-          <a:bodyPr wrap="square">
-            <a:spAutoFit/>
-          </a:bodyPr>
-          <a:lstStyle/>
-          <a:p>
-            <a:pPr>
-              <a:spcAft>
-                <a:spcPts val="1000"/>
-              </a:spcAft>
-              <a:defRPr sz="1600">
-                <a:solidFill>
-                  <a:srgbClr val="505050"/>
-                </a:solidFill>
-              </a:defRPr>
-            </a:pPr>
-            <a:r>
-              <a:t>• Will France remain the anchor despite political fragmentation?</a:t>
-            </a:r>
-          </a:p>
-          <a:p>
-            <a:pPr>
-              <a:spcAft>
-                <a:spcPts val="1000"/>
-              </a:spcAft>
-              <a:defRPr sz="1600">
-                <a:solidFill>
-                  <a:srgbClr val="505050"/>
-                </a:solidFill>
-              </a:defRPr>
-            </a:pPr>
-            <a:r>
-              <a:t>• How will ECB rate cuts affect the spillover structure?</a:t>
-            </a:r>
-          </a:p>
-          <a:p>
-            <a:pPr>
-              <a:spcAft>
-                <a:spcPts val="1000"/>
-              </a:spcAft>
-              <a:defRPr sz="1600">
-                <a:solidFill>
-                  <a:srgbClr val="505050"/>
-                </a:solidFill>
-              </a:defRPr>
-            </a:pPr>
-            <a:r>
-              <a:t>• Is Spain's vulnerability structural or cyclical?</a:t>
-            </a:r>
-          </a:p>
-          <a:p>
-            <a:pPr>
-              <a:spcAft>
-                <a:spcPts val="1000"/>
-              </a:spcAft>
-              <a:defRPr sz="1600">
-                <a:solidFill>
-                  <a:srgbClr val="505050"/>
-                </a:solidFill>
-              </a:defRPr>
-            </a:pPr>
-            <a:r>
-              <a:t>• Will Japanese normalization eventually re-engage global correlations?</a:t>
-            </a:r>
-          </a:p>
-          <a:p>
-            <a:pPr>
-              <a:spcAft>
-                <a:spcPts val="1000"/>
-              </a:spcAft>
-              <a:defRPr sz="1600">
-                <a:solidFill>
-                  <a:srgbClr val="505050"/>
-                </a:solidFill>
-              </a:defRPr>
-            </a:pPr>
-            <a:r>
-              <a:t>• What happens when the next idiosyncratic shock hits?</a:t>
-            </a:r>
-          </a:p>
-          <a:p>
-            <a:pPr>
-              <a:spcAft>
-                <a:spcPts val="1000"/>
-              </a:spcAft>
-              <a:defRPr sz="1600">
-                <a:solidFill>
-                  <a:srgbClr val="505050"/>
-                </a:solidFill>
-              </a:defRPr>
-            </a:pPr>
-            <a:r>
-              <a:t>• Is TPI enough, or does the EA need deeper fiscal integration?</a:t>
-            </a:r>
-          </a:p>
-        </p:txBody>
-      </p:sp>
-    </p:spTree>
-  </p:cSld>
-  <p:clrMapOvr>
-    <a:masterClrMapping/>
-  </p:clrMapOvr>
-</p:sld>
-</file>
-
-<file path=ppt/slides/slide18.xml><?xml version="1.0" encoding="utf-8"?>
-<p:sld xmlns:a="http://schemas.openxmlformats.org/drawingml/2006/main" xmlns:p="http://schemas.openxmlformats.org/presentationml/2006/main" xmlns:r="http://schemas.openxmlformats.org/officeDocument/2006/relationships">
-  <p:cSld>
-    <p:spTree>
-      <p:nvGrpSpPr>
-        <p:cNvPr id="1" name=""/>
-        <p:cNvGrpSpPr/>
-        <p:nvPr/>
-      </p:nvGrpSpPr>
-      <p:grpSpPr/>
-      <p:sp>
-        <p:nvSpPr>
           <p:cNvPr id="2" name="Rectangle 1"/>
           <p:cNvSpPr/>
           <p:nvPr/>
@@ -4849,16 +4698,16 @@
               </a:defRPr>
             </a:pPr>
             <a:r>
-              <a:t>Methodology: Diebold-Yilmaz Generalized FEVD (order-invariant)</a:t>
+              <a:t>Methodology: Diebold-Yilmaz Generalised Variance Decomposition</a:t>
             </a:r>
             <a:br/>
             <a:br/>
             <a:r>
-              <a:t>Data: Daily 10Y yields, 1995-2025</a:t>
+              <a:t>Data: Daily 10-year yields, 1995-2025</a:t>
             </a:r>
             <a:br/>
             <a:r>
-              <a:t>Countries: US, JP, UK, DE, FR, IT, ES</a:t>
+              <a:t>Countries: US, Japan, UK, Germany, France, Italy, Spain</a:t>
             </a:r>
           </a:p>
         </p:txBody>
@@ -5510,7 +5359,7 @@
               </a:defRPr>
             </a:pPr>
             <a:r>
-              <a:t>Five Key Findings</a:t>
+              <a:t>Four Key Findings</a:t>
             </a:r>
           </a:p>
         </p:txBody>
@@ -5598,14 +5447,14 @@
               </a:defRPr>
             </a:pPr>
             <a:r>
-              <a:t>France is the Hidden Anchor</a:t>
+              <a:t>France: The Pivot Between Core and Periphery</a:t>
             </a:r>
           </a:p>
         </p:txBody>
       </p:sp>
       <p:pic>
         <p:nvPicPr>
-          <p:cNvPr id="4" name="Picture 3" descr="fig02_net_spillovers.png"/>
+          <p:cNvPr id="4" name="Picture 3" descr="fig11_france_role.png"/>
           <p:cNvPicPr>
             <a:picLocks noChangeAspect="1"/>
           </p:cNvPicPr>
@@ -5675,7 +5524,7 @@
               </a:defRPr>
             </a:pPr>
             <a:r>
-              <a:t>• FR_net = +22.6 vs DE_net = +21.5 (full sample average)</a:t>
+              <a:t>• What does 'pivot' mean? France transmits shocks in BOTH directions:</a:t>
             </a:r>
           </a:p>
           <a:p>
@@ -5690,7 +5539,7 @@
               </a:defRPr>
             </a:pPr>
             <a:r>
-              <a:t>• The OAT market is the 'swing' market bridging core and periphery</a:t>
+              <a:t>•   → To Germany (core): ~22% of German yield variance</a:t>
             </a:r>
           </a:p>
           <a:p>
@@ -5705,7 +5554,7 @@
               </a:defRPr>
             </a:pPr>
             <a:r>
-              <a:t>• Despite 2024 political turmoil, France REMAINED a net transmitter</a:t>
+              <a:t>•   → To Italy/Spain (periphery): ~18% of their variance</a:t>
             </a:r>
           </a:p>
           <a:p>
@@ -5720,7 +5569,7 @@
               </a:defRPr>
             </a:pPr>
             <a:r>
-              <a:t>• FR-DE spread hit 87bp but contagion to periphery was contained</a:t>
+              <a:t>• This makes France the key link in the Euro Area yield system</a:t>
             </a:r>
           </a:p>
           <a:p>
@@ -5735,7 +5584,52 @@
               </a:defRPr>
             </a:pPr>
             <a:r>
-              <a:t>• Implication: ECB credibility (TPI) provides effective backstop</a:t>
+              <a:t>• When France moves, BOTH core and periphery follow</a:t>
+            </a:r>
+          </a:p>
+          <a:p>
+            <a:pPr>
+              <a:spcAft>
+                <a:spcPts val="800"/>
+              </a:spcAft>
+              <a:defRPr sz="1500">
+                <a:solidFill>
+                  <a:srgbClr val="505050"/>
+                </a:solidFill>
+              </a:defRPr>
+            </a:pPr>
+            <a:r>
+              <a:t>• 2024 political crisis: FR-DE spread hit 87bp, but France</a:t>
+            </a:r>
+          </a:p>
+          <a:p>
+            <a:pPr>
+              <a:spcAft>
+                <a:spcPts val="800"/>
+              </a:spcAft>
+              <a:defRPr sz="1500">
+                <a:solidFill>
+                  <a:srgbClr val="505050"/>
+                </a:solidFill>
+              </a:defRPr>
+            </a:pPr>
+            <a:r>
+              <a:t>• remained a net transmitter (average +29, always positive)</a:t>
+            </a:r>
+          </a:p>
+          <a:p>
+            <a:pPr>
+              <a:spcAft>
+                <a:spcPts val="800"/>
+              </a:spcAft>
+              <a:defRPr sz="1500">
+                <a:solidFill>
+                  <a:srgbClr val="505050"/>
+                </a:solidFill>
+              </a:defRPr>
+            </a:pPr>
+            <a:r>
+              <a:t>• Key insight: ECB credibility contained contagion to periphery</a:t>
             </a:r>
           </a:p>
         </p:txBody>
@@ -5900,7 +5794,7 @@
               </a:defRPr>
             </a:pPr>
             <a:r>
-              <a:t>• ES_net = -39.0 (receives far more spillovers than it transmits)</a:t>
+              <a:t>• Net spillover position = -39 (receives far more than it transmits)</a:t>
             </a:r>
           </a:p>
           <a:p>
@@ -5915,7 +5809,7 @@
               </a:defRPr>
             </a:pPr>
             <a:r>
-              <a:t>• During tightening (2022+): Spain receives 83.5% of variance from others</a:t>
+              <a:t>• During tightening (2022+): Spain receives 83% of variance from others</a:t>
             </a:r>
           </a:p>
           <a:p>
@@ -5930,7 +5824,7 @@
               </a:defRPr>
             </a:pPr>
             <a:r>
-              <a:t>• More vulnerable than Italy (ES_from = 67% vs IT_from = 61%)</a:t>
+              <a:t>• More vulnerable than Italy (ES receives 67% vs IT receives 61%)</a:t>
             </a:r>
           </a:p>
           <a:p>
@@ -5960,7 +5854,22 @@
               </a:defRPr>
             </a:pPr>
             <a:r>
-              <a:t>• Policy implication: Spanish fiscal credibility matters less for EA dynamics</a:t>
+              <a:t>• Policy implication: Spanish yields tell you about EA conditions,</a:t>
+            </a:r>
+          </a:p>
+          <a:p>
+            <a:pPr>
+              <a:spcAft>
+                <a:spcPts val="800"/>
+              </a:spcAft>
+              <a:defRPr sz="1500">
+                <a:solidFill>
+                  <a:srgbClr val="505050"/>
+                </a:solidFill>
+              </a:defRPr>
+            </a:pPr>
+            <a:r>
+              <a:t>• but Spanish fiscal policy has limited impact on EA dynamics</a:t>
             </a:r>
           </a:p>
         </p:txBody>
@@ -6048,7 +5957,7 @@
               </a:defRPr>
             </a:pPr>
             <a:r>
-              <a:t>EA Dynamics are Mostly Internal</a:t>
+              <a:t>Euro Area Dynamics are Mostly Internal</a:t>
             </a:r>
           </a:p>
         </p:txBody>
@@ -6155,7 +6064,7 @@
               </a:defRPr>
             </a:pPr>
             <a:r>
-              <a:t>• But even at peak, US &lt; intra-EA transmission</a:t>
+              <a:t>• But even at peak, US influence &lt; intra-EA transmission</a:t>
             </a:r>
           </a:p>
           <a:p>
@@ -6186,6 +6095,21 @@
             </a:pPr>
             <a:r>
               <a:t>• Implication: ECB policy is the primary driver of EA yield dynamics</a:t>
+            </a:r>
+          </a:p>
+          <a:p>
+            <a:pPr>
+              <a:spcAft>
+                <a:spcPts val="800"/>
+              </a:spcAft>
+              <a:defRPr sz="1500">
+                <a:solidFill>
+                  <a:srgbClr val="505050"/>
+                </a:solidFill>
+              </a:defRPr>
+            </a:pPr>
+            <a:r>
+              <a:t>• External shocks matter, but the EA is largely self-referential</a:t>
             </a:r>
           </a:p>
         </p:txBody>

</xml_diff>

<commit_message>
Add clear bar chart showing Japan decoupling evidence
- Create fig12_japan_decoupling.png with period averages
- Shows JP→EA spillover fell 58% from YCC era (2.7%) to post-YCC (1.1%)
- Side-by-side with US for contrast (US increased while Japan decreased)
- Update policymaker deck with clearer visualization
</commit_message>
<xml_diff>
--- a/comprehensive_analysis/Bond_Spillovers_Policymaker_Deck.pptx
+++ b/comprehensive_analysis/Bond_Spillovers_Policymaker_Deck.pptx
@@ -3314,203 +3314,203 @@
           </a:p>
         </p:txBody>
       </p:sp>
+      <p:sp>
+        <p:nvSpPr>
+          <p:cNvPr id="5" name="TextBox 4"/>
+          <p:cNvSpPr txBox="1"/>
+          <p:nvPr/>
+        </p:nvSpPr>
+        <p:spPr>
+          <a:xfrm>
+            <a:off x="365760" y="1097280"/>
+            <a:ext cx="4572000" cy="5303520"/>
+          </a:xfrm>
+          <a:prstGeom prst="rect">
+            <a:avLst/>
+          </a:prstGeom>
+          <a:noFill/>
+        </p:spPr>
+        <p:txBody>
+          <a:bodyPr wrap="square">
+            <a:spAutoFit/>
+          </a:bodyPr>
+          <a:lstStyle/>
+          <a:p>
+            <a:pPr>
+              <a:spcAft>
+                <a:spcPts val="800"/>
+              </a:spcAft>
+              <a:defRPr sz="1500">
+                <a:solidFill>
+                  <a:srgbClr val="505050"/>
+                </a:solidFill>
+              </a:defRPr>
+            </a:pPr>
+            <a:r>
+              <a:t>• Background: Bank of Japan's Yield Curve Control (2016-2024)</a:t>
+            </a:r>
+          </a:p>
+          <a:p>
+            <a:pPr>
+              <a:spcAft>
+                <a:spcPts val="800"/>
+              </a:spcAft>
+              <a:defRPr sz="1500">
+                <a:solidFill>
+                  <a:srgbClr val="505050"/>
+                </a:solidFill>
+              </a:defRPr>
+            </a:pPr>
+            <a:r>
+              <a:t>•   - Capped 10-year yields near 0% for 8 years</a:t>
+            </a:r>
+          </a:p>
+          <a:p>
+            <a:pPr>
+              <a:spcAft>
+                <a:spcPts val="800"/>
+              </a:spcAft>
+              <a:defRPr sz="1500">
+                <a:solidFill>
+                  <a:srgbClr val="505050"/>
+                </a:solidFill>
+              </a:defRPr>
+            </a:pPr>
+            <a:r>
+              <a:t>•   - Ended negative interest rates in March 2024</a:t>
+            </a:r>
+          </a:p>
+          <a:p>
+            <a:pPr>
+              <a:spcAft>
+                <a:spcPts val="800"/>
+              </a:spcAft>
+              <a:defRPr sz="1500">
+                <a:solidFill>
+                  <a:srgbClr val="505050"/>
+                </a:solidFill>
+              </a:defRPr>
+            </a:pPr>
+            <a:r>
+              <a:t>• Japanese yields: 0.10% (during controls) → 1.25% (after exit)</a:t>
+            </a:r>
+          </a:p>
+          <a:p>
+            <a:pPr>
+              <a:spcAft>
+                <a:spcPts val="800"/>
+              </a:spcAft>
+              <a:defRPr sz="1500">
+                <a:solidFill>
+                  <a:srgbClr val="505050"/>
+                </a:solidFill>
+              </a:defRPr>
+            </a:pPr>
+            <a:r>
+              <a:t>• First real Japanese yield steepening in 30 years</a:t>
+            </a:r>
+          </a:p>
+          <a:p>
+            <a:pPr>
+              <a:spcAft>
+                <a:spcPts val="800"/>
+              </a:spcAft>
+              <a:defRPr sz="1500">
+                <a:solidFill>
+                  <a:srgbClr val="505050"/>
+                </a:solidFill>
+              </a:defRPr>
+            </a:pPr>
+            <a:r>
+              <a:t>• PARADOX: Higher Japanese yields = LESS spillover to EA</a:t>
+            </a:r>
+          </a:p>
+          <a:p>
+            <a:pPr>
+              <a:spcAft>
+                <a:spcPts val="800"/>
+              </a:spcAft>
+              <a:defRPr sz="1500">
+                <a:solidFill>
+                  <a:srgbClr val="505050"/>
+                </a:solidFill>
+              </a:defRPr>
+            </a:pPr>
+            <a:r>
+              <a:t>• Japan→EA spillover fell from 3.7% to 1.2% after policy exit</a:t>
+            </a:r>
+          </a:p>
+          <a:p>
+            <a:pPr>
+              <a:spcAft>
+                <a:spcPts val="800"/>
+              </a:spcAft>
+              <a:defRPr sz="1500">
+                <a:solidFill>
+                  <a:srgbClr val="505050"/>
+                </a:solidFill>
+              </a:defRPr>
+            </a:pPr>
+            <a:r>
+              <a:t>• Interpretation: Yield controls forced Japan to track global rates</a:t>
+            </a:r>
+          </a:p>
+          <a:p>
+            <a:pPr>
+              <a:spcAft>
+                <a:spcPts val="800"/>
+              </a:spcAft>
+              <a:defRPr sz="1500">
+                <a:solidFill>
+                  <a:srgbClr val="505050"/>
+                </a:solidFill>
+              </a:defRPr>
+            </a:pPr>
+            <a:r>
+              <a:t>• Once freed, Japanese bonds now move independently</a:t>
+            </a:r>
+          </a:p>
+          <a:p>
+            <a:pPr>
+              <a:spcAft>
+                <a:spcPts val="800"/>
+              </a:spcAft>
+              <a:defRPr sz="1500">
+                <a:solidFill>
+                  <a:srgbClr val="505050"/>
+                </a:solidFill>
+              </a:defRPr>
+            </a:pPr>
+            <a:r>
+              <a:t>• For EA policymakers: One less external transmission channel</a:t>
+            </a:r>
+          </a:p>
+        </p:txBody>
+      </p:sp>
       <p:pic>
         <p:nvPicPr>
-          <p:cNvPr id="4" name="Picture 3" descr="fig04_external_breakdown.png"/>
+          <p:cNvPr id="6" name="Picture 5" descr="fig12_japan_decoupling.png"/>
           <p:cNvPicPr>
             <a:picLocks noChangeAspect="1"/>
           </p:cNvPicPr>
           <p:nvPr/>
         </p:nvPicPr>
         <p:blipFill>
-          <a:blip r:embed="rId2"/>
+          <a:blip r:embed="rId3"/>
           <a:stretch>
             <a:fillRect/>
           </a:stretch>
         </p:blipFill>
         <p:spPr>
           <a:xfrm>
-            <a:off x="5303520" y="1097280"/>
-            <a:ext cx="6583680" cy="5120640"/>
+            <a:off x="4389120" y="1188720"/>
+            <a:ext cx="4572000" cy="1615985"/>
           </a:xfrm>
           <a:prstGeom prst="rect">
             <a:avLst/>
           </a:prstGeom>
         </p:spPr>
       </p:pic>
-      <p:sp>
-        <p:nvSpPr>
-          <p:cNvPr id="5" name="TextBox 4"/>
-          <p:cNvSpPr txBox="1"/>
-          <p:nvPr/>
-        </p:nvSpPr>
-        <p:spPr>
-          <a:xfrm>
-            <a:off x="365760" y="1097280"/>
-            <a:ext cx="4572000" cy="5303520"/>
-          </a:xfrm>
-          <a:prstGeom prst="rect">
-            <a:avLst/>
-          </a:prstGeom>
-          <a:noFill/>
-        </p:spPr>
-        <p:txBody>
-          <a:bodyPr wrap="square">
-            <a:spAutoFit/>
-          </a:bodyPr>
-          <a:lstStyle/>
-          <a:p>
-            <a:pPr>
-              <a:spcAft>
-                <a:spcPts val="800"/>
-              </a:spcAft>
-              <a:defRPr sz="1500">
-                <a:solidFill>
-                  <a:srgbClr val="505050"/>
-                </a:solidFill>
-              </a:defRPr>
-            </a:pPr>
-            <a:r>
-              <a:t>• Background: Bank of Japan's Yield Curve Control (2016-2024)</a:t>
-            </a:r>
-          </a:p>
-          <a:p>
-            <a:pPr>
-              <a:spcAft>
-                <a:spcPts val="800"/>
-              </a:spcAft>
-              <a:defRPr sz="1500">
-                <a:solidFill>
-                  <a:srgbClr val="505050"/>
-                </a:solidFill>
-              </a:defRPr>
-            </a:pPr>
-            <a:r>
-              <a:t>•   - Capped 10-year yields near 0% for 8 years</a:t>
-            </a:r>
-          </a:p>
-          <a:p>
-            <a:pPr>
-              <a:spcAft>
-                <a:spcPts val="800"/>
-              </a:spcAft>
-              <a:defRPr sz="1500">
-                <a:solidFill>
-                  <a:srgbClr val="505050"/>
-                </a:solidFill>
-              </a:defRPr>
-            </a:pPr>
-            <a:r>
-              <a:t>•   - Ended negative interest rates in March 2024</a:t>
-            </a:r>
-          </a:p>
-          <a:p>
-            <a:pPr>
-              <a:spcAft>
-                <a:spcPts val="800"/>
-              </a:spcAft>
-              <a:defRPr sz="1500">
-                <a:solidFill>
-                  <a:srgbClr val="505050"/>
-                </a:solidFill>
-              </a:defRPr>
-            </a:pPr>
-            <a:r>
-              <a:t>• Japanese yields: 0.10% (during controls) → 1.25% (after exit)</a:t>
-            </a:r>
-          </a:p>
-          <a:p>
-            <a:pPr>
-              <a:spcAft>
-                <a:spcPts val="800"/>
-              </a:spcAft>
-              <a:defRPr sz="1500">
-                <a:solidFill>
-                  <a:srgbClr val="505050"/>
-                </a:solidFill>
-              </a:defRPr>
-            </a:pPr>
-            <a:r>
-              <a:t>• First real Japanese yield steepening in 30 years</a:t>
-            </a:r>
-          </a:p>
-          <a:p>
-            <a:pPr>
-              <a:spcAft>
-                <a:spcPts val="800"/>
-              </a:spcAft>
-              <a:defRPr sz="1500">
-                <a:solidFill>
-                  <a:srgbClr val="505050"/>
-                </a:solidFill>
-              </a:defRPr>
-            </a:pPr>
-            <a:r>
-              <a:t>• PARADOX: Higher Japanese yields = LESS spillover to EA</a:t>
-            </a:r>
-          </a:p>
-          <a:p>
-            <a:pPr>
-              <a:spcAft>
-                <a:spcPts val="800"/>
-              </a:spcAft>
-              <a:defRPr sz="1500">
-                <a:solidFill>
-                  <a:srgbClr val="505050"/>
-                </a:solidFill>
-              </a:defRPr>
-            </a:pPr>
-            <a:r>
-              <a:t>• Japan→EA spillover fell from 3.7% to 1.2% after policy exit</a:t>
-            </a:r>
-          </a:p>
-          <a:p>
-            <a:pPr>
-              <a:spcAft>
-                <a:spcPts val="800"/>
-              </a:spcAft>
-              <a:defRPr sz="1500">
-                <a:solidFill>
-                  <a:srgbClr val="505050"/>
-                </a:solidFill>
-              </a:defRPr>
-            </a:pPr>
-            <a:r>
-              <a:t>• Interpretation: Yield controls forced Japan to track global rates</a:t>
-            </a:r>
-          </a:p>
-          <a:p>
-            <a:pPr>
-              <a:spcAft>
-                <a:spcPts val="800"/>
-              </a:spcAft>
-              <a:defRPr sz="1500">
-                <a:solidFill>
-                  <a:srgbClr val="505050"/>
-                </a:solidFill>
-              </a:defRPr>
-            </a:pPr>
-            <a:r>
-              <a:t>• Once freed, Japanese bonds now move independently</a:t>
-            </a:r>
-          </a:p>
-          <a:p>
-            <a:pPr>
-              <a:spcAft>
-                <a:spcPts val="800"/>
-              </a:spcAft>
-              <a:defRPr sz="1500">
-                <a:solidFill>
-                  <a:srgbClr val="505050"/>
-                </a:solidFill>
-              </a:defRPr>
-            </a:pPr>
-            <a:r>
-              <a:t>• For EA policymakers: One less external transmission channel</a:t>
-            </a:r>
-          </a:p>
-        </p:txBody>
-      </p:sp>
     </p:spTree>
   </p:cSld>
   <p:clrMapOvr>

</xml_diff>

<commit_message>
Improve presentation clarity and remove redundancy
- Remove cover slide and 'Story in Numbers' slide
- Clean spillover index chart (remove vertical event lines)
- Stack Japan charts vertically on RHS (enlarged)
- Fix French slide narrative flow (establish pivot, then explain)
- Use distinct charts for French slides (fig11 vs fig13)
- Create focused FR-DE spread 2024 chart for political risk slide
</commit_message>
<xml_diff>
--- a/comprehensive_analysis/Bond_Spillovers_Policymaker_Deck.pptx
+++ b/comprehensive_analysis/Bond_Spillovers_Policymaker_Deck.pptx
@@ -5,8 +5,6 @@
     <p:sldMasterId id="2147483648" r:id="rId1"/>
   </p:sldMasterIdLst>
   <p:sldIdLst>
-    <p:sldId id="256" r:id="rId7"/>
-    <p:sldId id="257" r:id="rId8"/>
     <p:sldId id="258" r:id="rId9"/>
     <p:sldId id="259" r:id="rId10"/>
     <p:sldId id="260" r:id="rId11"/>
@@ -3113,7 +3111,7 @@
         <p:spPr>
           <a:xfrm>
             <a:off x="0" y="0"/>
-            <a:ext cx="12191695" cy="274320"/>
+            <a:ext cx="12191695" cy="6858000"/>
           </a:xfrm>
           <a:prstGeom prst="rect">
             <a:avLst/>
@@ -3155,8 +3153,8 @@
         </p:nvSpPr>
         <p:spPr>
           <a:xfrm>
-            <a:off x="457200" y="2011680"/>
-            <a:ext cx="11277295" cy="1371600"/>
+            <a:off x="457200" y="2286000"/>
+            <a:ext cx="11277295" cy="914400"/>
           </a:xfrm>
           <a:prstGeom prst="rect">
             <a:avLst/>
@@ -3170,14 +3168,14 @@
           <a:lstStyle/>
           <a:p>
             <a:pPr algn="ctr">
-              <a:defRPr sz="4400" b="1">
-                <a:solidFill>
-                  <a:srgbClr val="003299"/>
-                </a:solidFill>
-              </a:defRPr>
-            </a:pPr>
-            <a:r>
-              <a:t>Euro Area Bond Yield Spillovers</a:t>
+              <a:defRPr sz="7200" b="1">
+                <a:solidFill>
+                  <a:srgbClr val="FFFFFF"/>
+                </a:solidFill>
+              </a:defRPr>
+            </a:pPr>
+            <a:r>
+              <a:t>I</a:t>
             </a:r>
           </a:p>
         </p:txBody>
@@ -3190,7 +3188,7 @@
         </p:nvSpPr>
         <p:spPr>
           <a:xfrm>
-            <a:off x="457200" y="3657600"/>
+            <a:off x="457200" y="3200400"/>
             <a:ext cx="11277295" cy="1371600"/>
           </a:xfrm>
           <a:prstGeom prst="rect">
@@ -3205,23 +3203,14 @@
           <a:lstStyle/>
           <a:p>
             <a:pPr algn="ctr">
-              <a:defRPr sz="2200">
-                <a:solidFill>
-                  <a:srgbClr val="505050"/>
-                </a:solidFill>
-              </a:defRPr>
-            </a:pPr>
-            <a:r>
-              <a:t>From Convergence to Fragmentation and Back:</a:t>
-            </a:r>
-            <a:br/>
-            <a:r>
-              <a:t>Lessons from 30 Years of Market Integration</a:t>
-            </a:r>
-            <a:br/>
-            <a:br/>
-            <a:r>
-              <a:t>January 2025</a:t>
+              <a:defRPr sz="4000" b="1">
+                <a:solidFill>
+                  <a:srgbClr val="FFFFFF"/>
+                </a:solidFill>
+              </a:defRPr>
+            </a:pPr>
+            <a:r>
+              <a:t>The Historical Arc</a:t>
             </a:r>
           </a:p>
         </p:txBody>
@@ -3253,7 +3242,7 @@
         <p:spPr>
           <a:xfrm>
             <a:off x="365760" y="274320"/>
-            <a:ext cx="914400" cy="731520"/>
+            <a:ext cx="11430000" cy="731520"/>
           </a:xfrm>
           <a:prstGeom prst="rect">
             <a:avLst/>
@@ -3267,28 +3256,28 @@
           <a:lstStyle/>
           <a:p>
             <a:pPr>
-              <a:defRPr sz="3600" b="1">
-                <a:solidFill>
-                  <a:srgbClr val="007816"/>
-                </a:solidFill>
-              </a:defRPr>
-            </a:pPr>
-            <a:r>
-              <a:t>#4</a:t>
-            </a:r>
-          </a:p>
-        </p:txBody>
-      </p:sp>
-      <p:sp>
-        <p:nvSpPr>
-          <p:cNvPr id="3" name="TextBox 2"/>
+              <a:defRPr sz="3000" b="1">
+                <a:solidFill>
+                  <a:srgbClr val="003299"/>
+                </a:solidFill>
+              </a:defRPr>
+            </a:pPr>
+            <a:r>
+              <a:t>French Political Risk: Contained but Elevated</a:t>
+            </a:r>
+          </a:p>
+        </p:txBody>
+      </p:sp>
+      <p:sp>
+        <p:nvSpPr>
+          <p:cNvPr id="4" name="TextBox 3"/>
           <p:cNvSpPr txBox="1"/>
           <p:nvPr/>
         </p:nvSpPr>
         <p:spPr>
           <a:xfrm>
-            <a:off x="1371600" y="320040"/>
-            <a:ext cx="10058400" cy="731520"/>
+            <a:off x="365760" y="1097280"/>
+            <a:ext cx="4754880" cy="5303520"/>
           </a:xfrm>
           <a:prstGeom prst="rect">
             <a:avLst/>
@@ -3296,41 +3285,6 @@
           <a:noFill/>
         </p:spPr>
         <p:txBody>
-          <a:bodyPr wrap="none">
-            <a:spAutoFit/>
-          </a:bodyPr>
-          <a:lstStyle/>
-          <a:p>
-            <a:pPr>
-              <a:defRPr sz="2800" b="1">
-                <a:solidFill>
-                  <a:srgbClr val="003299"/>
-                </a:solidFill>
-              </a:defRPr>
-            </a:pPr>
-            <a:r>
-              <a:t>Japan: The Decoupling After Yield Curve Control</a:t>
-            </a:r>
-          </a:p>
-        </p:txBody>
-      </p:sp>
-      <p:sp>
-        <p:nvSpPr>
-          <p:cNvPr id="5" name="TextBox 4"/>
-          <p:cNvSpPr txBox="1"/>
-          <p:nvPr/>
-        </p:nvSpPr>
-        <p:spPr>
-          <a:xfrm>
-            <a:off x="365760" y="1097280"/>
-            <a:ext cx="4572000" cy="5303520"/>
-          </a:xfrm>
-          <a:prstGeom prst="rect">
-            <a:avLst/>
-          </a:prstGeom>
-          <a:noFill/>
-        </p:spPr>
-        <p:txBody>
           <a:bodyPr wrap="square">
             <a:spAutoFit/>
           </a:bodyPr>
@@ -3338,158 +3292,158 @@
           <a:p>
             <a:pPr>
               <a:spcAft>
-                <a:spcPts val="800"/>
+                <a:spcPts val="1000"/>
               </a:spcAft>
-              <a:defRPr sz="1500">
-                <a:solidFill>
-                  <a:srgbClr val="505050"/>
-                </a:solidFill>
-              </a:defRPr>
-            </a:pPr>
-            <a:r>
-              <a:t>• Background: Bank of Japan's Yield Curve Control (2016-2024)</a:t>
+              <a:defRPr sz="1600">
+                <a:solidFill>
+                  <a:srgbClr val="505050"/>
+                </a:solidFill>
+              </a:defRPr>
+            </a:pPr>
+            <a:r>
+              <a:t>• FR-DE spread widened from 50bp to 87bp during 2024 turmoil</a:t>
             </a:r>
           </a:p>
           <a:p>
             <a:pPr>
               <a:spcAft>
-                <a:spcPts val="800"/>
+                <a:spcPts val="1000"/>
               </a:spcAft>
-              <a:defRPr sz="1500">
-                <a:solidFill>
-                  <a:srgbClr val="505050"/>
-                </a:solidFill>
-              </a:defRPr>
-            </a:pPr>
-            <a:r>
-              <a:t>•   - Capped 10-year yields near 0% for 8 years</a:t>
+              <a:defRPr sz="1600">
+                <a:solidFill>
+                  <a:srgbClr val="505050"/>
+                </a:solidFill>
+              </a:defRPr>
+            </a:pPr>
+            <a:r>
+              <a:t>• Peak spread on December 2, 2024 after Barnier government fell</a:t>
             </a:r>
           </a:p>
           <a:p>
             <a:pPr>
               <a:spcAft>
-                <a:spcPts val="800"/>
+                <a:spcPts val="1000"/>
               </a:spcAft>
-              <a:defRPr sz="1500">
-                <a:solidFill>
-                  <a:srgbClr val="505050"/>
-                </a:solidFill>
-              </a:defRPr>
-            </a:pPr>
-            <a:r>
-              <a:t>•   - Ended negative interest rates in March 2024</a:t>
+              <a:defRPr sz="1600">
+                <a:solidFill>
+                  <a:srgbClr val="505050"/>
+                </a:solidFill>
+              </a:defRPr>
+            </a:pPr>
+            <a:r>
+              <a:t>• Critical finding: France REMAINED a net transmitter throughout</a:t>
             </a:r>
           </a:p>
           <a:p>
             <a:pPr>
               <a:spcAft>
-                <a:spcPts val="800"/>
+                <a:spcPts val="1000"/>
               </a:spcAft>
-              <a:defRPr sz="1500">
-                <a:solidFill>
-                  <a:srgbClr val="505050"/>
-                </a:solidFill>
-              </a:defRPr>
-            </a:pPr>
-            <a:r>
-              <a:t>• Japanese yields: 0.10% (during controls) → 1.25% (after exit)</a:t>
+              <a:defRPr sz="1600">
+                <a:solidFill>
+                  <a:srgbClr val="505050"/>
+                </a:solidFill>
+              </a:defRPr>
+            </a:pPr>
+            <a:r>
+              <a:t>•   - Pre-crisis average: +36 (strong transmitter)</a:t>
             </a:r>
           </a:p>
           <a:p>
             <a:pPr>
               <a:spcAft>
-                <a:spcPts val="800"/>
+                <a:spcPts val="1000"/>
               </a:spcAft>
-              <a:defRPr sz="1500">
-                <a:solidFill>
-                  <a:srgbClr val="505050"/>
-                </a:solidFill>
-              </a:defRPr>
-            </a:pPr>
-            <a:r>
-              <a:t>• First real Japanese yield steepening in 30 years</a:t>
+              <a:defRPr sz="1600">
+                <a:solidFill>
+                  <a:srgbClr val="505050"/>
+                </a:solidFill>
+              </a:defRPr>
+            </a:pPr>
+            <a:r>
+              <a:t>•   - Post-crisis average: +29 (still positive)</a:t>
             </a:r>
           </a:p>
           <a:p>
             <a:pPr>
               <a:spcAft>
-                <a:spcPts val="800"/>
+                <a:spcPts val="1000"/>
               </a:spcAft>
-              <a:defRPr sz="1500">
-                <a:solidFill>
-                  <a:srgbClr val="505050"/>
-                </a:solidFill>
-              </a:defRPr>
-            </a:pPr>
-            <a:r>
-              <a:t>• PARADOX: Higher Japanese yields = LESS spillover to EA</a:t>
+              <a:defRPr sz="1600">
+                <a:solidFill>
+                  <a:srgbClr val="505050"/>
+                </a:solidFill>
+              </a:defRPr>
+            </a:pPr>
+            <a:r>
+              <a:t>• Contagion to periphery was LIMITED:</a:t>
             </a:r>
           </a:p>
           <a:p>
             <a:pPr>
               <a:spcAft>
-                <a:spcPts val="800"/>
+                <a:spcPts val="1000"/>
               </a:spcAft>
-              <a:defRPr sz="1500">
-                <a:solidFill>
-                  <a:srgbClr val="505050"/>
-                </a:solidFill>
-              </a:defRPr>
-            </a:pPr>
-            <a:r>
-              <a:t>• Japan→EA spillover fell from 3.7% to 1.2% after policy exit</a:t>
+              <a:defRPr sz="1600">
+                <a:solidFill>
+                  <a:srgbClr val="505050"/>
+                </a:solidFill>
+              </a:defRPr>
+            </a:pPr>
+            <a:r>
+              <a:t>•   - France→Italy spillover: stable at 21-22%</a:t>
             </a:r>
           </a:p>
           <a:p>
             <a:pPr>
               <a:spcAft>
-                <a:spcPts val="800"/>
+                <a:spcPts val="1000"/>
               </a:spcAft>
-              <a:defRPr sz="1500">
-                <a:solidFill>
-                  <a:srgbClr val="505050"/>
-                </a:solidFill>
-              </a:defRPr>
-            </a:pPr>
-            <a:r>
-              <a:t>• Interpretation: Yield controls forced Japan to track global rates</a:t>
+              <a:defRPr sz="1600">
+                <a:solidFill>
+                  <a:srgbClr val="505050"/>
+                </a:solidFill>
+              </a:defRPr>
+            </a:pPr>
+            <a:r>
+              <a:t>•   - France→Spain spillover: stable at 18-19%</a:t>
             </a:r>
           </a:p>
           <a:p>
             <a:pPr>
               <a:spcAft>
-                <a:spcPts val="800"/>
+                <a:spcPts val="1000"/>
               </a:spcAft>
-              <a:defRPr sz="1500">
-                <a:solidFill>
-                  <a:srgbClr val="505050"/>
-                </a:solidFill>
-              </a:defRPr>
-            </a:pPr>
-            <a:r>
-              <a:t>• Once freed, Japanese bonds now move independently</a:t>
+              <a:defRPr sz="1600">
+                <a:solidFill>
+                  <a:srgbClr val="505050"/>
+                </a:solidFill>
+              </a:defRPr>
+            </a:pPr>
+            <a:r>
+              <a:t>• ECB's Transmission Protection Instrument appears credible</a:t>
             </a:r>
           </a:p>
           <a:p>
             <a:pPr>
               <a:spcAft>
-                <a:spcPts val="800"/>
+                <a:spcPts val="1000"/>
               </a:spcAft>
-              <a:defRPr sz="1500">
-                <a:solidFill>
-                  <a:srgbClr val="505050"/>
-                </a:solidFill>
-              </a:defRPr>
-            </a:pPr>
-            <a:r>
-              <a:t>• For EA policymakers: One less external transmission channel</a:t>
+              <a:defRPr sz="1600">
+                <a:solidFill>
+                  <a:srgbClr val="505050"/>
+                </a:solidFill>
+              </a:defRPr>
+            </a:pPr>
+            <a:r>
+              <a:t>• But: Elevated spreads suggest underlying fragility remains</a:t>
             </a:r>
           </a:p>
         </p:txBody>
       </p:sp>
       <p:pic>
         <p:nvPicPr>
-          <p:cNvPr id="6" name="Picture 5" descr="fig12_japan_decoupling.png"/>
+          <p:cNvPr id="5" name="Picture 4" descr="fig13_fr_de_spread_2024.png"/>
           <p:cNvPicPr>
             <a:picLocks noChangeAspect="1"/>
           </p:cNvPicPr>
@@ -3503,8 +3457,8 @@
         </p:blipFill>
         <p:spPr>
           <a:xfrm>
-            <a:off x="4389120" y="1188720"/>
-            <a:ext cx="4572000" cy="1615985"/>
+            <a:off x="4572000" y="914400"/>
+            <a:ext cx="4572000" cy="2857013"/>
           </a:xfrm>
           <a:prstGeom prst="rect">
             <a:avLst/>
@@ -3531,57 +3485,14 @@
       <p:grpSpPr/>
       <p:sp>
         <p:nvSpPr>
-          <p:cNvPr id="2" name="Rectangle 1"/>
-          <p:cNvSpPr/>
-          <p:nvPr/>
-        </p:nvSpPr>
-        <p:spPr>
-          <a:xfrm>
-            <a:off x="0" y="0"/>
-            <a:ext cx="12191695" cy="6858000"/>
-          </a:xfrm>
-          <a:prstGeom prst="rect">
-            <a:avLst/>
-          </a:prstGeom>
-          <a:solidFill>
-            <a:srgbClr val="003299"/>
-          </a:solidFill>
-          <a:ln>
-            <a:noFill/>
-          </a:ln>
-        </p:spPr>
-        <p:style>
-          <a:lnRef idx="1">
-            <a:schemeClr val="accent1"/>
-          </a:lnRef>
-          <a:fillRef idx="3">
-            <a:schemeClr val="accent1"/>
-          </a:fillRef>
-          <a:effectRef idx="2">
-            <a:schemeClr val="accent1"/>
-          </a:effectRef>
-          <a:fontRef idx="minor">
-            <a:schemeClr val="lt1"/>
-          </a:fontRef>
-        </p:style>
-        <p:txBody>
-          <a:bodyPr rtlCol="0" anchor="ctr"/>
-          <a:lstStyle/>
-          <a:p>
-            <a:pPr algn="ctr"/>
-          </a:p>
-        </p:txBody>
-      </p:sp>
-      <p:sp>
-        <p:nvSpPr>
-          <p:cNvPr id="3" name="TextBox 2"/>
+          <p:cNvPr id="2" name="TextBox 1"/>
           <p:cNvSpPr txBox="1"/>
           <p:nvPr/>
         </p:nvSpPr>
         <p:spPr>
           <a:xfrm>
-            <a:off x="457200" y="2286000"/>
-            <a:ext cx="11277295" cy="914400"/>
+            <a:off x="365760" y="182880"/>
+            <a:ext cx="11430000" cy="640080"/>
           </a:xfrm>
           <a:prstGeom prst="rect">
             <a:avLst/>
@@ -3594,19 +3505,43 @@
           </a:bodyPr>
           <a:lstStyle/>
           <a:p>
-            <a:pPr algn="ctr">
-              <a:defRPr sz="7200" b="1">
-                <a:solidFill>
-                  <a:srgbClr val="FFFFFF"/>
-                </a:solidFill>
-              </a:defRPr>
-            </a:pPr>
-            <a:r>
-              <a:t>III</a:t>
-            </a:r>
-          </a:p>
-        </p:txBody>
-      </p:sp>
+            <a:pPr>
+              <a:defRPr sz="2600" b="1">
+                <a:solidFill>
+                  <a:srgbClr val="003299"/>
+                </a:solidFill>
+              </a:defRPr>
+            </a:pPr>
+            <a:r>
+              <a:t>Who Affects Whom: The Bilateral Picture</a:t>
+            </a:r>
+          </a:p>
+        </p:txBody>
+      </p:sp>
+      <p:pic>
+        <p:nvPicPr>
+          <p:cNvPr id="3" name="Picture 2" descr="fig08_bilateral_heatmaps.png"/>
+          <p:cNvPicPr>
+            <a:picLocks noChangeAspect="1"/>
+          </p:cNvPicPr>
+          <p:nvPr/>
+        </p:nvPicPr>
+        <p:blipFill>
+          <a:blip r:embed="rId2"/>
+          <a:stretch>
+            <a:fillRect/>
+          </a:stretch>
+        </p:blipFill>
+        <p:spPr>
+          <a:xfrm>
+            <a:off x="274320" y="868680"/>
+            <a:ext cx="11612880" cy="5394960"/>
+          </a:xfrm>
+          <a:prstGeom prst="rect">
+            <a:avLst/>
+          </a:prstGeom>
+        </p:spPr>
+      </p:pic>
       <p:sp>
         <p:nvSpPr>
           <p:cNvPr id="4" name="TextBox 3"/>
@@ -3615,8 +3550,8 @@
         </p:nvSpPr>
         <p:spPr>
           <a:xfrm>
-            <a:off x="457200" y="3200400"/>
-            <a:ext cx="11277295" cy="1371600"/>
+            <a:off x="365760" y="6355080"/>
+            <a:ext cx="11430000" cy="457200"/>
           </a:xfrm>
           <a:prstGeom prst="rect">
             <a:avLst/>
@@ -3629,15 +3564,15 @@
           </a:bodyPr>
           <a:lstStyle/>
           <a:p>
-            <a:pPr algn="ctr">
-              <a:defRPr sz="4000" b="1">
-                <a:solidFill>
-                  <a:srgbClr val="FFFFFF"/>
-                </a:solidFill>
-              </a:defRPr>
-            </a:pPr>
-            <a:r>
-              <a:t>Current Risk Assessment</a:t>
+            <a:pPr>
+              <a:defRPr sz="1100" i="1">
+                <a:solidFill>
+                  <a:srgbClr val="505050"/>
+                </a:solidFill>
+              </a:defRPr>
+            </a:pPr>
+            <a:r>
+              <a:t>Note regime shifts: IT-ES contagion in Euro Crisis (25%), uniform flows in Tightening (15-23%)</a:t>
             </a:r>
           </a:p>
         </p:txBody>
@@ -3662,14 +3597,57 @@
       <p:grpSpPr/>
       <p:sp>
         <p:nvSpPr>
-          <p:cNvPr id="2" name="TextBox 1"/>
+          <p:cNvPr id="2" name="Rectangle 1"/>
+          <p:cNvSpPr/>
+          <p:nvPr/>
+        </p:nvSpPr>
+        <p:spPr>
+          <a:xfrm>
+            <a:off x="0" y="0"/>
+            <a:ext cx="12191695" cy="6858000"/>
+          </a:xfrm>
+          <a:prstGeom prst="rect">
+            <a:avLst/>
+          </a:prstGeom>
+          <a:solidFill>
+            <a:srgbClr val="003299"/>
+          </a:solidFill>
+          <a:ln>
+            <a:noFill/>
+          </a:ln>
+        </p:spPr>
+        <p:style>
+          <a:lnRef idx="1">
+            <a:schemeClr val="accent1"/>
+          </a:lnRef>
+          <a:fillRef idx="3">
+            <a:schemeClr val="accent1"/>
+          </a:fillRef>
+          <a:effectRef idx="2">
+            <a:schemeClr val="accent1"/>
+          </a:effectRef>
+          <a:fontRef idx="minor">
+            <a:schemeClr val="lt1"/>
+          </a:fontRef>
+        </p:style>
+        <p:txBody>
+          <a:bodyPr rtlCol="0" anchor="ctr"/>
+          <a:lstStyle/>
+          <a:p>
+            <a:pPr algn="ctr"/>
+          </a:p>
+        </p:txBody>
+      </p:sp>
+      <p:sp>
+        <p:nvSpPr>
+          <p:cNvPr id="3" name="TextBox 2"/>
           <p:cNvSpPr txBox="1"/>
           <p:nvPr/>
         </p:nvSpPr>
         <p:spPr>
           <a:xfrm>
-            <a:off x="365760" y="274320"/>
-            <a:ext cx="11430000" cy="731520"/>
+            <a:off x="457200" y="2286000"/>
+            <a:ext cx="11277295" cy="914400"/>
           </a:xfrm>
           <a:prstGeom prst="rect">
             <a:avLst/>
@@ -3682,43 +3660,19 @@
           </a:bodyPr>
           <a:lstStyle/>
           <a:p>
-            <a:pPr>
-              <a:defRPr sz="3000" b="1">
-                <a:solidFill>
-                  <a:srgbClr val="003299"/>
-                </a:solidFill>
-              </a:defRPr>
-            </a:pPr>
-            <a:r>
-              <a:t>French Political Risk: Contained but Elevated</a:t>
-            </a:r>
-          </a:p>
-        </p:txBody>
-      </p:sp>
-      <p:pic>
-        <p:nvPicPr>
-          <p:cNvPr id="3" name="Picture 2" descr="fig11_france_role.png"/>
-          <p:cNvPicPr>
-            <a:picLocks noChangeAspect="1"/>
-          </p:cNvPicPr>
-          <p:nvPr/>
-        </p:nvPicPr>
-        <p:blipFill>
-          <a:blip r:embed="rId2"/>
-          <a:stretch>
-            <a:fillRect/>
-          </a:stretch>
-        </p:blipFill>
-        <p:spPr>
-          <a:xfrm>
-            <a:off x="5303520" y="1097280"/>
-            <a:ext cx="6583680" cy="5303520"/>
-          </a:xfrm>
-          <a:prstGeom prst="rect">
-            <a:avLst/>
-          </a:prstGeom>
-        </p:spPr>
-      </p:pic>
+            <a:pPr algn="ctr">
+              <a:defRPr sz="7200" b="1">
+                <a:solidFill>
+                  <a:srgbClr val="FFFFFF"/>
+                </a:solidFill>
+              </a:defRPr>
+            </a:pPr>
+            <a:r>
+              <a:t>IV</a:t>
+            </a:r>
+          </a:p>
+        </p:txBody>
+      </p:sp>
       <p:sp>
         <p:nvSpPr>
           <p:cNvPr id="4" name="TextBox 3"/>
@@ -3727,8 +3681,8 @@
         </p:nvSpPr>
         <p:spPr>
           <a:xfrm>
-            <a:off x="365760" y="1097280"/>
-            <a:ext cx="4754880" cy="5303520"/>
+            <a:off x="457200" y="3200400"/>
+            <a:ext cx="11277295" cy="1371600"/>
           </a:xfrm>
           <a:prstGeom prst="rect">
             <a:avLst/>
@@ -3736,158 +3690,20 @@
           <a:noFill/>
         </p:spPr>
         <p:txBody>
-          <a:bodyPr wrap="square">
+          <a:bodyPr wrap="none">
             <a:spAutoFit/>
           </a:bodyPr>
           <a:lstStyle/>
           <a:p>
-            <a:pPr>
-              <a:spcAft>
-                <a:spcPts val="1000"/>
-              </a:spcAft>
-              <a:defRPr sz="1600">
-                <a:solidFill>
-                  <a:srgbClr val="505050"/>
-                </a:solidFill>
-              </a:defRPr>
-            </a:pPr>
-            <a:r>
-              <a:t>• FR-DE spread widened from 50bp to 87bp during 2024 turmoil</a:t>
-            </a:r>
-          </a:p>
-          <a:p>
-            <a:pPr>
-              <a:spcAft>
-                <a:spcPts val="1000"/>
-              </a:spcAft>
-              <a:defRPr sz="1600">
-                <a:solidFill>
-                  <a:srgbClr val="505050"/>
-                </a:solidFill>
-              </a:defRPr>
-            </a:pPr>
-            <a:r>
-              <a:t>• Peak spread on December 2, 2024 after Barnier government fell</a:t>
-            </a:r>
-          </a:p>
-          <a:p>
-            <a:pPr>
-              <a:spcAft>
-                <a:spcPts val="1000"/>
-              </a:spcAft>
-              <a:defRPr sz="1600">
-                <a:solidFill>
-                  <a:srgbClr val="505050"/>
-                </a:solidFill>
-              </a:defRPr>
-            </a:pPr>
-            <a:r>
-              <a:t>• Critical finding: France REMAINED a net transmitter throughout</a:t>
-            </a:r>
-          </a:p>
-          <a:p>
-            <a:pPr>
-              <a:spcAft>
-                <a:spcPts val="1000"/>
-              </a:spcAft>
-              <a:defRPr sz="1600">
-                <a:solidFill>
-                  <a:srgbClr val="505050"/>
-                </a:solidFill>
-              </a:defRPr>
-            </a:pPr>
-            <a:r>
-              <a:t>•   - Pre-crisis average: +36 (strong transmitter)</a:t>
-            </a:r>
-          </a:p>
-          <a:p>
-            <a:pPr>
-              <a:spcAft>
-                <a:spcPts val="1000"/>
-              </a:spcAft>
-              <a:defRPr sz="1600">
-                <a:solidFill>
-                  <a:srgbClr val="505050"/>
-                </a:solidFill>
-              </a:defRPr>
-            </a:pPr>
-            <a:r>
-              <a:t>•   - Post-crisis average: +29 (still positive)</a:t>
-            </a:r>
-          </a:p>
-          <a:p>
-            <a:pPr>
-              <a:spcAft>
-                <a:spcPts val="1000"/>
-              </a:spcAft>
-              <a:defRPr sz="1600">
-                <a:solidFill>
-                  <a:srgbClr val="505050"/>
-                </a:solidFill>
-              </a:defRPr>
-            </a:pPr>
-            <a:r>
-              <a:t>• Contagion to periphery was LIMITED:</a:t>
-            </a:r>
-          </a:p>
-          <a:p>
-            <a:pPr>
-              <a:spcAft>
-                <a:spcPts val="1000"/>
-              </a:spcAft>
-              <a:defRPr sz="1600">
-                <a:solidFill>
-                  <a:srgbClr val="505050"/>
-                </a:solidFill>
-              </a:defRPr>
-            </a:pPr>
-            <a:r>
-              <a:t>•   - France→Italy spillover: stable at 21-22%</a:t>
-            </a:r>
-          </a:p>
-          <a:p>
-            <a:pPr>
-              <a:spcAft>
-                <a:spcPts val="1000"/>
-              </a:spcAft>
-              <a:defRPr sz="1600">
-                <a:solidFill>
-                  <a:srgbClr val="505050"/>
-                </a:solidFill>
-              </a:defRPr>
-            </a:pPr>
-            <a:r>
-              <a:t>•   - France→Spain spillover: stable at 18-19%</a:t>
-            </a:r>
-          </a:p>
-          <a:p>
-            <a:pPr>
-              <a:spcAft>
-                <a:spcPts val="1000"/>
-              </a:spcAft>
-              <a:defRPr sz="1600">
-                <a:solidFill>
-                  <a:srgbClr val="505050"/>
-                </a:solidFill>
-              </a:defRPr>
-            </a:pPr>
-            <a:r>
-              <a:t>• ECB's Transmission Protection Instrument appears credible</a:t>
-            </a:r>
-          </a:p>
-          <a:p>
-            <a:pPr>
-              <a:spcAft>
-                <a:spcPts val="1000"/>
-              </a:spcAft>
-              <a:defRPr sz="1600">
-                <a:solidFill>
-                  <a:srgbClr val="505050"/>
-                </a:solidFill>
-              </a:defRPr>
-            </a:pPr>
-            <a:r>
-              <a:t>• But: Elevated spreads suggest underlying fragility remains</a:t>
+            <a:pPr algn="ctr">
+              <a:defRPr sz="4000" b="1">
+                <a:solidFill>
+                  <a:srgbClr val="FFFFFF"/>
+                </a:solidFill>
+              </a:defRPr>
+            </a:pPr>
+            <a:r>
+              <a:t>Policy Implications</a:t>
             </a:r>
           </a:p>
         </p:txBody>
@@ -3918,8 +3734,8 @@
         </p:nvSpPr>
         <p:spPr>
           <a:xfrm>
-            <a:off x="365760" y="182880"/>
-            <a:ext cx="11430000" cy="640080"/>
+            <a:off x="365760" y="274320"/>
+            <a:ext cx="11430000" cy="731520"/>
           </a:xfrm>
           <a:prstGeom prst="rect">
             <a:avLst/>
@@ -3933,52 +3749,28 @@
           <a:lstStyle/>
           <a:p>
             <a:pPr>
-              <a:defRPr sz="2600" b="1">
+              <a:defRPr sz="3000" b="1">
                 <a:solidFill>
                   <a:srgbClr val="003299"/>
                 </a:solidFill>
               </a:defRPr>
             </a:pPr>
             <a:r>
-              <a:t>Who Affects Whom: The Bilateral Picture</a:t>
-            </a:r>
-          </a:p>
-        </p:txBody>
-      </p:sp>
-      <p:pic>
-        <p:nvPicPr>
-          <p:cNvPr id="3" name="Picture 2" descr="fig08_bilateral_heatmaps.png"/>
-          <p:cNvPicPr>
-            <a:picLocks noChangeAspect="1"/>
-          </p:cNvPicPr>
-          <p:nvPr/>
-        </p:nvPicPr>
-        <p:blipFill>
-          <a:blip r:embed="rId2"/>
-          <a:stretch>
-            <a:fillRect/>
-          </a:stretch>
-        </p:blipFill>
-        <p:spPr>
-          <a:xfrm>
-            <a:off x="274320" y="868680"/>
-            <a:ext cx="11612880" cy="5394960"/>
-          </a:xfrm>
-          <a:prstGeom prst="rect">
-            <a:avLst/>
-          </a:prstGeom>
-        </p:spPr>
-      </p:pic>
-      <p:sp>
-        <p:nvSpPr>
-          <p:cNvPr id="4" name="TextBox 3"/>
+              <a:t>Implications for Policymakers</a:t>
+            </a:r>
+          </a:p>
+        </p:txBody>
+      </p:sp>
+      <p:sp>
+        <p:nvSpPr>
+          <p:cNvPr id="3" name="TextBox 2"/>
           <p:cNvSpPr txBox="1"/>
           <p:nvPr/>
         </p:nvSpPr>
         <p:spPr>
           <a:xfrm>
-            <a:off x="365760" y="6355080"/>
-            <a:ext cx="11430000" cy="457200"/>
+            <a:off x="365760" y="1097280"/>
+            <a:ext cx="11430000" cy="5303520"/>
           </a:xfrm>
           <a:prstGeom prst="rect">
             <a:avLst/>
@@ -3986,20 +3778,203 @@
           <a:noFill/>
         </p:spPr>
         <p:txBody>
-          <a:bodyPr wrap="none">
+          <a:bodyPr wrap="square">
             <a:spAutoFit/>
           </a:bodyPr>
           <a:lstStyle/>
           <a:p>
             <a:pPr>
-              <a:defRPr sz="1100" i="1">
-                <a:solidFill>
-                  <a:srgbClr val="505050"/>
-                </a:solidFill>
-              </a:defRPr>
-            </a:pPr>
-            <a:r>
-              <a:t>Note regime shifts: IT-ES contagion in Euro Crisis (25%), uniform flows in Tightening (15-23%)</a:t>
+              <a:spcAft>
+                <a:spcPts val="1000"/>
+              </a:spcAft>
+              <a:defRPr sz="1600">
+                <a:solidFill>
+                  <a:srgbClr val="505050"/>
+                </a:solidFill>
+              </a:defRPr>
+            </a:pPr>
+            <a:r>
+              <a:t>• MONETARY POLICY</a:t>
+            </a:r>
+          </a:p>
+          <a:p>
+            <a:pPr>
+              <a:spcAft>
+                <a:spcPts val="1000"/>
+              </a:spcAft>
+              <a:defRPr sz="1600">
+                <a:solidFill>
+                  <a:srgbClr val="505050"/>
+                </a:solidFill>
+              </a:defRPr>
+            </a:pPr>
+            <a:r>
+              <a:t>•   - EA yields driven more by internal than external factors</a:t>
+            </a:r>
+          </a:p>
+          <a:p>
+            <a:pPr>
+              <a:spcAft>
+                <a:spcPts val="1000"/>
+              </a:spcAft>
+              <a:defRPr sz="1600">
+                <a:solidFill>
+                  <a:srgbClr val="505050"/>
+                </a:solidFill>
+              </a:defRPr>
+            </a:pPr>
+            <a:r>
+              <a:t>•   - ECB is the primary driver of EA-wide yield dynamics</a:t>
+            </a:r>
+          </a:p>
+          <a:p>
+            <a:pPr>
+              <a:spcAft>
+                <a:spcPts val="1000"/>
+              </a:spcAft>
+              <a:defRPr sz="1600">
+                <a:solidFill>
+                  <a:srgbClr val="505050"/>
+                </a:solidFill>
+              </a:defRPr>
+            </a:pPr>
+            <a:r>
+              <a:t>•   - Transmission Protection Instrument appears effective (French test)</a:t>
+            </a:r>
+          </a:p>
+          <a:p>
+            <a:pPr>
+              <a:spcAft>
+                <a:spcPts val="1000"/>
+              </a:spcAft>
+              <a:defRPr sz="1600">
+                <a:solidFill>
+                  <a:srgbClr val="505050"/>
+                </a:solidFill>
+              </a:defRPr>
+            </a:pPr>
+            <a:r>
+              <a:t>• </a:t>
+            </a:r>
+          </a:p>
+          <a:p>
+            <a:pPr>
+              <a:spcAft>
+                <a:spcPts val="1000"/>
+              </a:spcAft>
+              <a:defRPr sz="1600">
+                <a:solidFill>
+                  <a:srgbClr val="505050"/>
+                </a:solidFill>
+              </a:defRPr>
+            </a:pPr>
+            <a:r>
+              <a:t>• FISCAL COORDINATION</a:t>
+            </a:r>
+          </a:p>
+          <a:p>
+            <a:pPr>
+              <a:spcAft>
+                <a:spcPts val="1000"/>
+              </a:spcAft>
+              <a:defRPr sz="1600">
+                <a:solidFill>
+                  <a:srgbClr val="505050"/>
+                </a:solidFill>
+              </a:defRPr>
+            </a:pPr>
+            <a:r>
+              <a:t>•   - Periphery remains structurally vulnerable (price takers)</a:t>
+            </a:r>
+          </a:p>
+          <a:p>
+            <a:pPr>
+              <a:spcAft>
+                <a:spcPts val="1000"/>
+              </a:spcAft>
+              <a:defRPr sz="1600">
+                <a:solidFill>
+                  <a:srgbClr val="505050"/>
+                </a:solidFill>
+              </a:defRPr>
+            </a:pPr>
+            <a:r>
+              <a:t>•   - Spain most sensitive to EA-wide shocks</a:t>
+            </a:r>
+          </a:p>
+          <a:p>
+            <a:pPr>
+              <a:spcAft>
+                <a:spcPts val="1000"/>
+              </a:spcAft>
+              <a:defRPr sz="1600">
+                <a:solidFill>
+                  <a:srgbClr val="505050"/>
+                </a:solidFill>
+              </a:defRPr>
+            </a:pPr>
+            <a:r>
+              <a:t>•   - French fiscal credibility now a systemic concern</a:t>
+            </a:r>
+          </a:p>
+          <a:p>
+            <a:pPr>
+              <a:spcAft>
+                <a:spcPts val="1000"/>
+              </a:spcAft>
+              <a:defRPr sz="1600">
+                <a:solidFill>
+                  <a:srgbClr val="505050"/>
+                </a:solidFill>
+              </a:defRPr>
+            </a:pPr>
+            <a:r>
+              <a:t>• </a:t>
+            </a:r>
+          </a:p>
+          <a:p>
+            <a:pPr>
+              <a:spcAft>
+                <a:spcPts val="1000"/>
+              </a:spcAft>
+              <a:defRPr sz="1600">
+                <a:solidFill>
+                  <a:srgbClr val="505050"/>
+                </a:solidFill>
+              </a:defRPr>
+            </a:pPr>
+            <a:r>
+              <a:t>• CRISIS PREPAREDNESS</a:t>
+            </a:r>
+          </a:p>
+          <a:p>
+            <a:pPr>
+              <a:spcAft>
+                <a:spcPts val="1000"/>
+              </a:spcAft>
+              <a:defRPr sz="1600">
+                <a:solidFill>
+                  <a:srgbClr val="505050"/>
+                </a:solidFill>
+              </a:defRPr>
+            </a:pPr>
+            <a:r>
+              <a:t>•   - Integration falls during idiosyncratic crises</a:t>
+            </a:r>
+          </a:p>
+          <a:p>
+            <a:pPr>
+              <a:spcAft>
+                <a:spcPts val="1000"/>
+              </a:spcAft>
+              <a:defRPr sz="1600">
+                <a:solidFill>
+                  <a:srgbClr val="505050"/>
+                </a:solidFill>
+              </a:defRPr>
+            </a:pPr>
+            <a:r>
+              <a:t>•   - Current high spillovers = vulnerability to common shocks</a:t>
             </a:r>
           </a:p>
         </p:txBody>
@@ -4024,57 +3999,14 @@
       <p:grpSpPr/>
       <p:sp>
         <p:nvSpPr>
-          <p:cNvPr id="2" name="Rectangle 1"/>
-          <p:cNvSpPr/>
-          <p:nvPr/>
-        </p:nvSpPr>
-        <p:spPr>
-          <a:xfrm>
-            <a:off x="0" y="0"/>
-            <a:ext cx="12191695" cy="6858000"/>
-          </a:xfrm>
-          <a:prstGeom prst="rect">
-            <a:avLst/>
-          </a:prstGeom>
-          <a:solidFill>
-            <a:srgbClr val="003299"/>
-          </a:solidFill>
-          <a:ln>
-            <a:noFill/>
-          </a:ln>
-        </p:spPr>
-        <p:style>
-          <a:lnRef idx="1">
-            <a:schemeClr val="accent1"/>
-          </a:lnRef>
-          <a:fillRef idx="3">
-            <a:schemeClr val="accent1"/>
-          </a:fillRef>
-          <a:effectRef idx="2">
-            <a:schemeClr val="accent1"/>
-          </a:effectRef>
-          <a:fontRef idx="minor">
-            <a:schemeClr val="lt1"/>
-          </a:fontRef>
-        </p:style>
-        <p:txBody>
-          <a:bodyPr rtlCol="0" anchor="ctr"/>
-          <a:lstStyle/>
-          <a:p>
-            <a:pPr algn="ctr"/>
-          </a:p>
-        </p:txBody>
-      </p:sp>
-      <p:sp>
-        <p:nvSpPr>
-          <p:cNvPr id="3" name="TextBox 2"/>
+          <p:cNvPr id="2" name="TextBox 1"/>
           <p:cNvSpPr txBox="1"/>
           <p:nvPr/>
         </p:nvSpPr>
         <p:spPr>
           <a:xfrm>
-            <a:off x="457200" y="2286000"/>
-            <a:ext cx="11277295" cy="914400"/>
+            <a:off x="365760" y="274320"/>
+            <a:ext cx="11430000" cy="731520"/>
           </a:xfrm>
           <a:prstGeom prst="rect">
             <a:avLst/>
@@ -4087,29 +4019,29 @@
           </a:bodyPr>
           <a:lstStyle/>
           <a:p>
-            <a:pPr algn="ctr">
-              <a:defRPr sz="7200" b="1">
-                <a:solidFill>
-                  <a:srgbClr val="FFFFFF"/>
-                </a:solidFill>
-              </a:defRPr>
-            </a:pPr>
-            <a:r>
-              <a:t>IV</a:t>
-            </a:r>
-          </a:p>
-        </p:txBody>
-      </p:sp>
-      <p:sp>
-        <p:nvSpPr>
-          <p:cNvPr id="4" name="TextBox 3"/>
+            <a:pPr>
+              <a:defRPr sz="3000" b="1">
+                <a:solidFill>
+                  <a:srgbClr val="003299"/>
+                </a:solidFill>
+              </a:defRPr>
+            </a:pPr>
+            <a:r>
+              <a:t>Open Questions</a:t>
+            </a:r>
+          </a:p>
+        </p:txBody>
+      </p:sp>
+      <p:sp>
+        <p:nvSpPr>
+          <p:cNvPr id="3" name="TextBox 2"/>
           <p:cNvSpPr txBox="1"/>
           <p:nvPr/>
         </p:nvSpPr>
         <p:spPr>
           <a:xfrm>
-            <a:off x="457200" y="3200400"/>
-            <a:ext cx="11277295" cy="1371600"/>
+            <a:off x="365760" y="1097280"/>
+            <a:ext cx="11430000" cy="5303520"/>
           </a:xfrm>
           <a:prstGeom prst="rect">
             <a:avLst/>
@@ -4117,20 +4049,98 @@
           <a:noFill/>
         </p:spPr>
         <p:txBody>
-          <a:bodyPr wrap="none">
+          <a:bodyPr wrap="square">
             <a:spAutoFit/>
           </a:bodyPr>
           <a:lstStyle/>
           <a:p>
-            <a:pPr algn="ctr">
-              <a:defRPr sz="4000" b="1">
-                <a:solidFill>
-                  <a:srgbClr val="FFFFFF"/>
-                </a:solidFill>
-              </a:defRPr>
-            </a:pPr>
-            <a:r>
-              <a:t>Policy Implications</a:t>
+            <a:pPr>
+              <a:spcAft>
+                <a:spcPts val="1000"/>
+              </a:spcAft>
+              <a:defRPr sz="1600">
+                <a:solidFill>
+                  <a:srgbClr val="505050"/>
+                </a:solidFill>
+              </a:defRPr>
+            </a:pPr>
+            <a:r>
+              <a:t>• Will France remain the pivot despite political fragmentation?</a:t>
+            </a:r>
+          </a:p>
+          <a:p>
+            <a:pPr>
+              <a:spcAft>
+                <a:spcPts val="1000"/>
+              </a:spcAft>
+              <a:defRPr sz="1600">
+                <a:solidFill>
+                  <a:srgbClr val="505050"/>
+                </a:solidFill>
+              </a:defRPr>
+            </a:pPr>
+            <a:r>
+              <a:t>• How will ECB rate cuts affect the spillover structure?</a:t>
+            </a:r>
+          </a:p>
+          <a:p>
+            <a:pPr>
+              <a:spcAft>
+                <a:spcPts val="1000"/>
+              </a:spcAft>
+              <a:defRPr sz="1600">
+                <a:solidFill>
+                  <a:srgbClr val="505050"/>
+                </a:solidFill>
+              </a:defRPr>
+            </a:pPr>
+            <a:r>
+              <a:t>• Is Spain's vulnerability structural or cyclical?</a:t>
+            </a:r>
+          </a:p>
+          <a:p>
+            <a:pPr>
+              <a:spcAft>
+                <a:spcPts val="1000"/>
+              </a:spcAft>
+              <a:defRPr sz="1600">
+                <a:solidFill>
+                  <a:srgbClr val="505050"/>
+                </a:solidFill>
+              </a:defRPr>
+            </a:pPr>
+            <a:r>
+              <a:t>• What happens when the next idiosyncratic shock hits?</a:t>
+            </a:r>
+          </a:p>
+          <a:p>
+            <a:pPr>
+              <a:spcAft>
+                <a:spcPts val="1000"/>
+              </a:spcAft>
+              <a:defRPr sz="1600">
+                <a:solidFill>
+                  <a:srgbClr val="505050"/>
+                </a:solidFill>
+              </a:defRPr>
+            </a:pPr>
+            <a:r>
+              <a:t>• Is the Transmission Protection Instrument enough, or does the</a:t>
+            </a:r>
+          </a:p>
+          <a:p>
+            <a:pPr>
+              <a:spcAft>
+                <a:spcPts val="1000"/>
+              </a:spcAft>
+              <a:defRPr sz="1600">
+                <a:solidFill>
+                  <a:srgbClr val="505050"/>
+                </a:solidFill>
+              </a:defRPr>
+            </a:pPr>
+            <a:r>
+              <a:t>• Euro Area need deeper fiscal integration?</a:t>
             </a:r>
           </a:p>
         </p:txBody>
@@ -4155,443 +4165,6 @@
       <p:grpSpPr/>
       <p:sp>
         <p:nvSpPr>
-          <p:cNvPr id="2" name="TextBox 1"/>
-          <p:cNvSpPr txBox="1"/>
-          <p:nvPr/>
-        </p:nvSpPr>
-        <p:spPr>
-          <a:xfrm>
-            <a:off x="365760" y="274320"/>
-            <a:ext cx="11430000" cy="731520"/>
-          </a:xfrm>
-          <a:prstGeom prst="rect">
-            <a:avLst/>
-          </a:prstGeom>
-          <a:noFill/>
-        </p:spPr>
-        <p:txBody>
-          <a:bodyPr wrap="none">
-            <a:spAutoFit/>
-          </a:bodyPr>
-          <a:lstStyle/>
-          <a:p>
-            <a:pPr>
-              <a:defRPr sz="3000" b="1">
-                <a:solidFill>
-                  <a:srgbClr val="003299"/>
-                </a:solidFill>
-              </a:defRPr>
-            </a:pPr>
-            <a:r>
-              <a:t>Implications for Policymakers</a:t>
-            </a:r>
-          </a:p>
-        </p:txBody>
-      </p:sp>
-      <p:sp>
-        <p:nvSpPr>
-          <p:cNvPr id="3" name="TextBox 2"/>
-          <p:cNvSpPr txBox="1"/>
-          <p:nvPr/>
-        </p:nvSpPr>
-        <p:spPr>
-          <a:xfrm>
-            <a:off x="365760" y="1097280"/>
-            <a:ext cx="11430000" cy="5303520"/>
-          </a:xfrm>
-          <a:prstGeom prst="rect">
-            <a:avLst/>
-          </a:prstGeom>
-          <a:noFill/>
-        </p:spPr>
-        <p:txBody>
-          <a:bodyPr wrap="square">
-            <a:spAutoFit/>
-          </a:bodyPr>
-          <a:lstStyle/>
-          <a:p>
-            <a:pPr>
-              <a:spcAft>
-                <a:spcPts val="1000"/>
-              </a:spcAft>
-              <a:defRPr sz="1600">
-                <a:solidFill>
-                  <a:srgbClr val="505050"/>
-                </a:solidFill>
-              </a:defRPr>
-            </a:pPr>
-            <a:r>
-              <a:t>• MONETARY POLICY</a:t>
-            </a:r>
-          </a:p>
-          <a:p>
-            <a:pPr>
-              <a:spcAft>
-                <a:spcPts val="1000"/>
-              </a:spcAft>
-              <a:defRPr sz="1600">
-                <a:solidFill>
-                  <a:srgbClr val="505050"/>
-                </a:solidFill>
-              </a:defRPr>
-            </a:pPr>
-            <a:r>
-              <a:t>•   - EA yields driven more by internal than external factors</a:t>
-            </a:r>
-          </a:p>
-          <a:p>
-            <a:pPr>
-              <a:spcAft>
-                <a:spcPts val="1000"/>
-              </a:spcAft>
-              <a:defRPr sz="1600">
-                <a:solidFill>
-                  <a:srgbClr val="505050"/>
-                </a:solidFill>
-              </a:defRPr>
-            </a:pPr>
-            <a:r>
-              <a:t>•   - ECB is the primary driver of EA-wide yield dynamics</a:t>
-            </a:r>
-          </a:p>
-          <a:p>
-            <a:pPr>
-              <a:spcAft>
-                <a:spcPts val="1000"/>
-              </a:spcAft>
-              <a:defRPr sz="1600">
-                <a:solidFill>
-                  <a:srgbClr val="505050"/>
-                </a:solidFill>
-              </a:defRPr>
-            </a:pPr>
-            <a:r>
-              <a:t>•   - Transmission Protection Instrument appears effective (French test)</a:t>
-            </a:r>
-          </a:p>
-          <a:p>
-            <a:pPr>
-              <a:spcAft>
-                <a:spcPts val="1000"/>
-              </a:spcAft>
-              <a:defRPr sz="1600">
-                <a:solidFill>
-                  <a:srgbClr val="505050"/>
-                </a:solidFill>
-              </a:defRPr>
-            </a:pPr>
-            <a:r>
-              <a:t>• </a:t>
-            </a:r>
-          </a:p>
-          <a:p>
-            <a:pPr>
-              <a:spcAft>
-                <a:spcPts val="1000"/>
-              </a:spcAft>
-              <a:defRPr sz="1600">
-                <a:solidFill>
-                  <a:srgbClr val="505050"/>
-                </a:solidFill>
-              </a:defRPr>
-            </a:pPr>
-            <a:r>
-              <a:t>• FISCAL COORDINATION</a:t>
-            </a:r>
-          </a:p>
-          <a:p>
-            <a:pPr>
-              <a:spcAft>
-                <a:spcPts val="1000"/>
-              </a:spcAft>
-              <a:defRPr sz="1600">
-                <a:solidFill>
-                  <a:srgbClr val="505050"/>
-                </a:solidFill>
-              </a:defRPr>
-            </a:pPr>
-            <a:r>
-              <a:t>•   - Periphery remains structurally vulnerable (price takers)</a:t>
-            </a:r>
-          </a:p>
-          <a:p>
-            <a:pPr>
-              <a:spcAft>
-                <a:spcPts val="1000"/>
-              </a:spcAft>
-              <a:defRPr sz="1600">
-                <a:solidFill>
-                  <a:srgbClr val="505050"/>
-                </a:solidFill>
-              </a:defRPr>
-            </a:pPr>
-            <a:r>
-              <a:t>•   - Spain most sensitive to EA-wide shocks</a:t>
-            </a:r>
-          </a:p>
-          <a:p>
-            <a:pPr>
-              <a:spcAft>
-                <a:spcPts val="1000"/>
-              </a:spcAft>
-              <a:defRPr sz="1600">
-                <a:solidFill>
-                  <a:srgbClr val="505050"/>
-                </a:solidFill>
-              </a:defRPr>
-            </a:pPr>
-            <a:r>
-              <a:t>•   - French fiscal credibility now a systemic concern</a:t>
-            </a:r>
-          </a:p>
-          <a:p>
-            <a:pPr>
-              <a:spcAft>
-                <a:spcPts val="1000"/>
-              </a:spcAft>
-              <a:defRPr sz="1600">
-                <a:solidFill>
-                  <a:srgbClr val="505050"/>
-                </a:solidFill>
-              </a:defRPr>
-            </a:pPr>
-            <a:r>
-              <a:t>• </a:t>
-            </a:r>
-          </a:p>
-          <a:p>
-            <a:pPr>
-              <a:spcAft>
-                <a:spcPts val="1000"/>
-              </a:spcAft>
-              <a:defRPr sz="1600">
-                <a:solidFill>
-                  <a:srgbClr val="505050"/>
-                </a:solidFill>
-              </a:defRPr>
-            </a:pPr>
-            <a:r>
-              <a:t>• CRISIS PREPAREDNESS</a:t>
-            </a:r>
-          </a:p>
-          <a:p>
-            <a:pPr>
-              <a:spcAft>
-                <a:spcPts val="1000"/>
-              </a:spcAft>
-              <a:defRPr sz="1600">
-                <a:solidFill>
-                  <a:srgbClr val="505050"/>
-                </a:solidFill>
-              </a:defRPr>
-            </a:pPr>
-            <a:r>
-              <a:t>•   - Integration falls during idiosyncratic crises</a:t>
-            </a:r>
-          </a:p>
-          <a:p>
-            <a:pPr>
-              <a:spcAft>
-                <a:spcPts val="1000"/>
-              </a:spcAft>
-              <a:defRPr sz="1600">
-                <a:solidFill>
-                  <a:srgbClr val="505050"/>
-                </a:solidFill>
-              </a:defRPr>
-            </a:pPr>
-            <a:r>
-              <a:t>•   - Current high spillovers = vulnerability to common shocks</a:t>
-            </a:r>
-          </a:p>
-        </p:txBody>
-      </p:sp>
-    </p:spTree>
-  </p:cSld>
-  <p:clrMapOvr>
-    <a:masterClrMapping/>
-  </p:clrMapOvr>
-</p:sld>
-</file>
-
-<file path=ppt/slides/slide16.xml><?xml version="1.0" encoding="utf-8"?>
-<p:sld xmlns:a="http://schemas.openxmlformats.org/drawingml/2006/main" xmlns:p="http://schemas.openxmlformats.org/presentationml/2006/main" xmlns:r="http://schemas.openxmlformats.org/officeDocument/2006/relationships">
-  <p:cSld>
-    <p:spTree>
-      <p:nvGrpSpPr>
-        <p:cNvPr id="1" name=""/>
-        <p:cNvGrpSpPr/>
-        <p:nvPr/>
-      </p:nvGrpSpPr>
-      <p:grpSpPr/>
-      <p:sp>
-        <p:nvSpPr>
-          <p:cNvPr id="2" name="TextBox 1"/>
-          <p:cNvSpPr txBox="1"/>
-          <p:nvPr/>
-        </p:nvSpPr>
-        <p:spPr>
-          <a:xfrm>
-            <a:off x="365760" y="274320"/>
-            <a:ext cx="11430000" cy="731520"/>
-          </a:xfrm>
-          <a:prstGeom prst="rect">
-            <a:avLst/>
-          </a:prstGeom>
-          <a:noFill/>
-        </p:spPr>
-        <p:txBody>
-          <a:bodyPr wrap="none">
-            <a:spAutoFit/>
-          </a:bodyPr>
-          <a:lstStyle/>
-          <a:p>
-            <a:pPr>
-              <a:defRPr sz="3000" b="1">
-                <a:solidFill>
-                  <a:srgbClr val="003299"/>
-                </a:solidFill>
-              </a:defRPr>
-            </a:pPr>
-            <a:r>
-              <a:t>Open Questions</a:t>
-            </a:r>
-          </a:p>
-        </p:txBody>
-      </p:sp>
-      <p:sp>
-        <p:nvSpPr>
-          <p:cNvPr id="3" name="TextBox 2"/>
-          <p:cNvSpPr txBox="1"/>
-          <p:nvPr/>
-        </p:nvSpPr>
-        <p:spPr>
-          <a:xfrm>
-            <a:off x="365760" y="1097280"/>
-            <a:ext cx="11430000" cy="5303520"/>
-          </a:xfrm>
-          <a:prstGeom prst="rect">
-            <a:avLst/>
-          </a:prstGeom>
-          <a:noFill/>
-        </p:spPr>
-        <p:txBody>
-          <a:bodyPr wrap="square">
-            <a:spAutoFit/>
-          </a:bodyPr>
-          <a:lstStyle/>
-          <a:p>
-            <a:pPr>
-              <a:spcAft>
-                <a:spcPts val="1000"/>
-              </a:spcAft>
-              <a:defRPr sz="1600">
-                <a:solidFill>
-                  <a:srgbClr val="505050"/>
-                </a:solidFill>
-              </a:defRPr>
-            </a:pPr>
-            <a:r>
-              <a:t>• Will France remain the pivot despite political fragmentation?</a:t>
-            </a:r>
-          </a:p>
-          <a:p>
-            <a:pPr>
-              <a:spcAft>
-                <a:spcPts val="1000"/>
-              </a:spcAft>
-              <a:defRPr sz="1600">
-                <a:solidFill>
-                  <a:srgbClr val="505050"/>
-                </a:solidFill>
-              </a:defRPr>
-            </a:pPr>
-            <a:r>
-              <a:t>• How will ECB rate cuts affect the spillover structure?</a:t>
-            </a:r>
-          </a:p>
-          <a:p>
-            <a:pPr>
-              <a:spcAft>
-                <a:spcPts val="1000"/>
-              </a:spcAft>
-              <a:defRPr sz="1600">
-                <a:solidFill>
-                  <a:srgbClr val="505050"/>
-                </a:solidFill>
-              </a:defRPr>
-            </a:pPr>
-            <a:r>
-              <a:t>• Is Spain's vulnerability structural or cyclical?</a:t>
-            </a:r>
-          </a:p>
-          <a:p>
-            <a:pPr>
-              <a:spcAft>
-                <a:spcPts val="1000"/>
-              </a:spcAft>
-              <a:defRPr sz="1600">
-                <a:solidFill>
-                  <a:srgbClr val="505050"/>
-                </a:solidFill>
-              </a:defRPr>
-            </a:pPr>
-            <a:r>
-              <a:t>• What happens when the next idiosyncratic shock hits?</a:t>
-            </a:r>
-          </a:p>
-          <a:p>
-            <a:pPr>
-              <a:spcAft>
-                <a:spcPts val="1000"/>
-              </a:spcAft>
-              <a:defRPr sz="1600">
-                <a:solidFill>
-                  <a:srgbClr val="505050"/>
-                </a:solidFill>
-              </a:defRPr>
-            </a:pPr>
-            <a:r>
-              <a:t>• Is the Transmission Protection Instrument enough, or does the</a:t>
-            </a:r>
-          </a:p>
-          <a:p>
-            <a:pPr>
-              <a:spcAft>
-                <a:spcPts val="1000"/>
-              </a:spcAft>
-              <a:defRPr sz="1600">
-                <a:solidFill>
-                  <a:srgbClr val="505050"/>
-                </a:solidFill>
-              </a:defRPr>
-            </a:pPr>
-            <a:r>
-              <a:t>• Euro Area need deeper fiscal integration?</a:t>
-            </a:r>
-          </a:p>
-        </p:txBody>
-      </p:sp>
-    </p:spTree>
-  </p:cSld>
-  <p:clrMapOvr>
-    <a:masterClrMapping/>
-  </p:clrMapOvr>
-</p:sld>
-</file>
-
-<file path=ppt/slides/slide17.xml><?xml version="1.0" encoding="utf-8"?>
-<p:sld xmlns:a="http://schemas.openxmlformats.org/drawingml/2006/main" xmlns:p="http://schemas.openxmlformats.org/presentationml/2006/main" xmlns:r="http://schemas.openxmlformats.org/officeDocument/2006/relationships">
-  <p:cSld>
-    <p:spTree>
-      <p:nvGrpSpPr>
-        <p:cNvPr id="1" name=""/>
-        <p:cNvGrpSpPr/>
-        <p:nvPr/>
-      </p:nvGrpSpPr>
-      <p:grpSpPr/>
-      <p:sp>
-        <p:nvSpPr>
           <p:cNvPr id="2" name="Rectangle 1"/>
           <p:cNvSpPr/>
           <p:nvPr/>
@@ -4738,8 +4311,8 @@
         </p:nvSpPr>
         <p:spPr>
           <a:xfrm>
-            <a:off x="365760" y="274320"/>
-            <a:ext cx="11430000" cy="731520"/>
+            <a:off x="365760" y="182880"/>
+            <a:ext cx="11430000" cy="640080"/>
           </a:xfrm>
           <a:prstGeom prst="rect">
             <a:avLst/>
@@ -4753,28 +4326,52 @@
           <a:lstStyle/>
           <a:p>
             <a:pPr>
-              <a:defRPr sz="3000" b="1">
+              <a:defRPr sz="2600" b="1">
                 <a:solidFill>
                   <a:srgbClr val="003299"/>
                 </a:solidFill>
               </a:defRPr>
             </a:pPr>
             <a:r>
-              <a:t>The Story in Numbers</a:t>
-            </a:r>
-          </a:p>
-        </p:txBody>
-      </p:sp>
-      <p:sp>
-        <p:nvSpPr>
-          <p:cNvPr id="3" name="TextBox 2"/>
+              <a:t>30 Years of Convergence and Fragmentation</a:t>
+            </a:r>
+          </a:p>
+        </p:txBody>
+      </p:sp>
+      <p:pic>
+        <p:nvPicPr>
+          <p:cNvPr id="3" name="Picture 2" descr="fig10_convergence_fragmentation.png"/>
+          <p:cNvPicPr>
+            <a:picLocks noChangeAspect="1"/>
+          </p:cNvPicPr>
+          <p:nvPr/>
+        </p:nvPicPr>
+        <p:blipFill>
+          <a:blip r:embed="rId2"/>
+          <a:stretch>
+            <a:fillRect/>
+          </a:stretch>
+        </p:blipFill>
+        <p:spPr>
+          <a:xfrm>
+            <a:off x="274320" y="868680"/>
+            <a:ext cx="11612880" cy="5394960"/>
+          </a:xfrm>
+          <a:prstGeom prst="rect">
+            <a:avLst/>
+          </a:prstGeom>
+        </p:spPr>
+      </p:pic>
+      <p:sp>
+        <p:nvSpPr>
+          <p:cNvPr id="4" name="TextBox 3"/>
           <p:cNvSpPr txBox="1"/>
           <p:nvPr/>
         </p:nvSpPr>
         <p:spPr>
           <a:xfrm>
-            <a:off x="365760" y="1097280"/>
-            <a:ext cx="11430000" cy="5303520"/>
+            <a:off x="365760" y="6355080"/>
+            <a:ext cx="11430000" cy="457200"/>
           </a:xfrm>
           <a:prstGeom prst="rect">
             <a:avLst/>
@@ -4782,98 +4379,20 @@
           <a:noFill/>
         </p:spPr>
         <p:txBody>
-          <a:bodyPr wrap="square">
+          <a:bodyPr wrap="none">
             <a:spAutoFit/>
           </a:bodyPr>
           <a:lstStyle/>
           <a:p>
             <a:pPr>
-              <a:spcAft>
-                <a:spcPts val="1000"/>
-              </a:spcAft>
-              <a:defRPr sz="1600">
-                <a:solidFill>
-                  <a:srgbClr val="505050"/>
-                </a:solidFill>
-              </a:defRPr>
-            </a:pPr>
-            <a:r>
-              <a:t>• 1995: IT-DE spread = 446bp, ES-DE = 384bp (pre-EMU divergence)</a:t>
-            </a:r>
-          </a:p>
-          <a:p>
-            <a:pPr>
-              <a:spcAft>
-                <a:spcPts val="1000"/>
-              </a:spcAft>
-              <a:defRPr sz="1600">
-                <a:solidFill>
-                  <a:srgbClr val="505050"/>
-                </a:solidFill>
-              </a:defRPr>
-            </a:pPr>
-            <a:r>
-              <a:t>• 1999: IT-DE spread = 17bp, ES-DE = 13bp (EMU convergence complete)</a:t>
-            </a:r>
-          </a:p>
-          <a:p>
-            <a:pPr>
-              <a:spcAft>
-                <a:spcPts val="1000"/>
-              </a:spcAft>
-              <a:defRPr sz="1600">
-                <a:solidFill>
-                  <a:srgbClr val="505050"/>
-                </a:solidFill>
-              </a:defRPr>
-            </a:pPr>
-            <a:r>
-              <a:t>• 2011: IT-DE spread = 553bp, ES-DE = 626bp (crisis fragmentation)</a:t>
-            </a:r>
-          </a:p>
-          <a:p>
-            <a:pPr>
-              <a:spcAft>
-                <a:spcPts val="1000"/>
-              </a:spcAft>
-              <a:defRPr sz="1600">
-                <a:solidFill>
-                  <a:srgbClr val="505050"/>
-                </a:solidFill>
-              </a:defRPr>
-            </a:pPr>
-            <a:r>
-              <a:t>• 2012: Draghi "whatever it takes" → spreads compressed to 150bp</a:t>
-            </a:r>
-          </a:p>
-          <a:p>
-            <a:pPr>
-              <a:spcAft>
-                <a:spcPts val="1000"/>
-              </a:spcAft>
-              <a:defRPr sz="1600">
-                <a:solidFill>
-                  <a:srgbClr val="505050"/>
-                </a:solidFill>
-              </a:defRPr>
-            </a:pPr>
-            <a:r>
-              <a:t>• 2024: FR-DE spread hits 87bp (French political crisis)</a:t>
-            </a:r>
-          </a:p>
-          <a:p>
-            <a:pPr>
-              <a:spcAft>
-                <a:spcPts val="1000"/>
-              </a:spcAft>
-              <a:defRPr sz="1600">
-                <a:solidFill>
-                  <a:srgbClr val="505050"/>
-                </a:solidFill>
-              </a:defRPr>
-            </a:pPr>
-            <a:r>
-              <a:t>• Today: Spillover intensity at 30-year highs (68-70%)</a:t>
+              <a:defRPr sz="1100" i="1">
+                <a:solidFill>
+                  <a:srgbClr val="505050"/>
+                </a:solidFill>
+              </a:defRPr>
+            </a:pPr>
+            <a:r>
+              <a:t>Pre-EMU convergence (1995-98) → EMU harmony (1999-07) → Crisis fragmentation (2010-12) → QE compression → Current tightening</a:t>
             </a:r>
           </a:p>
         </p:txBody>
@@ -4898,57 +4417,14 @@
       <p:grpSpPr/>
       <p:sp>
         <p:nvSpPr>
-          <p:cNvPr id="2" name="Rectangle 1"/>
-          <p:cNvSpPr/>
-          <p:nvPr/>
-        </p:nvSpPr>
-        <p:spPr>
-          <a:xfrm>
-            <a:off x="0" y="0"/>
-            <a:ext cx="12191695" cy="6858000"/>
-          </a:xfrm>
-          <a:prstGeom prst="rect">
-            <a:avLst/>
-          </a:prstGeom>
-          <a:solidFill>
-            <a:srgbClr val="003299"/>
-          </a:solidFill>
-          <a:ln>
-            <a:noFill/>
-          </a:ln>
-        </p:spPr>
-        <p:style>
-          <a:lnRef idx="1">
-            <a:schemeClr val="accent1"/>
-          </a:lnRef>
-          <a:fillRef idx="3">
-            <a:schemeClr val="accent1"/>
-          </a:fillRef>
-          <a:effectRef idx="2">
-            <a:schemeClr val="accent1"/>
-          </a:effectRef>
-          <a:fontRef idx="minor">
-            <a:schemeClr val="lt1"/>
-          </a:fontRef>
-        </p:style>
-        <p:txBody>
-          <a:bodyPr rtlCol="0" anchor="ctr"/>
-          <a:lstStyle/>
-          <a:p>
-            <a:pPr algn="ctr"/>
-          </a:p>
-        </p:txBody>
-      </p:sp>
-      <p:sp>
-        <p:nvSpPr>
-          <p:cNvPr id="3" name="TextBox 2"/>
+          <p:cNvPr id="2" name="TextBox 1"/>
           <p:cNvSpPr txBox="1"/>
           <p:nvPr/>
         </p:nvSpPr>
         <p:spPr>
           <a:xfrm>
-            <a:off x="457200" y="2286000"/>
-            <a:ext cx="11277295" cy="914400"/>
+            <a:off x="365760" y="182880"/>
+            <a:ext cx="11430000" cy="640080"/>
           </a:xfrm>
           <a:prstGeom prst="rect">
             <a:avLst/>
@@ -4961,15 +4437,15 @@
           </a:bodyPr>
           <a:lstStyle/>
           <a:p>
-            <a:pPr algn="ctr">
-              <a:defRPr sz="7200" b="1">
-                <a:solidFill>
-                  <a:srgbClr val="FFFFFF"/>
-                </a:solidFill>
-              </a:defRPr>
-            </a:pPr>
-            <a:r>
-              <a:t>I</a:t>
+            <a:pPr>
+              <a:defRPr sz="2600" b="1">
+                <a:solidFill>
+                  <a:srgbClr val="003299"/>
+                </a:solidFill>
+              </a:defRPr>
+            </a:pPr>
+            <a:r>
+              <a:t>Market Integration: The Spillover Index</a:t>
             </a:r>
           </a:p>
         </p:txBody>
@@ -4982,8 +4458,8 @@
         </p:nvSpPr>
         <p:spPr>
           <a:xfrm>
-            <a:off x="457200" y="3200400"/>
-            <a:ext cx="11277295" cy="1371600"/>
+            <a:off x="365760" y="6355080"/>
+            <a:ext cx="11430000" cy="457200"/>
           </a:xfrm>
           <a:prstGeom prst="rect">
             <a:avLst/>
@@ -4996,19 +4472,43 @@
           </a:bodyPr>
           <a:lstStyle/>
           <a:p>
-            <a:pPr algn="ctr">
-              <a:defRPr sz="4000" b="1">
-                <a:solidFill>
-                  <a:srgbClr val="FFFFFF"/>
-                </a:solidFill>
-              </a:defRPr>
-            </a:pPr>
-            <a:r>
-              <a:t>The Historical Arc</a:t>
-            </a:r>
-          </a:p>
-        </p:txBody>
-      </p:sp>
+            <a:pPr>
+              <a:defRPr sz="1100" i="1">
+                <a:solidFill>
+                  <a:srgbClr val="505050"/>
+                </a:solidFill>
+              </a:defRPr>
+            </a:pPr>
+            <a:r>
+              <a:t>Higher spillover = tighter integration. Note: Integration FALLS during crises (2010-12) and RISES during tightening (2022+)</a:t>
+            </a:r>
+          </a:p>
+        </p:txBody>
+      </p:sp>
+      <p:pic>
+        <p:nvPicPr>
+          <p:cNvPr id="5" name="Picture 4" descr="fig01_total_spillover_clean.png"/>
+          <p:cNvPicPr>
+            <a:picLocks noChangeAspect="1"/>
+          </p:cNvPicPr>
+          <p:nvPr/>
+        </p:nvPicPr>
+        <p:blipFill>
+          <a:blip r:embed="rId3"/>
+          <a:stretch>
+            <a:fillRect/>
+          </a:stretch>
+        </p:blipFill>
+        <p:spPr>
+          <a:xfrm>
+            <a:off x="457200" y="1371600"/>
+            <a:ext cx="8686800" cy="3751497"/>
+          </a:xfrm>
+          <a:prstGeom prst="rect">
+            <a:avLst/>
+          </a:prstGeom>
+        </p:spPr>
+      </p:pic>
     </p:spTree>
   </p:cSld>
   <p:clrMapOvr>
@@ -5029,14 +4529,57 @@
       <p:grpSpPr/>
       <p:sp>
         <p:nvSpPr>
-          <p:cNvPr id="2" name="TextBox 1"/>
+          <p:cNvPr id="2" name="Rectangle 1"/>
+          <p:cNvSpPr/>
+          <p:nvPr/>
+        </p:nvSpPr>
+        <p:spPr>
+          <a:xfrm>
+            <a:off x="0" y="0"/>
+            <a:ext cx="12191695" cy="6858000"/>
+          </a:xfrm>
+          <a:prstGeom prst="rect">
+            <a:avLst/>
+          </a:prstGeom>
+          <a:solidFill>
+            <a:srgbClr val="003299"/>
+          </a:solidFill>
+          <a:ln>
+            <a:noFill/>
+          </a:ln>
+        </p:spPr>
+        <p:style>
+          <a:lnRef idx="1">
+            <a:schemeClr val="accent1"/>
+          </a:lnRef>
+          <a:fillRef idx="3">
+            <a:schemeClr val="accent1"/>
+          </a:fillRef>
+          <a:effectRef idx="2">
+            <a:schemeClr val="accent1"/>
+          </a:effectRef>
+          <a:fontRef idx="minor">
+            <a:schemeClr val="lt1"/>
+          </a:fontRef>
+        </p:style>
+        <p:txBody>
+          <a:bodyPr rtlCol="0" anchor="ctr"/>
+          <a:lstStyle/>
+          <a:p>
+            <a:pPr algn="ctr"/>
+          </a:p>
+        </p:txBody>
+      </p:sp>
+      <p:sp>
+        <p:nvSpPr>
+          <p:cNvPr id="3" name="TextBox 2"/>
           <p:cNvSpPr txBox="1"/>
           <p:nvPr/>
         </p:nvSpPr>
         <p:spPr>
           <a:xfrm>
-            <a:off x="365760" y="182880"/>
-            <a:ext cx="11430000" cy="640080"/>
+            <a:off x="457200" y="2286000"/>
+            <a:ext cx="11277295" cy="914400"/>
           </a:xfrm>
           <a:prstGeom prst="rect">
             <a:avLst/>
@@ -5049,43 +4592,19 @@
           </a:bodyPr>
           <a:lstStyle/>
           <a:p>
-            <a:pPr>
-              <a:defRPr sz="2600" b="1">
-                <a:solidFill>
-                  <a:srgbClr val="003299"/>
-                </a:solidFill>
-              </a:defRPr>
-            </a:pPr>
-            <a:r>
-              <a:t>30 Years of Convergence and Fragmentation</a:t>
-            </a:r>
-          </a:p>
-        </p:txBody>
-      </p:sp>
-      <p:pic>
-        <p:nvPicPr>
-          <p:cNvPr id="3" name="Picture 2" descr="fig10_convergence_fragmentation.png"/>
-          <p:cNvPicPr>
-            <a:picLocks noChangeAspect="1"/>
-          </p:cNvPicPr>
-          <p:nvPr/>
-        </p:nvPicPr>
-        <p:blipFill>
-          <a:blip r:embed="rId2"/>
-          <a:stretch>
-            <a:fillRect/>
-          </a:stretch>
-        </p:blipFill>
-        <p:spPr>
-          <a:xfrm>
-            <a:off x="274320" y="868680"/>
-            <a:ext cx="11612880" cy="5394960"/>
-          </a:xfrm>
-          <a:prstGeom prst="rect">
-            <a:avLst/>
-          </a:prstGeom>
-        </p:spPr>
-      </p:pic>
+            <a:pPr algn="ctr">
+              <a:defRPr sz="7200" b="1">
+                <a:solidFill>
+                  <a:srgbClr val="FFFFFF"/>
+                </a:solidFill>
+              </a:defRPr>
+            </a:pPr>
+            <a:r>
+              <a:t>II</a:t>
+            </a:r>
+          </a:p>
+        </p:txBody>
+      </p:sp>
       <p:sp>
         <p:nvSpPr>
           <p:cNvPr id="4" name="TextBox 3"/>
@@ -5094,8 +4613,8 @@
         </p:nvSpPr>
         <p:spPr>
           <a:xfrm>
-            <a:off x="365760" y="6355080"/>
-            <a:ext cx="11430000" cy="457200"/>
+            <a:off x="457200" y="3200400"/>
+            <a:ext cx="11277295" cy="1371600"/>
           </a:xfrm>
           <a:prstGeom prst="rect">
             <a:avLst/>
@@ -5108,15 +4627,15 @@
           </a:bodyPr>
           <a:lstStyle/>
           <a:p>
-            <a:pPr>
-              <a:defRPr sz="1100" i="1">
-                <a:solidFill>
-                  <a:srgbClr val="505050"/>
-                </a:solidFill>
-              </a:defRPr>
-            </a:pPr>
-            <a:r>
-              <a:t>Pre-EMU convergence (1995-98) → EMU harmony (1999-07) → Crisis fragmentation (2010-12) → QE compression → Current tightening</a:t>
+            <a:pPr algn="ctr">
+              <a:defRPr sz="4000" b="1">
+                <a:solidFill>
+                  <a:srgbClr val="FFFFFF"/>
+                </a:solidFill>
+              </a:defRPr>
+            </a:pPr>
+            <a:r>
+              <a:t>Four Key Findings</a:t>
             </a:r>
           </a:p>
         </p:txBody>
@@ -5147,8 +4666,8 @@
         </p:nvSpPr>
         <p:spPr>
           <a:xfrm>
-            <a:off x="365760" y="182880"/>
-            <a:ext cx="11430000" cy="640080"/>
+            <a:off x="365760" y="274320"/>
+            <a:ext cx="914400" cy="731520"/>
           </a:xfrm>
           <a:prstGeom prst="rect">
             <a:avLst/>
@@ -5162,21 +4681,269 @@
           <a:lstStyle/>
           <a:p>
             <a:pPr>
-              <a:defRPr sz="2600" b="1">
+              <a:defRPr sz="3600" b="1">
+                <a:solidFill>
+                  <a:srgbClr val="007816"/>
+                </a:solidFill>
+              </a:defRPr>
+            </a:pPr>
+            <a:r>
+              <a:t>#1</a:t>
+            </a:r>
+          </a:p>
+        </p:txBody>
+      </p:sp>
+      <p:sp>
+        <p:nvSpPr>
+          <p:cNvPr id="3" name="TextBox 2"/>
+          <p:cNvSpPr txBox="1"/>
+          <p:nvPr/>
+        </p:nvSpPr>
+        <p:spPr>
+          <a:xfrm>
+            <a:off x="1371600" y="320040"/>
+            <a:ext cx="10058400" cy="731520"/>
+          </a:xfrm>
+          <a:prstGeom prst="rect">
+            <a:avLst/>
+          </a:prstGeom>
+          <a:noFill/>
+        </p:spPr>
+        <p:txBody>
+          <a:bodyPr wrap="none">
+            <a:spAutoFit/>
+          </a:bodyPr>
+          <a:lstStyle/>
+          <a:p>
+            <a:pPr>
+              <a:defRPr sz="2800" b="1">
                 <a:solidFill>
                   <a:srgbClr val="003299"/>
                 </a:solidFill>
               </a:defRPr>
             </a:pPr>
             <a:r>
-              <a:t>Market Integration: The Spillover Index</a:t>
+              <a:rPr sz="1600">
+                <a:solidFill>
+                  <a:srgbClr val="003264"/>
+                </a:solidFill>
+              </a:rPr>
+              <a:t>• France has overtaken Germany as the largest net transmitter since 2015</a:t>
+            </a:r>
+          </a:p>
+          <a:p>
+            <a:r>
+              <a:rPr sz="1600">
+                <a:solidFill>
+                  <a:srgbClr val="003264"/>
+                </a:solidFill>
+              </a:rPr>
+              <a:t>• The French OAT acts as a 'pivot' between core and periphery:</a:t>
+            </a:r>
+          </a:p>
+          <a:p>
+            <a:r>
+              <a:rPr sz="1600">
+                <a:solidFill>
+                  <a:srgbClr val="003264"/>
+                </a:solidFill>
+              </a:rPr>
+              <a:t>•    → Transmits shocks TO Germany: ~22% of German yield variance</a:t>
+            </a:r>
+          </a:p>
+          <a:p>
+            <a:r>
+              <a:rPr sz="1600">
+                <a:solidFill>
+                  <a:srgbClr val="003264"/>
+                </a:solidFill>
+              </a:rPr>
+              <a:t>•    → Transmits shocks TO periphery (Italy, Spain): key spillover channel</a:t>
+            </a:r>
+          </a:p>
+          <a:p>
+            <a:r>
+              <a:rPr sz="1600">
+                <a:solidFill>
+                  <a:srgbClr val="003264"/>
+                </a:solidFill>
+              </a:rPr>
+              <a:t>• During 2024 political turmoil, France REMAINED a net transmitter</a:t>
+            </a:r>
+          </a:p>
+          <a:p>
+            <a:r>
+              <a:rPr sz="1600">
+                <a:solidFill>
+                  <a:srgbClr val="003264"/>
+                </a:solidFill>
+              </a:rPr>
+              <a:t>• Policy implication: French fiscal stress propagates both directions</a:t>
+            </a:r>
+          </a:p>
+        </p:txBody>
+      </p:sp>
+      <p:sp>
+        <p:nvSpPr>
+          <p:cNvPr id="5" name="TextBox 4"/>
+          <p:cNvSpPr txBox="1"/>
+          <p:nvPr/>
+        </p:nvSpPr>
+        <p:spPr>
+          <a:xfrm>
+            <a:off x="365760" y="1097280"/>
+            <a:ext cx="4572000" cy="5303520"/>
+          </a:xfrm>
+          <a:prstGeom prst="rect">
+            <a:avLst/>
+          </a:prstGeom>
+          <a:noFill/>
+        </p:spPr>
+        <p:txBody>
+          <a:bodyPr wrap="square">
+            <a:spAutoFit/>
+          </a:bodyPr>
+          <a:lstStyle/>
+          <a:p>
+            <a:pPr>
+              <a:spcAft>
+                <a:spcPts val="800"/>
+              </a:spcAft>
+              <a:defRPr sz="1500">
+                <a:solidFill>
+                  <a:srgbClr val="505050"/>
+                </a:solidFill>
+              </a:defRPr>
+            </a:pPr>
+            <a:r>
+              <a:t>• France has overtaken Germany as the largest net transmitter since 2015</a:t>
+            </a:r>
+          </a:p>
+          <a:p>
+            <a:pPr>
+              <a:spcAft>
+                <a:spcPts val="800"/>
+              </a:spcAft>
+              <a:defRPr sz="1500">
+                <a:solidFill>
+                  <a:srgbClr val="505050"/>
+                </a:solidFill>
+              </a:defRPr>
+            </a:pPr>
+            <a:r>
+              <a:t>• What does 'pivot' mean? France transmits shocks in BOTH directions:</a:t>
+            </a:r>
+          </a:p>
+          <a:p>
+            <a:pPr>
+              <a:spcAft>
+                <a:spcPts val="800"/>
+              </a:spcAft>
+              <a:defRPr sz="1500">
+                <a:solidFill>
+                  <a:srgbClr val="505050"/>
+                </a:solidFill>
+              </a:defRPr>
+            </a:pPr>
+            <a:r>
+              <a:t>•   → To Germany (core): ~22% of German yield variance</a:t>
+            </a:r>
+          </a:p>
+          <a:p>
+            <a:pPr>
+              <a:spcAft>
+                <a:spcPts val="800"/>
+              </a:spcAft>
+              <a:defRPr sz="1500">
+                <a:solidFill>
+                  <a:srgbClr val="505050"/>
+                </a:solidFill>
+              </a:defRPr>
+            </a:pPr>
+            <a:r>
+              <a:t>•   → To Italy/Spain (periphery): ~18% of their variance</a:t>
+            </a:r>
+          </a:p>
+          <a:p>
+            <a:pPr>
+              <a:spcAft>
+                <a:spcPts val="800"/>
+              </a:spcAft>
+              <a:defRPr sz="1500">
+                <a:solidFill>
+                  <a:srgbClr val="505050"/>
+                </a:solidFill>
+              </a:defRPr>
+            </a:pPr>
+            <a:r>
+              <a:t>• This makes France the key link in the Euro Area yield system</a:t>
+            </a:r>
+          </a:p>
+          <a:p>
+            <a:pPr>
+              <a:spcAft>
+                <a:spcPts val="800"/>
+              </a:spcAft>
+              <a:defRPr sz="1500">
+                <a:solidFill>
+                  <a:srgbClr val="505050"/>
+                </a:solidFill>
+              </a:defRPr>
+            </a:pPr>
+            <a:r>
+              <a:t>• When France moves, BOTH core and periphery follow</a:t>
+            </a:r>
+          </a:p>
+          <a:p>
+            <a:pPr>
+              <a:spcAft>
+                <a:spcPts val="800"/>
+              </a:spcAft>
+              <a:defRPr sz="1500">
+                <a:solidFill>
+                  <a:srgbClr val="505050"/>
+                </a:solidFill>
+              </a:defRPr>
+            </a:pPr>
+            <a:r>
+              <a:t>• 2024 political crisis: FR-DE spread hit 87bp, but France</a:t>
+            </a:r>
+          </a:p>
+          <a:p>
+            <a:pPr>
+              <a:spcAft>
+                <a:spcPts val="800"/>
+              </a:spcAft>
+              <a:defRPr sz="1500">
+                <a:solidFill>
+                  <a:srgbClr val="505050"/>
+                </a:solidFill>
+              </a:defRPr>
+            </a:pPr>
+            <a:r>
+              <a:t>• remained a net transmitter (average +29, always positive)</a:t>
+            </a:r>
+          </a:p>
+          <a:p>
+            <a:pPr>
+              <a:spcAft>
+                <a:spcPts val="800"/>
+              </a:spcAft>
+              <a:defRPr sz="1500">
+                <a:solidFill>
+                  <a:srgbClr val="505050"/>
+                </a:solidFill>
+              </a:defRPr>
+            </a:pPr>
+            <a:r>
+              <a:t>• Key insight: ECB credibility contained contagion to periphery</a:t>
             </a:r>
           </a:p>
         </p:txBody>
       </p:sp>
       <p:pic>
         <p:nvPicPr>
-          <p:cNvPr id="3" name="Picture 2" descr="fig01_total_spillover.png"/>
+          <p:cNvPr id="6" name="Picture 5" descr="image.png"/>
           <p:cNvPicPr>
             <a:picLocks noChangeAspect="1"/>
           </p:cNvPicPr>
@@ -5190,49 +4957,14 @@
         </p:blipFill>
         <p:spPr>
           <a:xfrm>
-            <a:off x="274320" y="868680"/>
-            <a:ext cx="11612880" cy="5394960"/>
+            <a:off x="4572000" y="822960"/>
+            <a:ext cx="4572000" cy="3255352"/>
           </a:xfrm>
           <a:prstGeom prst="rect">
             <a:avLst/>
           </a:prstGeom>
         </p:spPr>
       </p:pic>
-      <p:sp>
-        <p:nvSpPr>
-          <p:cNvPr id="4" name="TextBox 3"/>
-          <p:cNvSpPr txBox="1"/>
-          <p:nvPr/>
-        </p:nvSpPr>
-        <p:spPr>
-          <a:xfrm>
-            <a:off x="365760" y="6355080"/>
-            <a:ext cx="11430000" cy="457200"/>
-          </a:xfrm>
-          <a:prstGeom prst="rect">
-            <a:avLst/>
-          </a:prstGeom>
-          <a:noFill/>
-        </p:spPr>
-        <p:txBody>
-          <a:bodyPr wrap="none">
-            <a:spAutoFit/>
-          </a:bodyPr>
-          <a:lstStyle/>
-          <a:p>
-            <a:pPr>
-              <a:defRPr sz="1100" i="1">
-                <a:solidFill>
-                  <a:srgbClr val="505050"/>
-                </a:solidFill>
-              </a:defRPr>
-            </a:pPr>
-            <a:r>
-              <a:t>Higher spillover = tighter integration. Note: Integration FALLS during crises (2010-12) and RISES during tightening (2022+)</a:t>
-            </a:r>
-          </a:p>
-        </p:txBody>
-      </p:sp>
     </p:spTree>
   </p:cSld>
   <p:clrMapOvr>
@@ -5253,57 +4985,14 @@
       <p:grpSpPr/>
       <p:sp>
         <p:nvSpPr>
-          <p:cNvPr id="2" name="Rectangle 1"/>
-          <p:cNvSpPr/>
-          <p:nvPr/>
-        </p:nvSpPr>
-        <p:spPr>
-          <a:xfrm>
-            <a:off x="0" y="0"/>
-            <a:ext cx="12191695" cy="6858000"/>
-          </a:xfrm>
-          <a:prstGeom prst="rect">
-            <a:avLst/>
-          </a:prstGeom>
-          <a:solidFill>
-            <a:srgbClr val="003299"/>
-          </a:solidFill>
-          <a:ln>
-            <a:noFill/>
-          </a:ln>
-        </p:spPr>
-        <p:style>
-          <a:lnRef idx="1">
-            <a:schemeClr val="accent1"/>
-          </a:lnRef>
-          <a:fillRef idx="3">
-            <a:schemeClr val="accent1"/>
-          </a:fillRef>
-          <a:effectRef idx="2">
-            <a:schemeClr val="accent1"/>
-          </a:effectRef>
-          <a:fontRef idx="minor">
-            <a:schemeClr val="lt1"/>
-          </a:fontRef>
-        </p:style>
-        <p:txBody>
-          <a:bodyPr rtlCol="0" anchor="ctr"/>
-          <a:lstStyle/>
-          <a:p>
-            <a:pPr algn="ctr"/>
-          </a:p>
-        </p:txBody>
-      </p:sp>
-      <p:sp>
-        <p:nvSpPr>
-          <p:cNvPr id="3" name="TextBox 2"/>
+          <p:cNvPr id="2" name="TextBox 1"/>
           <p:cNvSpPr txBox="1"/>
           <p:nvPr/>
         </p:nvSpPr>
         <p:spPr>
           <a:xfrm>
-            <a:off x="457200" y="2286000"/>
-            <a:ext cx="11277295" cy="914400"/>
+            <a:off x="365760" y="274320"/>
+            <a:ext cx="914400" cy="731520"/>
           </a:xfrm>
           <a:prstGeom prst="rect">
             <a:avLst/>
@@ -5316,29 +5005,29 @@
           </a:bodyPr>
           <a:lstStyle/>
           <a:p>
-            <a:pPr algn="ctr">
-              <a:defRPr sz="7200" b="1">
-                <a:solidFill>
-                  <a:srgbClr val="FFFFFF"/>
-                </a:solidFill>
-              </a:defRPr>
-            </a:pPr>
-            <a:r>
-              <a:t>II</a:t>
-            </a:r>
-          </a:p>
-        </p:txBody>
-      </p:sp>
-      <p:sp>
-        <p:nvSpPr>
-          <p:cNvPr id="4" name="TextBox 3"/>
+            <a:pPr>
+              <a:defRPr sz="3600" b="1">
+                <a:solidFill>
+                  <a:srgbClr val="007816"/>
+                </a:solidFill>
+              </a:defRPr>
+            </a:pPr>
+            <a:r>
+              <a:t>#2</a:t>
+            </a:r>
+          </a:p>
+        </p:txBody>
+      </p:sp>
+      <p:sp>
+        <p:nvSpPr>
+          <p:cNvPr id="3" name="TextBox 2"/>
           <p:cNvSpPr txBox="1"/>
           <p:nvPr/>
         </p:nvSpPr>
         <p:spPr>
           <a:xfrm>
-            <a:off x="457200" y="3200400"/>
-            <a:ext cx="11277295" cy="1371600"/>
+            <a:off x="1371600" y="320040"/>
+            <a:ext cx="10058400" cy="731520"/>
           </a:xfrm>
           <a:prstGeom prst="rect">
             <a:avLst/>
@@ -5351,15 +5040,167 @@
           </a:bodyPr>
           <a:lstStyle/>
           <a:p>
-            <a:pPr algn="ctr">
-              <a:defRPr sz="4000" b="1">
-                <a:solidFill>
-                  <a:srgbClr val="FFFFFF"/>
-                </a:solidFill>
-              </a:defRPr>
-            </a:pPr>
-            <a:r>
-              <a:t>Four Key Findings</a:t>
+            <a:pPr>
+              <a:defRPr sz="2800" b="1">
+                <a:solidFill>
+                  <a:srgbClr val="003299"/>
+                </a:solidFill>
+              </a:defRPr>
+            </a:pPr>
+            <a:r>
+              <a:t>Spain is the Most Vulnerable Market</a:t>
+            </a:r>
+          </a:p>
+        </p:txBody>
+      </p:sp>
+      <p:pic>
+        <p:nvPicPr>
+          <p:cNvPr id="4" name="Picture 3" descr="fig06_regime_comparison.png"/>
+          <p:cNvPicPr>
+            <a:picLocks noChangeAspect="1"/>
+          </p:cNvPicPr>
+          <p:nvPr/>
+        </p:nvPicPr>
+        <p:blipFill>
+          <a:blip r:embed="rId2"/>
+          <a:stretch>
+            <a:fillRect/>
+          </a:stretch>
+        </p:blipFill>
+        <p:spPr>
+          <a:xfrm>
+            <a:off x="5303520" y="1097280"/>
+            <a:ext cx="6583680" cy="5120640"/>
+          </a:xfrm>
+          <a:prstGeom prst="rect">
+            <a:avLst/>
+          </a:prstGeom>
+        </p:spPr>
+      </p:pic>
+      <p:sp>
+        <p:nvSpPr>
+          <p:cNvPr id="5" name="TextBox 4"/>
+          <p:cNvSpPr txBox="1"/>
+          <p:nvPr/>
+        </p:nvSpPr>
+        <p:spPr>
+          <a:xfrm>
+            <a:off x="365760" y="1097280"/>
+            <a:ext cx="4572000" cy="5303520"/>
+          </a:xfrm>
+          <a:prstGeom prst="rect">
+            <a:avLst/>
+          </a:prstGeom>
+          <a:noFill/>
+        </p:spPr>
+        <p:txBody>
+          <a:bodyPr wrap="square">
+            <a:spAutoFit/>
+          </a:bodyPr>
+          <a:lstStyle/>
+          <a:p>
+            <a:pPr>
+              <a:spcAft>
+                <a:spcPts val="800"/>
+              </a:spcAft>
+              <a:defRPr sz="1500">
+                <a:solidFill>
+                  <a:srgbClr val="505050"/>
+                </a:solidFill>
+              </a:defRPr>
+            </a:pPr>
+            <a:r>
+              <a:t>• Spain is the largest net receiver in the 7-country system</a:t>
+            </a:r>
+          </a:p>
+          <a:p>
+            <a:pPr>
+              <a:spcAft>
+                <a:spcPts val="800"/>
+              </a:spcAft>
+              <a:defRPr sz="1500">
+                <a:solidFill>
+                  <a:srgbClr val="505050"/>
+                </a:solidFill>
+              </a:defRPr>
+            </a:pPr>
+            <a:r>
+              <a:t>• Net spillover position = -39 (receives far more than it transmits)</a:t>
+            </a:r>
+          </a:p>
+          <a:p>
+            <a:pPr>
+              <a:spcAft>
+                <a:spcPts val="800"/>
+              </a:spcAft>
+              <a:defRPr sz="1500">
+                <a:solidFill>
+                  <a:srgbClr val="505050"/>
+                </a:solidFill>
+              </a:defRPr>
+            </a:pPr>
+            <a:r>
+              <a:t>• During tightening (2022+): Spain receives 83% of variance from others</a:t>
+            </a:r>
+          </a:p>
+          <a:p>
+            <a:pPr>
+              <a:spcAft>
+                <a:spcPts val="800"/>
+              </a:spcAft>
+              <a:defRPr sz="1500">
+                <a:solidFill>
+                  <a:srgbClr val="505050"/>
+                </a:solidFill>
+              </a:defRPr>
+            </a:pPr>
+            <a:r>
+              <a:t>• More vulnerable than Italy (ES receives 67% vs IT receives 61%)</a:t>
+            </a:r>
+          </a:p>
+          <a:p>
+            <a:pPr>
+              <a:spcAft>
+                <a:spcPts val="800"/>
+              </a:spcAft>
+              <a:defRPr sz="1500">
+                <a:solidFill>
+                  <a:srgbClr val="505050"/>
+                </a:solidFill>
+              </a:defRPr>
+            </a:pPr>
+            <a:r>
+              <a:t>• Spanish yields are 'price takers' - driven by EA-wide shocks</a:t>
+            </a:r>
+          </a:p>
+          <a:p>
+            <a:pPr>
+              <a:spcAft>
+                <a:spcPts val="800"/>
+              </a:spcAft>
+              <a:defRPr sz="1500">
+                <a:solidFill>
+                  <a:srgbClr val="505050"/>
+                </a:solidFill>
+              </a:defRPr>
+            </a:pPr>
+            <a:r>
+              <a:t>• Policy implication: Spanish yields tell you about EA conditions,</a:t>
+            </a:r>
+          </a:p>
+          <a:p>
+            <a:pPr>
+              <a:spcAft>
+                <a:spcPts val="800"/>
+              </a:spcAft>
+              <a:defRPr sz="1500">
+                <a:solidFill>
+                  <a:srgbClr val="505050"/>
+                </a:solidFill>
+              </a:defRPr>
+            </a:pPr>
+            <a:r>
+              <a:t>• but Spanish fiscal policy has limited impact on EA dynamics</a:t>
             </a:r>
           </a:p>
         </p:txBody>
@@ -5412,7 +5253,7 @@
               </a:defRPr>
             </a:pPr>
             <a:r>
-              <a:t>#1</a:t>
+              <a:t>#3</a:t>
             </a:r>
           </a:p>
         </p:txBody>
@@ -5447,14 +5288,14 @@
               </a:defRPr>
             </a:pPr>
             <a:r>
-              <a:t>France: The Pivot Between Core and Periphery</a:t>
+              <a:t>Euro Area Dynamics are Mostly Internal</a:t>
             </a:r>
           </a:p>
         </p:txBody>
       </p:sp>
       <p:pic>
         <p:nvPicPr>
-          <p:cNvPr id="4" name="Picture 3" descr="fig11_france_role.png"/>
+          <p:cNvPr id="4" name="Picture 3" descr="fig03_external_vs_internal.png"/>
           <p:cNvPicPr>
             <a:picLocks noChangeAspect="1"/>
           </p:cNvPicPr>
@@ -5509,7 +5350,7 @@
               </a:defRPr>
             </a:pPr>
             <a:r>
-              <a:t>• France has overtaken Germany as the largest net transmitter since 2015</a:t>
+              <a:t>• Within-EA spillovers (~14%) consistently exceed external (~8%)</a:t>
             </a:r>
           </a:p>
           <a:p>
@@ -5524,7 +5365,7 @@
               </a:defRPr>
             </a:pPr>
             <a:r>
-              <a:t>• What does 'pivot' mean? France transmits shocks in BOTH directions:</a:t>
+              <a:t>• Ratio: Internal ≈ 1.7x External on average</a:t>
             </a:r>
           </a:p>
           <a:p>
@@ -5539,7 +5380,7 @@
               </a:defRPr>
             </a:pPr>
             <a:r>
-              <a:t>•   → To Germany (core): ~22% of German yield variance</a:t>
+              <a:t>• US influence peaks during Fed pivots (15% during 2022-23 hiking)</a:t>
             </a:r>
           </a:p>
           <a:p>
@@ -5554,7 +5395,7 @@
               </a:defRPr>
             </a:pPr>
             <a:r>
-              <a:t>•   → To Italy/Spain (periphery): ~18% of their variance</a:t>
+              <a:t>• But even at peak, US influence &lt; intra-EA transmission</a:t>
             </a:r>
           </a:p>
           <a:p>
@@ -5569,7 +5410,7 @@
               </a:defRPr>
             </a:pPr>
             <a:r>
-              <a:t>• This makes France the key link in the Euro Area yield system</a:t>
+              <a:t>• UK influence declined post-Brexit (-12%)</a:t>
             </a:r>
           </a:p>
           <a:p>
@@ -5584,7 +5425,7 @@
               </a:defRPr>
             </a:pPr>
             <a:r>
-              <a:t>• When France moves, BOTH core and periphery follow</a:t>
+              <a:t>• Implication: ECB policy is the primary driver of EA yield dynamics</a:t>
             </a:r>
           </a:p>
           <a:p>
@@ -5599,37 +5440,7 @@
               </a:defRPr>
             </a:pPr>
             <a:r>
-              <a:t>• 2024 political crisis: FR-DE spread hit 87bp, but France</a:t>
-            </a:r>
-          </a:p>
-          <a:p>
-            <a:pPr>
-              <a:spcAft>
-                <a:spcPts val="800"/>
-              </a:spcAft>
-              <a:defRPr sz="1500">
-                <a:solidFill>
-                  <a:srgbClr val="505050"/>
-                </a:solidFill>
-              </a:defRPr>
-            </a:pPr>
-            <a:r>
-              <a:t>• remained a net transmitter (average +29, always positive)</a:t>
-            </a:r>
-          </a:p>
-          <a:p>
-            <a:pPr>
-              <a:spcAft>
-                <a:spcPts val="800"/>
-              </a:spcAft>
-              <a:defRPr sz="1500">
-                <a:solidFill>
-                  <a:srgbClr val="505050"/>
-                </a:solidFill>
-              </a:defRPr>
-            </a:pPr>
-            <a:r>
-              <a:t>• Key insight: ECB credibility contained contagion to periphery</a:t>
+              <a:t>• External shocks matter, but the EA is largely self-referential</a:t>
             </a:r>
           </a:p>
         </p:txBody>
@@ -5682,7 +5493,7 @@
               </a:defRPr>
             </a:pPr>
             <a:r>
-              <a:t>#2</a:t>
+              <a:t>#4</a:t>
             </a:r>
           </a:p>
         </p:txBody>
@@ -5717,163 +5528,208 @@
               </a:defRPr>
             </a:pPr>
             <a:r>
-              <a:t>Spain is the Most Vulnerable Market</a:t>
+              <a:t>Japan: The Decoupling After Yield Curve Control</a:t>
+            </a:r>
+          </a:p>
+        </p:txBody>
+      </p:sp>
+      <p:sp>
+        <p:nvSpPr>
+          <p:cNvPr id="5" name="TextBox 4"/>
+          <p:cNvSpPr txBox="1"/>
+          <p:nvPr/>
+        </p:nvSpPr>
+        <p:spPr>
+          <a:xfrm>
+            <a:off x="365760" y="1097280"/>
+            <a:ext cx="4572000" cy="5303520"/>
+          </a:xfrm>
+          <a:prstGeom prst="rect">
+            <a:avLst/>
+          </a:prstGeom>
+          <a:noFill/>
+        </p:spPr>
+        <p:txBody>
+          <a:bodyPr wrap="square">
+            <a:spAutoFit/>
+          </a:bodyPr>
+          <a:lstStyle/>
+          <a:p>
+            <a:pPr>
+              <a:spcAft>
+                <a:spcPts val="800"/>
+              </a:spcAft>
+              <a:defRPr sz="1500">
+                <a:solidFill>
+                  <a:srgbClr val="505050"/>
+                </a:solidFill>
+              </a:defRPr>
+            </a:pPr>
+            <a:r>
+              <a:t>• Background: Bank of Japan's Yield Curve Control (2016-2024)</a:t>
+            </a:r>
+          </a:p>
+          <a:p>
+            <a:pPr>
+              <a:spcAft>
+                <a:spcPts val="800"/>
+              </a:spcAft>
+              <a:defRPr sz="1500">
+                <a:solidFill>
+                  <a:srgbClr val="505050"/>
+                </a:solidFill>
+              </a:defRPr>
+            </a:pPr>
+            <a:r>
+              <a:t>•   - Capped 10-year yields near 0% for 8 years</a:t>
+            </a:r>
+          </a:p>
+          <a:p>
+            <a:pPr>
+              <a:spcAft>
+                <a:spcPts val="800"/>
+              </a:spcAft>
+              <a:defRPr sz="1500">
+                <a:solidFill>
+                  <a:srgbClr val="505050"/>
+                </a:solidFill>
+              </a:defRPr>
+            </a:pPr>
+            <a:r>
+              <a:t>•   - Ended negative interest rates in March 2024</a:t>
+            </a:r>
+          </a:p>
+          <a:p>
+            <a:pPr>
+              <a:spcAft>
+                <a:spcPts val="800"/>
+              </a:spcAft>
+              <a:defRPr sz="1500">
+                <a:solidFill>
+                  <a:srgbClr val="505050"/>
+                </a:solidFill>
+              </a:defRPr>
+            </a:pPr>
+            <a:r>
+              <a:t>• Japanese yields: 0.10% (during controls) → 1.25% (after exit)</a:t>
+            </a:r>
+          </a:p>
+          <a:p>
+            <a:pPr>
+              <a:spcAft>
+                <a:spcPts val="800"/>
+              </a:spcAft>
+              <a:defRPr sz="1500">
+                <a:solidFill>
+                  <a:srgbClr val="505050"/>
+                </a:solidFill>
+              </a:defRPr>
+            </a:pPr>
+            <a:r>
+              <a:t>• First real Japanese yield steepening in 30 years</a:t>
+            </a:r>
+          </a:p>
+          <a:p>
+            <a:pPr>
+              <a:spcAft>
+                <a:spcPts val="800"/>
+              </a:spcAft>
+              <a:defRPr sz="1500">
+                <a:solidFill>
+                  <a:srgbClr val="505050"/>
+                </a:solidFill>
+              </a:defRPr>
+            </a:pPr>
+            <a:r>
+              <a:t>• PARADOX: Higher Japanese yields = LESS spillover to EA</a:t>
+            </a:r>
+          </a:p>
+          <a:p>
+            <a:pPr>
+              <a:spcAft>
+                <a:spcPts val="800"/>
+              </a:spcAft>
+              <a:defRPr sz="1500">
+                <a:solidFill>
+                  <a:srgbClr val="505050"/>
+                </a:solidFill>
+              </a:defRPr>
+            </a:pPr>
+            <a:r>
+              <a:t>• Japan→EA spillover fell from 3.7% to 1.2% after policy exit</a:t>
+            </a:r>
+          </a:p>
+          <a:p>
+            <a:pPr>
+              <a:spcAft>
+                <a:spcPts val="800"/>
+              </a:spcAft>
+              <a:defRPr sz="1500">
+                <a:solidFill>
+                  <a:srgbClr val="505050"/>
+                </a:solidFill>
+              </a:defRPr>
+            </a:pPr>
+            <a:r>
+              <a:t>• Interpretation: Yield controls forced Japan to track global rates</a:t>
+            </a:r>
+          </a:p>
+          <a:p>
+            <a:pPr>
+              <a:spcAft>
+                <a:spcPts val="800"/>
+              </a:spcAft>
+              <a:defRPr sz="1500">
+                <a:solidFill>
+                  <a:srgbClr val="505050"/>
+                </a:solidFill>
+              </a:defRPr>
+            </a:pPr>
+            <a:r>
+              <a:t>• Once freed, Japanese bonds now move independently</a:t>
+            </a:r>
+          </a:p>
+          <a:p>
+            <a:pPr>
+              <a:spcAft>
+                <a:spcPts val="800"/>
+              </a:spcAft>
+              <a:defRPr sz="1500">
+                <a:solidFill>
+                  <a:srgbClr val="505050"/>
+                </a:solidFill>
+              </a:defRPr>
+            </a:pPr>
+            <a:r>
+              <a:t>• For EA policymakers: One less external transmission channel</a:t>
             </a:r>
           </a:p>
         </p:txBody>
       </p:sp>
       <p:pic>
         <p:nvPicPr>
-          <p:cNvPr id="4" name="Picture 3" descr="fig06_regime_comparison.png"/>
+          <p:cNvPr id="6" name="Picture 5" descr="fig12_japan_stacked.png"/>
           <p:cNvPicPr>
             <a:picLocks noChangeAspect="1"/>
           </p:cNvPicPr>
           <p:nvPr/>
         </p:nvPicPr>
         <p:blipFill>
-          <a:blip r:embed="rId2"/>
+          <a:blip r:embed="rId4"/>
           <a:stretch>
             <a:fillRect/>
           </a:stretch>
         </p:blipFill>
         <p:spPr>
           <a:xfrm>
-            <a:off x="5303520" y="1097280"/>
-            <a:ext cx="6583680" cy="5120640"/>
+            <a:off x="4754880" y="640080"/>
+            <a:ext cx="4578029" cy="6126480"/>
           </a:xfrm>
           <a:prstGeom prst="rect">
             <a:avLst/>
           </a:prstGeom>
         </p:spPr>
       </p:pic>
-      <p:sp>
-        <p:nvSpPr>
-          <p:cNvPr id="5" name="TextBox 4"/>
-          <p:cNvSpPr txBox="1"/>
-          <p:nvPr/>
-        </p:nvSpPr>
-        <p:spPr>
-          <a:xfrm>
-            <a:off x="365760" y="1097280"/>
-            <a:ext cx="4572000" cy="5303520"/>
-          </a:xfrm>
-          <a:prstGeom prst="rect">
-            <a:avLst/>
-          </a:prstGeom>
-          <a:noFill/>
-        </p:spPr>
-        <p:txBody>
-          <a:bodyPr wrap="square">
-            <a:spAutoFit/>
-          </a:bodyPr>
-          <a:lstStyle/>
-          <a:p>
-            <a:pPr>
-              <a:spcAft>
-                <a:spcPts val="800"/>
-              </a:spcAft>
-              <a:defRPr sz="1500">
-                <a:solidFill>
-                  <a:srgbClr val="505050"/>
-                </a:solidFill>
-              </a:defRPr>
-            </a:pPr>
-            <a:r>
-              <a:t>• Spain is the largest net receiver in the 7-country system</a:t>
-            </a:r>
-          </a:p>
-          <a:p>
-            <a:pPr>
-              <a:spcAft>
-                <a:spcPts val="800"/>
-              </a:spcAft>
-              <a:defRPr sz="1500">
-                <a:solidFill>
-                  <a:srgbClr val="505050"/>
-                </a:solidFill>
-              </a:defRPr>
-            </a:pPr>
-            <a:r>
-              <a:t>• Net spillover position = -39 (receives far more than it transmits)</a:t>
-            </a:r>
-          </a:p>
-          <a:p>
-            <a:pPr>
-              <a:spcAft>
-                <a:spcPts val="800"/>
-              </a:spcAft>
-              <a:defRPr sz="1500">
-                <a:solidFill>
-                  <a:srgbClr val="505050"/>
-                </a:solidFill>
-              </a:defRPr>
-            </a:pPr>
-            <a:r>
-              <a:t>• During tightening (2022+): Spain receives 83% of variance from others</a:t>
-            </a:r>
-          </a:p>
-          <a:p>
-            <a:pPr>
-              <a:spcAft>
-                <a:spcPts val="800"/>
-              </a:spcAft>
-              <a:defRPr sz="1500">
-                <a:solidFill>
-                  <a:srgbClr val="505050"/>
-                </a:solidFill>
-              </a:defRPr>
-            </a:pPr>
-            <a:r>
-              <a:t>• More vulnerable than Italy (ES receives 67% vs IT receives 61%)</a:t>
-            </a:r>
-          </a:p>
-          <a:p>
-            <a:pPr>
-              <a:spcAft>
-                <a:spcPts val="800"/>
-              </a:spcAft>
-              <a:defRPr sz="1500">
-                <a:solidFill>
-                  <a:srgbClr val="505050"/>
-                </a:solidFill>
-              </a:defRPr>
-            </a:pPr>
-            <a:r>
-              <a:t>• Spanish yields are 'price takers' - driven by EA-wide shocks</a:t>
-            </a:r>
-          </a:p>
-          <a:p>
-            <a:pPr>
-              <a:spcAft>
-                <a:spcPts val="800"/>
-              </a:spcAft>
-              <a:defRPr sz="1500">
-                <a:solidFill>
-                  <a:srgbClr val="505050"/>
-                </a:solidFill>
-              </a:defRPr>
-            </a:pPr>
-            <a:r>
-              <a:t>• Policy implication: Spanish yields tell you about EA conditions,</a:t>
-            </a:r>
-          </a:p>
-          <a:p>
-            <a:pPr>
-              <a:spcAft>
-                <a:spcPts val="800"/>
-              </a:spcAft>
-              <a:defRPr sz="1500">
-                <a:solidFill>
-                  <a:srgbClr val="505050"/>
-                </a:solidFill>
-              </a:defRPr>
-            </a:pPr>
-            <a:r>
-              <a:t>• but Spanish fiscal policy has limited impact on EA dynamics</a:t>
-            </a:r>
-          </a:p>
-        </p:txBody>
-      </p:sp>
     </p:spTree>
   </p:cSld>
   <p:clrMapOvr>
@@ -5894,14 +5750,57 @@
       <p:grpSpPr/>
       <p:sp>
         <p:nvSpPr>
-          <p:cNvPr id="2" name="TextBox 1"/>
+          <p:cNvPr id="2" name="Rectangle 1"/>
+          <p:cNvSpPr/>
+          <p:nvPr/>
+        </p:nvSpPr>
+        <p:spPr>
+          <a:xfrm>
+            <a:off x="0" y="0"/>
+            <a:ext cx="12191695" cy="6858000"/>
+          </a:xfrm>
+          <a:prstGeom prst="rect">
+            <a:avLst/>
+          </a:prstGeom>
+          <a:solidFill>
+            <a:srgbClr val="003299"/>
+          </a:solidFill>
+          <a:ln>
+            <a:noFill/>
+          </a:ln>
+        </p:spPr>
+        <p:style>
+          <a:lnRef idx="1">
+            <a:schemeClr val="accent1"/>
+          </a:lnRef>
+          <a:fillRef idx="3">
+            <a:schemeClr val="accent1"/>
+          </a:fillRef>
+          <a:effectRef idx="2">
+            <a:schemeClr val="accent1"/>
+          </a:effectRef>
+          <a:fontRef idx="minor">
+            <a:schemeClr val="lt1"/>
+          </a:fontRef>
+        </p:style>
+        <p:txBody>
+          <a:bodyPr rtlCol="0" anchor="ctr"/>
+          <a:lstStyle/>
+          <a:p>
+            <a:pPr algn="ctr"/>
+          </a:p>
+        </p:txBody>
+      </p:sp>
+      <p:sp>
+        <p:nvSpPr>
+          <p:cNvPr id="3" name="TextBox 2"/>
           <p:cNvSpPr txBox="1"/>
           <p:nvPr/>
         </p:nvSpPr>
         <p:spPr>
           <a:xfrm>
-            <a:off x="365760" y="274320"/>
-            <a:ext cx="914400" cy="731520"/>
+            <a:off x="457200" y="2286000"/>
+            <a:ext cx="11277295" cy="914400"/>
           </a:xfrm>
           <a:prstGeom prst="rect">
             <a:avLst/>
@@ -5914,29 +5813,29 @@
           </a:bodyPr>
           <a:lstStyle/>
           <a:p>
-            <a:pPr>
-              <a:defRPr sz="3600" b="1">
-                <a:solidFill>
-                  <a:srgbClr val="007816"/>
-                </a:solidFill>
-              </a:defRPr>
-            </a:pPr>
-            <a:r>
-              <a:t>#3</a:t>
-            </a:r>
-          </a:p>
-        </p:txBody>
-      </p:sp>
-      <p:sp>
-        <p:nvSpPr>
-          <p:cNvPr id="3" name="TextBox 2"/>
+            <a:pPr algn="ctr">
+              <a:defRPr sz="7200" b="1">
+                <a:solidFill>
+                  <a:srgbClr val="FFFFFF"/>
+                </a:solidFill>
+              </a:defRPr>
+            </a:pPr>
+            <a:r>
+              <a:t>III</a:t>
+            </a:r>
+          </a:p>
+        </p:txBody>
+      </p:sp>
+      <p:sp>
+        <p:nvSpPr>
+          <p:cNvPr id="4" name="TextBox 3"/>
           <p:cNvSpPr txBox="1"/>
           <p:nvPr/>
         </p:nvSpPr>
         <p:spPr>
           <a:xfrm>
-            <a:off x="1371600" y="320040"/>
-            <a:ext cx="10058400" cy="731520"/>
+            <a:off x="457200" y="3200400"/>
+            <a:ext cx="11277295" cy="1371600"/>
           </a:xfrm>
           <a:prstGeom prst="rect">
             <a:avLst/>
@@ -5949,167 +5848,15 @@
           </a:bodyPr>
           <a:lstStyle/>
           <a:p>
-            <a:pPr>
-              <a:defRPr sz="2800" b="1">
-                <a:solidFill>
-                  <a:srgbClr val="003299"/>
-                </a:solidFill>
-              </a:defRPr>
-            </a:pPr>
-            <a:r>
-              <a:t>Euro Area Dynamics are Mostly Internal</a:t>
-            </a:r>
-          </a:p>
-        </p:txBody>
-      </p:sp>
-      <p:pic>
-        <p:nvPicPr>
-          <p:cNvPr id="4" name="Picture 3" descr="fig03_external_vs_internal.png"/>
-          <p:cNvPicPr>
-            <a:picLocks noChangeAspect="1"/>
-          </p:cNvPicPr>
-          <p:nvPr/>
-        </p:nvPicPr>
-        <p:blipFill>
-          <a:blip r:embed="rId2"/>
-          <a:stretch>
-            <a:fillRect/>
-          </a:stretch>
-        </p:blipFill>
-        <p:spPr>
-          <a:xfrm>
-            <a:off x="5303520" y="1097280"/>
-            <a:ext cx="6583680" cy="5120640"/>
-          </a:xfrm>
-          <a:prstGeom prst="rect">
-            <a:avLst/>
-          </a:prstGeom>
-        </p:spPr>
-      </p:pic>
-      <p:sp>
-        <p:nvSpPr>
-          <p:cNvPr id="5" name="TextBox 4"/>
-          <p:cNvSpPr txBox="1"/>
-          <p:nvPr/>
-        </p:nvSpPr>
-        <p:spPr>
-          <a:xfrm>
-            <a:off x="365760" y="1097280"/>
-            <a:ext cx="4572000" cy="5303520"/>
-          </a:xfrm>
-          <a:prstGeom prst="rect">
-            <a:avLst/>
-          </a:prstGeom>
-          <a:noFill/>
-        </p:spPr>
-        <p:txBody>
-          <a:bodyPr wrap="square">
-            <a:spAutoFit/>
-          </a:bodyPr>
-          <a:lstStyle/>
-          <a:p>
-            <a:pPr>
-              <a:spcAft>
-                <a:spcPts val="800"/>
-              </a:spcAft>
-              <a:defRPr sz="1500">
-                <a:solidFill>
-                  <a:srgbClr val="505050"/>
-                </a:solidFill>
-              </a:defRPr>
-            </a:pPr>
-            <a:r>
-              <a:t>• Within-EA spillovers (~14%) consistently exceed external (~8%)</a:t>
-            </a:r>
-          </a:p>
-          <a:p>
-            <a:pPr>
-              <a:spcAft>
-                <a:spcPts val="800"/>
-              </a:spcAft>
-              <a:defRPr sz="1500">
-                <a:solidFill>
-                  <a:srgbClr val="505050"/>
-                </a:solidFill>
-              </a:defRPr>
-            </a:pPr>
-            <a:r>
-              <a:t>• Ratio: Internal ≈ 1.7x External on average</a:t>
-            </a:r>
-          </a:p>
-          <a:p>
-            <a:pPr>
-              <a:spcAft>
-                <a:spcPts val="800"/>
-              </a:spcAft>
-              <a:defRPr sz="1500">
-                <a:solidFill>
-                  <a:srgbClr val="505050"/>
-                </a:solidFill>
-              </a:defRPr>
-            </a:pPr>
-            <a:r>
-              <a:t>• US influence peaks during Fed pivots (15% during 2022-23 hiking)</a:t>
-            </a:r>
-          </a:p>
-          <a:p>
-            <a:pPr>
-              <a:spcAft>
-                <a:spcPts val="800"/>
-              </a:spcAft>
-              <a:defRPr sz="1500">
-                <a:solidFill>
-                  <a:srgbClr val="505050"/>
-                </a:solidFill>
-              </a:defRPr>
-            </a:pPr>
-            <a:r>
-              <a:t>• But even at peak, US influence &lt; intra-EA transmission</a:t>
-            </a:r>
-          </a:p>
-          <a:p>
-            <a:pPr>
-              <a:spcAft>
-                <a:spcPts val="800"/>
-              </a:spcAft>
-              <a:defRPr sz="1500">
-                <a:solidFill>
-                  <a:srgbClr val="505050"/>
-                </a:solidFill>
-              </a:defRPr>
-            </a:pPr>
-            <a:r>
-              <a:t>• UK influence declined post-Brexit (-12%)</a:t>
-            </a:r>
-          </a:p>
-          <a:p>
-            <a:pPr>
-              <a:spcAft>
-                <a:spcPts val="800"/>
-              </a:spcAft>
-              <a:defRPr sz="1500">
-                <a:solidFill>
-                  <a:srgbClr val="505050"/>
-                </a:solidFill>
-              </a:defRPr>
-            </a:pPr>
-            <a:r>
-              <a:t>• Implication: ECB policy is the primary driver of EA yield dynamics</a:t>
-            </a:r>
-          </a:p>
-          <a:p>
-            <a:pPr>
-              <a:spcAft>
-                <a:spcPts val="800"/>
-              </a:spcAft>
-              <a:defRPr sz="1500">
-                <a:solidFill>
-                  <a:srgbClr val="505050"/>
-                </a:solidFill>
-              </a:defRPr>
-            </a:pPr>
-            <a:r>
-              <a:t>• External shocks matter, but the EA is largely self-referential</a:t>
+            <a:pPr algn="ctr">
+              <a:defRPr sz="4000" b="1">
+                <a:solidFill>
+                  <a:srgbClr val="FFFFFF"/>
+                </a:solidFill>
+              </a:defRPr>
+            </a:pPr>
+            <a:r>
+              <a:t>Current Risk Assessment</a:t>
             </a:r>
           </a:p>
         </p:txBody>

</xml_diff>

<commit_message>
Fix chart formatting and add Excel export
- Fix all chart formatting issues (text overlap, legend positioning)
- Regenerate fig01 (spillover index) without duplicate subtitle
- Regenerate fig06 (bilateral matrices) with cleaner colorbar
- Regenerate fig11 (France role) with proper panel spacing
- Regenerate fig12 (Japan stacked) with better labels
- Regenerate fig13 (FR-DE spread) with non-overlapping annotations
- Update PowerPoint with all corrected charts
- Add Excel file: external_spillovers_to_us_monthly.xlsx
  - Monthly aggregated external spillovers to US treasuries
  - Columns: Total, EA, Non-EA, individual country breakdowns
  - 363 months from 1995-10 to 2025-12
</commit_message>
<xml_diff>
--- a/comprehensive_analysis/Bond_Spillovers_Policymaker_Deck.pptx
+++ b/comprehensive_analysis/Bond_Spillovers_Policymaker_Deck.pptx
@@ -3450,7 +3450,7 @@
           <p:nvPr/>
         </p:nvPicPr>
         <p:blipFill>
-          <a:blip r:embed="rId3"/>
+          <a:blip r:embed="rId4"/>
           <a:stretch>
             <a:fillRect/>
           </a:stretch>
@@ -3458,7 +3458,7 @@
         <p:spPr>
           <a:xfrm>
             <a:off x="4572000" y="914400"/>
-            <a:ext cx="4572000" cy="2857013"/>
+            <a:ext cx="4572000" cy="2540858"/>
           </a:xfrm>
           <a:prstGeom prst="rect">
             <a:avLst/>
@@ -3518,65 +3518,65 @@
           </a:p>
         </p:txBody>
       </p:sp>
+      <p:sp>
+        <p:nvSpPr>
+          <p:cNvPr id="4" name="TextBox 3"/>
+          <p:cNvSpPr txBox="1"/>
+          <p:nvPr/>
+        </p:nvSpPr>
+        <p:spPr>
+          <a:xfrm>
+            <a:off x="365760" y="6355080"/>
+            <a:ext cx="11430000" cy="457200"/>
+          </a:xfrm>
+          <a:prstGeom prst="rect">
+            <a:avLst/>
+          </a:prstGeom>
+          <a:noFill/>
+        </p:spPr>
+        <p:txBody>
+          <a:bodyPr wrap="none">
+            <a:spAutoFit/>
+          </a:bodyPr>
+          <a:lstStyle/>
+          <a:p>
+            <a:pPr>
+              <a:defRPr sz="1100" i="1">
+                <a:solidFill>
+                  <a:srgbClr val="505050"/>
+                </a:solidFill>
+              </a:defRPr>
+            </a:pPr>
+            <a:r>
+              <a:t>Note regime shifts: IT-ES contagion in Euro Crisis (25%), uniform flows in Tightening (15-23%)</a:t>
+            </a:r>
+          </a:p>
+        </p:txBody>
+      </p:sp>
       <p:pic>
         <p:nvPicPr>
-          <p:cNvPr id="3" name="Picture 2" descr="fig08_bilateral_heatmaps.png"/>
+          <p:cNvPr id="5" name="Picture 4" descr="fig06_bilateral_matrices.png"/>
           <p:cNvPicPr>
             <a:picLocks noChangeAspect="1"/>
           </p:cNvPicPr>
           <p:nvPr/>
         </p:nvPicPr>
         <p:blipFill>
-          <a:blip r:embed="rId2"/>
+          <a:blip r:embed="rId3"/>
           <a:stretch>
             <a:fillRect/>
           </a:stretch>
         </p:blipFill>
         <p:spPr>
           <a:xfrm>
-            <a:off x="274320" y="868680"/>
-            <a:ext cx="11612880" cy="5394960"/>
+            <a:off x="182880" y="822960"/>
+            <a:ext cx="8778240" cy="6666110"/>
           </a:xfrm>
           <a:prstGeom prst="rect">
             <a:avLst/>
           </a:prstGeom>
         </p:spPr>
       </p:pic>
-      <p:sp>
-        <p:nvSpPr>
-          <p:cNvPr id="4" name="TextBox 3"/>
-          <p:cNvSpPr txBox="1"/>
-          <p:nvPr/>
-        </p:nvSpPr>
-        <p:spPr>
-          <a:xfrm>
-            <a:off x="365760" y="6355080"/>
-            <a:ext cx="11430000" cy="457200"/>
-          </a:xfrm>
-          <a:prstGeom prst="rect">
-            <a:avLst/>
-          </a:prstGeom>
-          <a:noFill/>
-        </p:spPr>
-        <p:txBody>
-          <a:bodyPr wrap="none">
-            <a:spAutoFit/>
-          </a:bodyPr>
-          <a:lstStyle/>
-          <a:p>
-            <a:pPr>
-              <a:defRPr sz="1100" i="1">
-                <a:solidFill>
-                  <a:srgbClr val="505050"/>
-                </a:solidFill>
-              </a:defRPr>
-            </a:pPr>
-            <a:r>
-              <a:t>Note regime shifts: IT-ES contagion in Euro Crisis (25%), uniform flows in Tightening (15-23%)</a:t>
-            </a:r>
-          </a:p>
-        </p:txBody>
-      </p:sp>
     </p:spTree>
   </p:cSld>
   <p:clrMapOvr>
@@ -4450,41 +4450,6 @@
           </a:p>
         </p:txBody>
       </p:sp>
-      <p:sp>
-        <p:nvSpPr>
-          <p:cNvPr id="4" name="TextBox 3"/>
-          <p:cNvSpPr txBox="1"/>
-          <p:nvPr/>
-        </p:nvSpPr>
-        <p:spPr>
-          <a:xfrm>
-            <a:off x="365760" y="6355080"/>
-            <a:ext cx="11430000" cy="457200"/>
-          </a:xfrm>
-          <a:prstGeom prst="rect">
-            <a:avLst/>
-          </a:prstGeom>
-          <a:noFill/>
-        </p:spPr>
-        <p:txBody>
-          <a:bodyPr wrap="none">
-            <a:spAutoFit/>
-          </a:bodyPr>
-          <a:lstStyle/>
-          <a:p>
-            <a:pPr>
-              <a:defRPr sz="1100" i="1">
-                <a:solidFill>
-                  <a:srgbClr val="505050"/>
-                </a:solidFill>
-              </a:defRPr>
-            </a:pPr>
-            <a:r>
-              <a:t>Higher spillover = tighter integration. Note: Integration FALLS during crises (2010-12) and RISES during tightening (2022+)</a:t>
-            </a:r>
-          </a:p>
-        </p:txBody>
-      </p:sp>
       <p:pic>
         <p:nvPicPr>
           <p:cNvPr id="5" name="Picture 4" descr="fig01_total_spillover_clean.png"/>
@@ -4494,15 +4459,15 @@
           <p:nvPr/>
         </p:nvPicPr>
         <p:blipFill>
-          <a:blip r:embed="rId3"/>
+          <a:blip r:embed="rId4"/>
           <a:stretch>
             <a:fillRect/>
           </a:stretch>
         </p:blipFill>
         <p:spPr>
           <a:xfrm>
-            <a:off x="457200" y="1371600"/>
-            <a:ext cx="8686800" cy="3751497"/>
+            <a:off x="274320" y="1188720"/>
+            <a:ext cx="8595360" cy="3524820"/>
           </a:xfrm>
           <a:prstGeom prst="rect">
             <a:avLst/>
@@ -4693,278 +4658,133 @@
           </a:p>
         </p:txBody>
       </p:sp>
-      <p:sp>
-        <p:nvSpPr>
-          <p:cNvPr id="3" name="TextBox 2"/>
-          <p:cNvSpPr txBox="1"/>
-          <p:nvPr/>
-        </p:nvSpPr>
-        <p:spPr>
-          <a:xfrm>
-            <a:off x="1371600" y="320040"/>
-            <a:ext cx="10058400" cy="731520"/>
-          </a:xfrm>
-          <a:prstGeom prst="rect">
-            <a:avLst/>
-          </a:prstGeom>
-          <a:noFill/>
-        </p:spPr>
-        <p:txBody>
-          <a:bodyPr wrap="none">
-            <a:spAutoFit/>
-          </a:bodyPr>
-          <a:lstStyle/>
-          <a:p>
-            <a:pPr>
-              <a:defRPr sz="2800" b="1">
-                <a:solidFill>
-                  <a:srgbClr val="003299"/>
-                </a:solidFill>
-              </a:defRPr>
-            </a:pPr>
-            <a:r>
-              <a:rPr sz="1600">
-                <a:solidFill>
-                  <a:srgbClr val="003264"/>
-                </a:solidFill>
-              </a:rPr>
-              <a:t>• France has overtaken Germany as the largest net transmitter since 2015</a:t>
-            </a:r>
-          </a:p>
-          <a:p>
-            <a:r>
-              <a:rPr sz="1600">
-                <a:solidFill>
-                  <a:srgbClr val="003264"/>
-                </a:solidFill>
-              </a:rPr>
-              <a:t>• The French OAT acts as a 'pivot' between core and periphery:</a:t>
-            </a:r>
-          </a:p>
-          <a:p>
-            <a:r>
-              <a:rPr sz="1600">
-                <a:solidFill>
-                  <a:srgbClr val="003264"/>
-                </a:solidFill>
-              </a:rPr>
-              <a:t>•    → Transmits shocks TO Germany: ~22% of German yield variance</a:t>
-            </a:r>
-          </a:p>
-          <a:p>
-            <a:r>
-              <a:rPr sz="1600">
-                <a:solidFill>
-                  <a:srgbClr val="003264"/>
-                </a:solidFill>
-              </a:rPr>
-              <a:t>•    → Transmits shocks TO periphery (Italy, Spain): key spillover channel</a:t>
-            </a:r>
-          </a:p>
-          <a:p>
-            <a:r>
-              <a:rPr sz="1600">
-                <a:solidFill>
-                  <a:srgbClr val="003264"/>
-                </a:solidFill>
-              </a:rPr>
-              <a:t>• During 2024 political turmoil, France REMAINED a net transmitter</a:t>
-            </a:r>
-          </a:p>
-          <a:p>
-            <a:r>
-              <a:rPr sz="1600">
-                <a:solidFill>
-                  <a:srgbClr val="003264"/>
-                </a:solidFill>
-              </a:rPr>
-              <a:t>• Policy implication: French fiscal stress propagates both directions</a:t>
-            </a:r>
-          </a:p>
-        </p:txBody>
-      </p:sp>
-      <p:sp>
-        <p:nvSpPr>
-          <p:cNvPr id="5" name="TextBox 4"/>
-          <p:cNvSpPr txBox="1"/>
-          <p:nvPr/>
-        </p:nvSpPr>
-        <p:spPr>
-          <a:xfrm>
-            <a:off x="365760" y="1097280"/>
-            <a:ext cx="4572000" cy="5303520"/>
-          </a:xfrm>
-          <a:prstGeom prst="rect">
-            <a:avLst/>
-          </a:prstGeom>
-          <a:noFill/>
-        </p:spPr>
-        <p:txBody>
-          <a:bodyPr wrap="square">
-            <a:spAutoFit/>
-          </a:bodyPr>
-          <a:lstStyle/>
-          <a:p>
-            <a:pPr>
-              <a:spcAft>
-                <a:spcPts val="800"/>
-              </a:spcAft>
-              <a:defRPr sz="1500">
-                <a:solidFill>
-                  <a:srgbClr val="505050"/>
-                </a:solidFill>
-              </a:defRPr>
-            </a:pPr>
-            <a:r>
-              <a:t>• France has overtaken Germany as the largest net transmitter since 2015</a:t>
-            </a:r>
-          </a:p>
-          <a:p>
-            <a:pPr>
-              <a:spcAft>
-                <a:spcPts val="800"/>
-              </a:spcAft>
-              <a:defRPr sz="1500">
-                <a:solidFill>
-                  <a:srgbClr val="505050"/>
-                </a:solidFill>
-              </a:defRPr>
-            </a:pPr>
-            <a:r>
-              <a:t>• What does 'pivot' mean? France transmits shocks in BOTH directions:</a:t>
-            </a:r>
-          </a:p>
-          <a:p>
-            <a:pPr>
-              <a:spcAft>
-                <a:spcPts val="800"/>
-              </a:spcAft>
-              <a:defRPr sz="1500">
-                <a:solidFill>
-                  <a:srgbClr val="505050"/>
-                </a:solidFill>
-              </a:defRPr>
-            </a:pPr>
-            <a:r>
-              <a:t>•   → To Germany (core): ~22% of German yield variance</a:t>
-            </a:r>
-          </a:p>
-          <a:p>
-            <a:pPr>
-              <a:spcAft>
-                <a:spcPts val="800"/>
-              </a:spcAft>
-              <a:defRPr sz="1500">
-                <a:solidFill>
-                  <a:srgbClr val="505050"/>
-                </a:solidFill>
-              </a:defRPr>
-            </a:pPr>
-            <a:r>
-              <a:t>•   → To Italy/Spain (periphery): ~18% of their variance</a:t>
-            </a:r>
-          </a:p>
-          <a:p>
-            <a:pPr>
-              <a:spcAft>
-                <a:spcPts val="800"/>
-              </a:spcAft>
-              <a:defRPr sz="1500">
-                <a:solidFill>
-                  <a:srgbClr val="505050"/>
-                </a:solidFill>
-              </a:defRPr>
-            </a:pPr>
-            <a:r>
-              <a:t>• This makes France the key link in the Euro Area yield system</a:t>
-            </a:r>
-          </a:p>
-          <a:p>
-            <a:pPr>
-              <a:spcAft>
-                <a:spcPts val="800"/>
-              </a:spcAft>
-              <a:defRPr sz="1500">
-                <a:solidFill>
-                  <a:srgbClr val="505050"/>
-                </a:solidFill>
-              </a:defRPr>
-            </a:pPr>
-            <a:r>
-              <a:t>• When France moves, BOTH core and periphery follow</a:t>
-            </a:r>
-          </a:p>
-          <a:p>
-            <a:pPr>
-              <a:spcAft>
-                <a:spcPts val="800"/>
-              </a:spcAft>
-              <a:defRPr sz="1500">
-                <a:solidFill>
-                  <a:srgbClr val="505050"/>
-                </a:solidFill>
-              </a:defRPr>
-            </a:pPr>
-            <a:r>
-              <a:t>• 2024 political crisis: FR-DE spread hit 87bp, but France</a:t>
-            </a:r>
-          </a:p>
-          <a:p>
-            <a:pPr>
-              <a:spcAft>
-                <a:spcPts val="800"/>
-              </a:spcAft>
-              <a:defRPr sz="1500">
-                <a:solidFill>
-                  <a:srgbClr val="505050"/>
-                </a:solidFill>
-              </a:defRPr>
-            </a:pPr>
-            <a:r>
-              <a:t>• remained a net transmitter (average +29, always positive)</a:t>
-            </a:r>
-          </a:p>
-          <a:p>
-            <a:pPr>
-              <a:spcAft>
-                <a:spcPts val="800"/>
-              </a:spcAft>
-              <a:defRPr sz="1500">
-                <a:solidFill>
-                  <a:srgbClr val="505050"/>
-                </a:solidFill>
-              </a:defRPr>
-            </a:pPr>
-            <a:r>
-              <a:t>• Key insight: ECB credibility contained contagion to periphery</a:t>
-            </a:r>
-          </a:p>
-        </p:txBody>
-      </p:sp>
       <p:pic>
         <p:nvPicPr>
-          <p:cNvPr id="6" name="Picture 5" descr="image.png"/>
+          <p:cNvPr id="3" name="Picture 2" descr="fig11_france_role.png"/>
           <p:cNvPicPr>
             <a:picLocks noChangeAspect="1"/>
           </p:cNvPicPr>
           <p:nvPr/>
         </p:nvPicPr>
         <p:blipFill>
-          <a:blip r:embed="rId2"/>
+          <a:blip r:embed="rId3"/>
           <a:stretch>
             <a:fillRect/>
           </a:stretch>
         </p:blipFill>
         <p:spPr>
           <a:xfrm>
-            <a:off x="4572000" y="822960"/>
-            <a:ext cx="4572000" cy="3255352"/>
+            <a:off x="4389120" y="548640"/>
+            <a:ext cx="4754880" cy="3790447"/>
           </a:xfrm>
           <a:prstGeom prst="rect">
             <a:avLst/>
           </a:prstGeom>
         </p:spPr>
       </p:pic>
+      <p:sp>
+        <p:nvSpPr>
+          <p:cNvPr id="4" name="TextBox 3"/>
+          <p:cNvSpPr txBox="1"/>
+          <p:nvPr/>
+        </p:nvSpPr>
+        <p:spPr>
+          <a:xfrm>
+            <a:off x="274320" y="914400"/>
+            <a:ext cx="4023360" cy="5486400"/>
+          </a:xfrm>
+          <a:prstGeom prst="rect">
+            <a:avLst/>
+          </a:prstGeom>
+          <a:noFill/>
+        </p:spPr>
+        <p:txBody>
+          <a:bodyPr wrap="square">
+            <a:spAutoFit/>
+          </a:bodyPr>
+          <a:lstStyle/>
+          <a:p>
+            <a:r>
+              <a:rPr sz="1400">
+                <a:solidFill>
+                  <a:srgbClr val="003264"/>
+                </a:solidFill>
+              </a:rPr>
+              <a:t>• France has overtaken Germany as the largest net transmitter since 2015</a:t>
+            </a:r>
+          </a:p>
+          <a:p>
+            <a:r>
+              <a:rPr sz="1400">
+                <a:solidFill>
+                  <a:srgbClr val="003264"/>
+                </a:solidFill>
+              </a:rPr>
+              <a:t>• The French OAT acts as a 'pivot' between core and periphery:</a:t>
+            </a:r>
+          </a:p>
+          <a:p>
+            <a:r>
+              <a:rPr sz="1400">
+                <a:solidFill>
+                  <a:srgbClr val="003264"/>
+                </a:solidFill>
+              </a:rPr>
+              <a:t>•   → To Germany (core): ~22% of German yield variance</a:t>
+            </a:r>
+          </a:p>
+          <a:p>
+            <a:r>
+              <a:rPr sz="1400">
+                <a:solidFill>
+                  <a:srgbClr val="003264"/>
+                </a:solidFill>
+              </a:rPr>
+              <a:t>•   → To Italy/Spain (periphery): ~18% of their variance</a:t>
+            </a:r>
+          </a:p>
+          <a:p>
+            <a:r>
+              <a:rPr sz="1400">
+                <a:solidFill>
+                  <a:srgbClr val="003264"/>
+                </a:solidFill>
+              </a:rPr>
+              <a:t>• This makes France the key link in the Euro Area yield system</a:t>
+            </a:r>
+          </a:p>
+          <a:p>
+            <a:r>
+              <a:rPr sz="1400">
+                <a:solidFill>
+                  <a:srgbClr val="003264"/>
+                </a:solidFill>
+              </a:rPr>
+              <a:t>• When France moves, BOTH core and periphery follow</a:t>
+            </a:r>
+          </a:p>
+          <a:p>
+            <a:r>
+              <a:rPr sz="1400">
+                <a:solidFill>
+                  <a:srgbClr val="003264"/>
+                </a:solidFill>
+              </a:rPr>
+              <a:t>• 2024 political crisis: FR-DE spread hit 87bp, but France remained a net transmitter (average +29, always positive)</a:t>
+            </a:r>
+          </a:p>
+          <a:p>
+            <a:r>
+              <a:rPr sz="1400">
+                <a:solidFill>
+                  <a:srgbClr val="003264"/>
+                </a:solidFill>
+              </a:rPr>
+              <a:t>• Key insight: ECB credibility contained contagion to periphery</a:t>
+            </a:r>
+          </a:p>
+        </p:txBody>
+      </p:sp>
     </p:spTree>
   </p:cSld>
   <p:clrMapOvr>
@@ -5715,15 +5535,15 @@
           <p:nvPr/>
         </p:nvPicPr>
         <p:blipFill>
-          <a:blip r:embed="rId4"/>
+          <a:blip r:embed="rId5"/>
           <a:stretch>
             <a:fillRect/>
           </a:stretch>
         </p:blipFill>
         <p:spPr>
           <a:xfrm>
-            <a:off x="4754880" y="640080"/>
-            <a:ext cx="4578029" cy="6126480"/>
+            <a:off x="4572000" y="457200"/>
+            <a:ext cx="5077891" cy="6400800"/>
           </a:xfrm>
           <a:prstGeom prst="rect">
             <a:avLst/>

</xml_diff>